<commit_message>
Working on presentation and final report
</commit_message>
<xml_diff>
--- a/presentation/Prioli_presentation.pptx
+++ b/presentation/Prioli_presentation.pptx
@@ -5,7 +5,7 @@
     <p:sldMasterId id="2147483726" r:id="rId1"/>
   </p:sldMasterIdLst>
   <p:notesMasterIdLst>
-    <p:notesMasterId r:id="rId18"/>
+    <p:notesMasterId r:id="rId21"/>
   </p:notesMasterIdLst>
   <p:sldIdLst>
     <p:sldId id="256" r:id="rId2"/>
@@ -17,13 +17,16 @@
     <p:sldId id="296" r:id="rId8"/>
     <p:sldId id="260" r:id="rId9"/>
     <p:sldId id="287" r:id="rId10"/>
-    <p:sldId id="298" r:id="rId11"/>
-    <p:sldId id="288" r:id="rId12"/>
-    <p:sldId id="279" r:id="rId13"/>
-    <p:sldId id="280" r:id="rId14"/>
-    <p:sldId id="281" r:id="rId15"/>
-    <p:sldId id="261" r:id="rId16"/>
-    <p:sldId id="262" r:id="rId17"/>
+    <p:sldId id="288" r:id="rId11"/>
+    <p:sldId id="300" r:id="rId12"/>
+    <p:sldId id="298" r:id="rId13"/>
+    <p:sldId id="301" r:id="rId14"/>
+    <p:sldId id="299" r:id="rId15"/>
+    <p:sldId id="279" r:id="rId16"/>
+    <p:sldId id="280" r:id="rId17"/>
+    <p:sldId id="281" r:id="rId18"/>
+    <p:sldId id="261" r:id="rId19"/>
+    <p:sldId id="262" r:id="rId20"/>
   </p:sldIdLst>
   <p:sldSz cx="12192000" cy="6858000"/>
   <p:notesSz cx="6858000" cy="9144000"/>
@@ -228,7 +231,7 @@
           <a:p>
             <a:fld id="{4EE169DE-67F4-4753-9B1C-F1A309C78068}" type="datetimeFigureOut">
               <a:rPr lang="en-US" smtClean="0"/>
-              <a:t>11/25/2019</a:t>
+              <a:t>11/30/2019</a:t>
             </a:fld>
             <a:endParaRPr lang="en-US"/>
           </a:p>
@@ -798,7 +801,7 @@
           <a:p>
             <a:fld id="{CF647BC4-379F-449B-8ACB-1D0356C51E22}" type="datetimeFigureOut">
               <a:rPr lang="en-US" smtClean="0"/>
-              <a:t>11/25/2019</a:t>
+              <a:t>11/30/2019</a:t>
             </a:fld>
             <a:endParaRPr lang="en-US"/>
           </a:p>
@@ -3596,7 +3599,7 @@
           <p:cNvPr id="4" name="Title 3">
             <a:extLst>
               <a:ext uri="{FF2B5EF4-FFF2-40B4-BE49-F238E27FC236}">
-                <a16:creationId xmlns:a16="http://schemas.microsoft.com/office/drawing/2014/main" id="{A1EDCC7D-D674-4934-8B85-570B1298810E}"/>
+                <a16:creationId xmlns:a16="http://schemas.microsoft.com/office/drawing/2014/main" id="{9781CF48-75BE-434B-9AD7-20A301880895}"/>
               </a:ext>
             </a:extLst>
           </p:cNvPr>
@@ -3609,47 +3612,26 @@
         </p:nvSpPr>
         <p:spPr/>
         <p:txBody>
-          <a:bodyPr/>
+          <a:bodyPr>
+            <a:normAutofit/>
+          </a:bodyPr>
           <a:lstStyle/>
           <a:p>
-            <a:endParaRPr lang="en-US"/>
-          </a:p>
-        </p:txBody>
-      </p:sp>
-      <p:sp>
-        <p:nvSpPr>
-          <p:cNvPr id="5" name="Content Placeholder 4">
-            <a:extLst>
-              <a:ext uri="{FF2B5EF4-FFF2-40B4-BE49-F238E27FC236}">
-                <a16:creationId xmlns:a16="http://schemas.microsoft.com/office/drawing/2014/main" id="{2A27504C-7113-428D-B871-F4321379D089}"/>
-              </a:ext>
-            </a:extLst>
-          </p:cNvPr>
-          <p:cNvSpPr>
-            <a:spLocks noGrp="1"/>
-          </p:cNvSpPr>
-          <p:nvPr>
-            <p:ph idx="1"/>
-          </p:nvPr>
-        </p:nvSpPr>
-        <p:spPr>
-          <a:xfrm>
-            <a:off x="476285" y="1358791"/>
-            <a:ext cx="11213722" cy="5308709"/>
-          </a:xfrm>
-        </p:spPr>
-        <p:txBody>
-          <a:bodyPr/>
-          <a:lstStyle/>
-          <a:p>
-            <a:endParaRPr lang="en-US"/>
+            <a:r>
+              <a:rPr lang="en-US" sz="6000" b="1" dirty="0">
+                <a:solidFill>
+                  <a:srgbClr val="58B6C0"/>
+                </a:solidFill>
+              </a:rPr>
+              <a:t>HIERARCHICAL CLUSTERING</a:t>
+            </a:r>
           </a:p>
         </p:txBody>
       </p:sp>
     </p:spTree>
     <p:extLst>
       <p:ext uri="{BB962C8B-B14F-4D97-AF65-F5344CB8AC3E}">
-        <p14:creationId xmlns:p14="http://schemas.microsoft.com/office/powerpoint/2010/main" val="3277929920"/>
+        <p14:creationId xmlns:p14="http://schemas.microsoft.com/office/powerpoint/2010/main" val="1236697090"/>
       </p:ext>
     </p:extLst>
   </p:cSld>
@@ -3678,10 +3660,102 @@
       </p:grpSpPr>
       <p:sp>
         <p:nvSpPr>
+          <p:cNvPr id="5" name="Content Placeholder 4">
+            <a:extLst>
+              <a:ext uri="{FF2B5EF4-FFF2-40B4-BE49-F238E27FC236}">
+                <a16:creationId xmlns:a16="http://schemas.microsoft.com/office/drawing/2014/main" id="{2A27504C-7113-428D-B871-F4321379D089}"/>
+              </a:ext>
+            </a:extLst>
+          </p:cNvPr>
+          <p:cNvSpPr>
+            <a:spLocks noGrp="1"/>
+          </p:cNvSpPr>
+          <p:nvPr>
+            <p:ph idx="1"/>
+          </p:nvPr>
+        </p:nvSpPr>
+        <p:spPr>
+          <a:xfrm>
+            <a:off x="476285" y="1358791"/>
+            <a:ext cx="5787881" cy="5308709"/>
+          </a:xfrm>
+        </p:spPr>
+        <p:txBody>
+          <a:bodyPr/>
+          <a:lstStyle/>
+          <a:p>
+            <a:r>
+              <a:rPr lang="en-US" dirty="0"/>
+              <a:t>AGNES scree plot was very smooth</a:t>
+            </a:r>
+          </a:p>
+          <a:p>
+            <a:pPr lvl="1"/>
+            <a:r>
+              <a:rPr lang="en-US" dirty="0"/>
+              <a:t>Possible elbow at 7 clusters</a:t>
+            </a:r>
+          </a:p>
+          <a:p>
+            <a:r>
+              <a:rPr lang="en-US" dirty="0"/>
+              <a:t>DIANA scree plot shows elbows at 6 and 9 clusters</a:t>
+            </a:r>
+          </a:p>
+          <a:p>
+            <a:r>
+              <a:rPr lang="en-US"/>
+              <a:t>Silhouette </a:t>
+            </a:r>
+            <a:r>
+              <a:rPr lang="en-US" dirty="0"/>
+              <a:t>plots were based on average silhouette width</a:t>
+            </a:r>
+          </a:p>
+          <a:p>
+            <a:r>
+              <a:rPr lang="en-US" dirty="0"/>
+              <a:t>AGNES silhouette plot</a:t>
+            </a:r>
+          </a:p>
+        </p:txBody>
+      </p:sp>
+      <p:pic>
+        <p:nvPicPr>
+          <p:cNvPr id="3" name="Graphic 2">
+            <a:extLst>
+              <a:ext uri="{FF2B5EF4-FFF2-40B4-BE49-F238E27FC236}">
+                <a16:creationId xmlns:a16="http://schemas.microsoft.com/office/drawing/2014/main" id="{9970AE23-C149-490C-BD56-DF3D72484918}"/>
+              </a:ext>
+            </a:extLst>
+          </p:cNvPr>
+          <p:cNvPicPr>
+            <a:picLocks noChangeAspect="1"/>
+          </p:cNvPicPr>
+          <p:nvPr/>
+        </p:nvPicPr>
+        <p:blipFill>
+          <a:blip r:embed="rId2"/>
+          <a:stretch>
+            <a:fillRect/>
+          </a:stretch>
+        </p:blipFill>
+        <p:spPr>
+          <a:xfrm>
+            <a:off x="6457951" y="1196866"/>
+            <a:ext cx="5470634" cy="5470634"/>
+          </a:xfrm>
+          <a:prstGeom prst="rect">
+            <a:avLst/>
+          </a:prstGeom>
+        </p:spPr>
+      </p:pic>
+      <p:sp>
+        <p:nvSpPr>
           <p:cNvPr id="4" name="Title 3">
             <a:extLst>
               <a:ext uri="{FF2B5EF4-FFF2-40B4-BE49-F238E27FC236}">
-                <a16:creationId xmlns:a16="http://schemas.microsoft.com/office/drawing/2014/main" id="{9781CF48-75BE-434B-9AD7-20A301880895}"/>
+                <a16:creationId xmlns:a16="http://schemas.microsoft.com/office/drawing/2014/main" id="{A1EDCC7D-D674-4934-8B85-570B1298810E}"/>
               </a:ext>
             </a:extLst>
           </p:cNvPr>
@@ -3694,18 +3768,12 @@
         </p:nvSpPr>
         <p:spPr/>
         <p:txBody>
-          <a:bodyPr>
-            <a:normAutofit/>
-          </a:bodyPr>
+          <a:bodyPr/>
           <a:lstStyle/>
           <a:p>
             <a:r>
-              <a:rPr lang="en-US" sz="6000" b="1" dirty="0">
-                <a:solidFill>
-                  <a:srgbClr val="58B6C0"/>
-                </a:solidFill>
-              </a:rPr>
-              <a:t>HIERARCHICAL CLUSTERING</a:t>
+              <a:rPr lang="en-US" dirty="0"/>
+              <a:t>SCREE AND SILHOUETTE PLOTS</a:t>
             </a:r>
           </a:p>
         </p:txBody>
@@ -3713,7 +3781,7 @@
     </p:spTree>
     <p:extLst>
       <p:ext uri="{BB962C8B-B14F-4D97-AF65-F5344CB8AC3E}">
-        <p14:creationId xmlns:p14="http://schemas.microsoft.com/office/powerpoint/2010/main" val="1236697090"/>
+        <p14:creationId xmlns:p14="http://schemas.microsoft.com/office/powerpoint/2010/main" val="4207026338"/>
       </p:ext>
     </p:extLst>
   </p:cSld>
@@ -3724,6 +3792,2854 @@
 </file>
 
 <file path=ppt/slides/slide12.xml><?xml version="1.0" encoding="utf-8"?>
+<p:sld xmlns:a="http://schemas.openxmlformats.org/drawingml/2006/main" xmlns:r="http://schemas.openxmlformats.org/officeDocument/2006/relationships" xmlns:p="http://schemas.openxmlformats.org/presentationml/2006/main">
+  <p:cSld>
+    <p:spTree>
+      <p:nvGrpSpPr>
+        <p:cNvPr id="1" name=""/>
+        <p:cNvGrpSpPr/>
+        <p:nvPr/>
+      </p:nvGrpSpPr>
+      <p:grpSpPr>
+        <a:xfrm>
+          <a:off x="0" y="0"/>
+          <a:ext cx="0" cy="0"/>
+          <a:chOff x="0" y="0"/>
+          <a:chExt cx="0" cy="0"/>
+        </a:xfrm>
+      </p:grpSpPr>
+      <p:pic>
+        <p:nvPicPr>
+          <p:cNvPr id="8" name="Content Placeholder 7">
+            <a:extLst>
+              <a:ext uri="{FF2B5EF4-FFF2-40B4-BE49-F238E27FC236}">
+                <a16:creationId xmlns:a16="http://schemas.microsoft.com/office/drawing/2014/main" id="{7539105E-6BE9-4309-8D06-35A4EDEDA34E}"/>
+              </a:ext>
+            </a:extLst>
+          </p:cNvPr>
+          <p:cNvPicPr>
+            <a:picLocks noGrp="1" noChangeAspect="1"/>
+          </p:cNvPicPr>
+          <p:nvPr>
+            <p:ph idx="1"/>
+          </p:nvPr>
+        </p:nvPicPr>
+        <p:blipFill>
+          <a:blip r:embed="rId2"/>
+          <a:stretch>
+            <a:fillRect/>
+          </a:stretch>
+        </p:blipFill>
+        <p:spPr>
+          <a:xfrm>
+            <a:off x="6099976" y="184481"/>
+            <a:ext cx="5859448" cy="5840424"/>
+          </a:xfrm>
+        </p:spPr>
+      </p:pic>
+      <p:pic>
+        <p:nvPicPr>
+          <p:cNvPr id="10" name="Graphic 9">
+            <a:extLst>
+              <a:ext uri="{FF2B5EF4-FFF2-40B4-BE49-F238E27FC236}">
+                <a16:creationId xmlns:a16="http://schemas.microsoft.com/office/drawing/2014/main" id="{670A668A-0891-4EF3-BBD9-795B86C81679}"/>
+              </a:ext>
+            </a:extLst>
+          </p:cNvPr>
+          <p:cNvPicPr>
+            <a:picLocks noChangeAspect="1"/>
+          </p:cNvPicPr>
+          <p:nvPr/>
+        </p:nvPicPr>
+        <p:blipFill>
+          <a:blip r:embed="rId3"/>
+          <a:stretch>
+            <a:fillRect/>
+          </a:stretch>
+        </p:blipFill>
+        <p:spPr>
+          <a:xfrm>
+            <a:off x="10584047" y="5433116"/>
+            <a:ext cx="1372965" cy="1240403"/>
+          </a:xfrm>
+          <a:prstGeom prst="rect">
+            <a:avLst/>
+          </a:prstGeom>
+        </p:spPr>
+      </p:pic>
+      <p:graphicFrame>
+        <p:nvGraphicFramePr>
+          <p:cNvPr id="11" name="Table 10">
+            <a:extLst>
+              <a:ext uri="{FF2B5EF4-FFF2-40B4-BE49-F238E27FC236}">
+                <a16:creationId xmlns:a16="http://schemas.microsoft.com/office/drawing/2014/main" id="{08270A69-1614-4D5D-AC1E-88E4DB4B0177}"/>
+              </a:ext>
+            </a:extLst>
+          </p:cNvPr>
+          <p:cNvGraphicFramePr>
+            <a:graphicFrameLocks noGrp="1"/>
+          </p:cNvGraphicFramePr>
+          <p:nvPr>
+            <p:extLst>
+              <p:ext uri="{D42A27DB-BD31-4B8C-83A1-F6EECF244321}">
+                <p14:modId xmlns:p14="http://schemas.microsoft.com/office/powerpoint/2010/main" val="2758063042"/>
+              </p:ext>
+            </p:extLst>
+          </p:nvPr>
+        </p:nvGraphicFramePr>
+        <p:xfrm>
+          <a:off x="156066" y="4652472"/>
+          <a:ext cx="6234224" cy="2042464"/>
+        </p:xfrm>
+        <a:graphic>
+          <a:graphicData uri="http://schemas.openxmlformats.org/drawingml/2006/table">
+            <a:tbl>
+              <a:tblPr firstRow="1" bandRow="1">
+                <a:tableStyleId>{5C22544A-7EE6-4342-B048-85BDC9FD1C3A}</a:tableStyleId>
+              </a:tblPr>
+              <a:tblGrid>
+                <a:gridCol w="593040">
+                  <a:extLst>
+                    <a:ext uri="{9D8B030D-6E8A-4147-A177-3AD203B41FA5}">
+                      <a16:colId xmlns:a16="http://schemas.microsoft.com/office/drawing/2014/main" val="997632948"/>
+                    </a:ext>
+                  </a:extLst>
+                </a:gridCol>
+                <a:gridCol w="605529">
+                  <a:extLst>
+                    <a:ext uri="{9D8B030D-6E8A-4147-A177-3AD203B41FA5}">
+                      <a16:colId xmlns:a16="http://schemas.microsoft.com/office/drawing/2014/main" val="654047492"/>
+                    </a:ext>
+                  </a:extLst>
+                </a:gridCol>
+                <a:gridCol w="1348104">
+                  <a:extLst>
+                    <a:ext uri="{9D8B030D-6E8A-4147-A177-3AD203B41FA5}">
+                      <a16:colId xmlns:a16="http://schemas.microsoft.com/office/drawing/2014/main" val="2209490111"/>
+                    </a:ext>
+                  </a:extLst>
+                </a:gridCol>
+                <a:gridCol w="1490535">
+                  <a:extLst>
+                    <a:ext uri="{9D8B030D-6E8A-4147-A177-3AD203B41FA5}">
+                      <a16:colId xmlns:a16="http://schemas.microsoft.com/office/drawing/2014/main" val="807552395"/>
+                    </a:ext>
+                  </a:extLst>
+                </a:gridCol>
+                <a:gridCol w="1257636">
+                  <a:extLst>
+                    <a:ext uri="{9D8B030D-6E8A-4147-A177-3AD203B41FA5}">
+                      <a16:colId xmlns:a16="http://schemas.microsoft.com/office/drawing/2014/main" val="4127109187"/>
+                    </a:ext>
+                  </a:extLst>
+                </a:gridCol>
+                <a:gridCol w="939380">
+                  <a:extLst>
+                    <a:ext uri="{9D8B030D-6E8A-4147-A177-3AD203B41FA5}">
+                      <a16:colId xmlns:a16="http://schemas.microsoft.com/office/drawing/2014/main" val="2258230400"/>
+                    </a:ext>
+                  </a:extLst>
+                </a:gridCol>
+              </a:tblGrid>
+              <a:tr h="220092">
+                <a:tc>
+                  <a:txBody>
+                    <a:bodyPr/>
+                    <a:lstStyle/>
+                    <a:p>
+                      <a:r>
+                        <a:rPr lang="en-US" sz="1250" dirty="0">
+                          <a:solidFill>
+                            <a:schemeClr val="tx1"/>
+                          </a:solidFill>
+                        </a:rPr>
+                        <a:t>Cluster</a:t>
+                      </a:r>
+                    </a:p>
+                  </a:txBody>
+                  <a:tcPr marL="64809" marR="64809" marT="32404" marB="32404" anchor="b">
+                    <a:lnB w="12700" cap="flat" cmpd="sng" algn="ctr">
+                      <a:solidFill>
+                        <a:schemeClr val="tx1"/>
+                      </a:solidFill>
+                      <a:prstDash val="solid"/>
+                      <a:round/>
+                      <a:headEnd type="none" w="med" len="med"/>
+                      <a:tailEnd type="none" w="med" len="med"/>
+                    </a:lnB>
+                    <a:noFill/>
+                  </a:tcPr>
+                </a:tc>
+                <a:tc>
+                  <a:txBody>
+                    <a:bodyPr/>
+                    <a:lstStyle/>
+                    <a:p>
+                      <a:r>
+                        <a:rPr lang="en-US" sz="1250" dirty="0">
+                          <a:solidFill>
+                            <a:schemeClr val="tx1"/>
+                          </a:solidFill>
+                        </a:rPr>
+                        <a:t>Size (n)</a:t>
+                      </a:r>
+                    </a:p>
+                  </a:txBody>
+                  <a:tcPr marL="64809" marR="64809" marT="32404" marB="32404" anchor="b">
+                    <a:lnB w="12700" cap="flat" cmpd="sng" algn="ctr">
+                      <a:solidFill>
+                        <a:schemeClr val="tx1"/>
+                      </a:solidFill>
+                      <a:prstDash val="solid"/>
+                      <a:round/>
+                      <a:headEnd type="none" w="med" len="med"/>
+                      <a:tailEnd type="none" w="med" len="med"/>
+                    </a:lnB>
+                    <a:noFill/>
+                  </a:tcPr>
+                </a:tc>
+                <a:tc>
+                  <a:txBody>
+                    <a:bodyPr/>
+                    <a:lstStyle/>
+                    <a:p>
+                      <a:r>
+                        <a:rPr lang="en-US" sz="1250" dirty="0">
+                          <a:solidFill>
+                            <a:schemeClr val="tx1"/>
+                          </a:solidFill>
+                        </a:rPr>
+                        <a:t>Underweight (n, %)</a:t>
+                      </a:r>
+                    </a:p>
+                  </a:txBody>
+                  <a:tcPr marL="64809" marR="64809" marT="32404" marB="32404" anchor="b">
+                    <a:lnB w="12700" cap="flat" cmpd="sng" algn="ctr">
+                      <a:solidFill>
+                        <a:schemeClr val="tx1"/>
+                      </a:solidFill>
+                      <a:prstDash val="solid"/>
+                      <a:round/>
+                      <a:headEnd type="none" w="med" len="med"/>
+                      <a:tailEnd type="none" w="med" len="med"/>
+                    </a:lnB>
+                    <a:noFill/>
+                  </a:tcPr>
+                </a:tc>
+                <a:tc>
+                  <a:txBody>
+                    <a:bodyPr/>
+                    <a:lstStyle/>
+                    <a:p>
+                      <a:r>
+                        <a:rPr lang="en-US" sz="1250" dirty="0">
+                          <a:solidFill>
+                            <a:schemeClr val="tx1"/>
+                          </a:solidFill>
+                        </a:rPr>
+                        <a:t>Healthy Weight (n, %)</a:t>
+                      </a:r>
+                    </a:p>
+                  </a:txBody>
+                  <a:tcPr marL="64809" marR="64809" marT="32404" marB="32404" anchor="b">
+                    <a:lnB w="12700" cap="flat" cmpd="sng" algn="ctr">
+                      <a:solidFill>
+                        <a:schemeClr val="tx1"/>
+                      </a:solidFill>
+                      <a:prstDash val="solid"/>
+                      <a:round/>
+                      <a:headEnd type="none" w="med" len="med"/>
+                      <a:tailEnd type="none" w="med" len="med"/>
+                    </a:lnB>
+                    <a:noFill/>
+                  </a:tcPr>
+                </a:tc>
+                <a:tc>
+                  <a:txBody>
+                    <a:bodyPr/>
+                    <a:lstStyle/>
+                    <a:p>
+                      <a:r>
+                        <a:rPr lang="en-US" sz="1250" dirty="0">
+                          <a:solidFill>
+                            <a:schemeClr val="tx1"/>
+                          </a:solidFill>
+                        </a:rPr>
+                        <a:t>Overweight (n, %)</a:t>
+                      </a:r>
+                    </a:p>
+                  </a:txBody>
+                  <a:tcPr marL="64809" marR="64809" marT="32404" marB="32404" anchor="b">
+                    <a:lnB w="12700" cap="flat" cmpd="sng" algn="ctr">
+                      <a:solidFill>
+                        <a:schemeClr val="tx1"/>
+                      </a:solidFill>
+                      <a:prstDash val="solid"/>
+                      <a:round/>
+                      <a:headEnd type="none" w="med" len="med"/>
+                      <a:tailEnd type="none" w="med" len="med"/>
+                    </a:lnB>
+                    <a:noFill/>
+                  </a:tcPr>
+                </a:tc>
+                <a:tc>
+                  <a:txBody>
+                    <a:bodyPr/>
+                    <a:lstStyle/>
+                    <a:p>
+                      <a:r>
+                        <a:rPr lang="en-US" sz="1250" dirty="0">
+                          <a:solidFill>
+                            <a:schemeClr val="tx1"/>
+                          </a:solidFill>
+                        </a:rPr>
+                        <a:t>Obese (n, %)</a:t>
+                      </a:r>
+                    </a:p>
+                  </a:txBody>
+                  <a:tcPr marL="64809" marR="64809" marT="32404" marB="32404" anchor="b">
+                    <a:lnB w="12700" cap="flat" cmpd="sng" algn="ctr">
+                      <a:solidFill>
+                        <a:schemeClr val="tx1"/>
+                      </a:solidFill>
+                      <a:prstDash val="solid"/>
+                      <a:round/>
+                      <a:headEnd type="none" w="med" len="med"/>
+                      <a:tailEnd type="none" w="med" len="med"/>
+                    </a:lnB>
+                    <a:noFill/>
+                  </a:tcPr>
+                </a:tc>
+                <a:extLst>
+                  <a:ext uri="{0D108BD9-81ED-4DB2-BD59-A6C34878D82A}">
+                    <a16:rowId xmlns:a16="http://schemas.microsoft.com/office/drawing/2014/main" val="2979969401"/>
+                  </a:ext>
+                </a:extLst>
+              </a:tr>
+              <a:tr h="220092">
+                <a:tc>
+                  <a:txBody>
+                    <a:bodyPr/>
+                    <a:lstStyle/>
+                    <a:p>
+                      <a:pPr algn="ctr"/>
+                      <a:r>
+                        <a:rPr lang="en-US" sz="1250" b="1" dirty="0">
+                          <a:solidFill>
+                            <a:srgbClr val="3498DB"/>
+                          </a:solidFill>
+                        </a:rPr>
+                        <a:t>1</a:t>
+                      </a:r>
+                    </a:p>
+                  </a:txBody>
+                  <a:tcPr marL="64809" marR="64809" marT="32404" marB="32404" anchor="ctr">
+                    <a:lnT w="12700" cap="flat" cmpd="sng" algn="ctr">
+                      <a:solidFill>
+                        <a:schemeClr val="tx1"/>
+                      </a:solidFill>
+                      <a:prstDash val="solid"/>
+                      <a:round/>
+                      <a:headEnd type="none" w="med" len="med"/>
+                      <a:tailEnd type="none" w="med" len="med"/>
+                    </a:lnT>
+                    <a:noFill/>
+                  </a:tcPr>
+                </a:tc>
+                <a:tc>
+                  <a:txBody>
+                    <a:bodyPr/>
+                    <a:lstStyle/>
+                    <a:p>
+                      <a:pPr algn="ctr"/>
+                      <a:r>
+                        <a:rPr lang="en-US" sz="1250" dirty="0"/>
+                        <a:t>12</a:t>
+                      </a:r>
+                    </a:p>
+                  </a:txBody>
+                  <a:tcPr marL="64809" marR="64809" marT="32404" marB="32404" anchor="ctr">
+                    <a:lnT w="12700" cap="flat" cmpd="sng" algn="ctr">
+                      <a:solidFill>
+                        <a:schemeClr val="tx1"/>
+                      </a:solidFill>
+                      <a:prstDash val="solid"/>
+                      <a:round/>
+                      <a:headEnd type="none" w="med" len="med"/>
+                      <a:tailEnd type="none" w="med" len="med"/>
+                    </a:lnT>
+                    <a:noFill/>
+                  </a:tcPr>
+                </a:tc>
+                <a:tc>
+                  <a:txBody>
+                    <a:bodyPr/>
+                    <a:lstStyle/>
+                    <a:p>
+                      <a:pPr algn="r"/>
+                      <a:r>
+                        <a:rPr lang="en-US" sz="1250" dirty="0"/>
+                        <a:t>0 (0%)</a:t>
+                      </a:r>
+                    </a:p>
+                  </a:txBody>
+                  <a:tcPr marL="64809" marR="64809" marT="32404" marB="32404" anchor="ctr">
+                    <a:lnT w="12700" cap="flat" cmpd="sng" algn="ctr">
+                      <a:solidFill>
+                        <a:schemeClr val="tx1"/>
+                      </a:solidFill>
+                      <a:prstDash val="solid"/>
+                      <a:round/>
+                      <a:headEnd type="none" w="med" len="med"/>
+                      <a:tailEnd type="none" w="med" len="med"/>
+                    </a:lnT>
+                    <a:noFill/>
+                  </a:tcPr>
+                </a:tc>
+                <a:tc>
+                  <a:txBody>
+                    <a:bodyPr/>
+                    <a:lstStyle/>
+                    <a:p>
+                      <a:pPr algn="r"/>
+                      <a:r>
+                        <a:rPr lang="en-US" sz="1250" dirty="0"/>
+                        <a:t>0 (0%)</a:t>
+                      </a:r>
+                    </a:p>
+                  </a:txBody>
+                  <a:tcPr marL="64809" marR="64809" marT="32404" marB="32404" anchor="ctr">
+                    <a:lnT w="12700" cap="flat" cmpd="sng" algn="ctr">
+                      <a:solidFill>
+                        <a:schemeClr val="tx1"/>
+                      </a:solidFill>
+                      <a:prstDash val="solid"/>
+                      <a:round/>
+                      <a:headEnd type="none" w="med" len="med"/>
+                      <a:tailEnd type="none" w="med" len="med"/>
+                    </a:lnT>
+                    <a:noFill/>
+                  </a:tcPr>
+                </a:tc>
+                <a:tc>
+                  <a:txBody>
+                    <a:bodyPr/>
+                    <a:lstStyle/>
+                    <a:p>
+                      <a:pPr algn="r"/>
+                      <a:r>
+                        <a:rPr lang="en-US" sz="1250" dirty="0"/>
+                        <a:t>2 (16.7%)</a:t>
+                      </a:r>
+                    </a:p>
+                  </a:txBody>
+                  <a:tcPr marL="64809" marR="64809" marT="32404" marB="32404" anchor="ctr">
+                    <a:lnT w="12700" cap="flat" cmpd="sng" algn="ctr">
+                      <a:solidFill>
+                        <a:schemeClr val="tx1"/>
+                      </a:solidFill>
+                      <a:prstDash val="solid"/>
+                      <a:round/>
+                      <a:headEnd type="none" w="med" len="med"/>
+                      <a:tailEnd type="none" w="med" len="med"/>
+                    </a:lnT>
+                    <a:noFill/>
+                  </a:tcPr>
+                </a:tc>
+                <a:tc>
+                  <a:txBody>
+                    <a:bodyPr/>
+                    <a:lstStyle/>
+                    <a:p>
+                      <a:pPr algn="r"/>
+                      <a:r>
+                        <a:rPr lang="en-US" sz="1250" dirty="0"/>
+                        <a:t>10 (83.3%)</a:t>
+                      </a:r>
+                    </a:p>
+                  </a:txBody>
+                  <a:tcPr marL="64809" marR="64809" marT="32404" marB="32404" anchor="ctr">
+                    <a:lnT w="12700" cap="flat" cmpd="sng" algn="ctr">
+                      <a:solidFill>
+                        <a:schemeClr val="tx1"/>
+                      </a:solidFill>
+                      <a:prstDash val="solid"/>
+                      <a:round/>
+                      <a:headEnd type="none" w="med" len="med"/>
+                      <a:tailEnd type="none" w="med" len="med"/>
+                    </a:lnT>
+                    <a:noFill/>
+                  </a:tcPr>
+                </a:tc>
+                <a:extLst>
+                  <a:ext uri="{0D108BD9-81ED-4DB2-BD59-A6C34878D82A}">
+                    <a16:rowId xmlns:a16="http://schemas.microsoft.com/office/drawing/2014/main" val="63325010"/>
+                  </a:ext>
+                </a:extLst>
+              </a:tr>
+              <a:tr h="220092">
+                <a:tc>
+                  <a:txBody>
+                    <a:bodyPr/>
+                    <a:lstStyle/>
+                    <a:p>
+                      <a:pPr algn="ctr"/>
+                      <a:r>
+                        <a:rPr lang="en-US" sz="1250" b="1" dirty="0">
+                          <a:solidFill>
+                            <a:srgbClr val="28CC72"/>
+                          </a:solidFill>
+                        </a:rPr>
+                        <a:t>2</a:t>
+                      </a:r>
+                    </a:p>
+                  </a:txBody>
+                  <a:tcPr marL="64809" marR="64809" marT="32404" marB="32404" anchor="ctr">
+                    <a:noFill/>
+                  </a:tcPr>
+                </a:tc>
+                <a:tc>
+                  <a:txBody>
+                    <a:bodyPr/>
+                    <a:lstStyle/>
+                    <a:p>
+                      <a:pPr algn="ctr"/>
+                      <a:r>
+                        <a:rPr lang="en-US" sz="1250" dirty="0"/>
+                        <a:t>25</a:t>
+                      </a:r>
+                    </a:p>
+                  </a:txBody>
+                  <a:tcPr marL="64809" marR="64809" marT="32404" marB="32404" anchor="ctr">
+                    <a:noFill/>
+                  </a:tcPr>
+                </a:tc>
+                <a:tc>
+                  <a:txBody>
+                    <a:bodyPr/>
+                    <a:lstStyle/>
+                    <a:p>
+                      <a:pPr algn="r"/>
+                      <a:r>
+                        <a:rPr lang="en-US" sz="1250" dirty="0"/>
+                        <a:t>0 (0%)</a:t>
+                      </a:r>
+                    </a:p>
+                  </a:txBody>
+                  <a:tcPr marL="64809" marR="64809" marT="32404" marB="32404" anchor="ctr">
+                    <a:noFill/>
+                  </a:tcPr>
+                </a:tc>
+                <a:tc>
+                  <a:txBody>
+                    <a:bodyPr/>
+                    <a:lstStyle/>
+                    <a:p>
+                      <a:pPr algn="r"/>
+                      <a:r>
+                        <a:rPr lang="en-US" sz="1250" dirty="0"/>
+                        <a:t>1 (4%)</a:t>
+                      </a:r>
+                    </a:p>
+                  </a:txBody>
+                  <a:tcPr marL="64809" marR="64809" marT="32404" marB="32404" anchor="ctr">
+                    <a:noFill/>
+                  </a:tcPr>
+                </a:tc>
+                <a:tc>
+                  <a:txBody>
+                    <a:bodyPr/>
+                    <a:lstStyle/>
+                    <a:p>
+                      <a:pPr algn="r"/>
+                      <a:r>
+                        <a:rPr lang="en-US" sz="1250" dirty="0"/>
+                        <a:t>8 (32.0%)</a:t>
+                      </a:r>
+                    </a:p>
+                  </a:txBody>
+                  <a:tcPr marL="64809" marR="64809" marT="32404" marB="32404" anchor="ctr">
+                    <a:noFill/>
+                  </a:tcPr>
+                </a:tc>
+                <a:tc>
+                  <a:txBody>
+                    <a:bodyPr/>
+                    <a:lstStyle/>
+                    <a:p>
+                      <a:pPr algn="r"/>
+                      <a:r>
+                        <a:rPr lang="en-US" sz="1250" dirty="0"/>
+                        <a:t>16 (64.0%)</a:t>
+                      </a:r>
+                    </a:p>
+                  </a:txBody>
+                  <a:tcPr marL="64809" marR="64809" marT="32404" marB="32404" anchor="ctr">
+                    <a:noFill/>
+                  </a:tcPr>
+                </a:tc>
+                <a:extLst>
+                  <a:ext uri="{0D108BD9-81ED-4DB2-BD59-A6C34878D82A}">
+                    <a16:rowId xmlns:a16="http://schemas.microsoft.com/office/drawing/2014/main" val="1541275744"/>
+                  </a:ext>
+                </a:extLst>
+              </a:tr>
+              <a:tr h="220092">
+                <a:tc>
+                  <a:txBody>
+                    <a:bodyPr/>
+                    <a:lstStyle/>
+                    <a:p>
+                      <a:pPr algn="ctr"/>
+                      <a:r>
+                        <a:rPr lang="en-US" sz="1250" b="1" dirty="0">
+                          <a:solidFill>
+                            <a:srgbClr val="F39C12"/>
+                          </a:solidFill>
+                        </a:rPr>
+                        <a:t>3</a:t>
+                      </a:r>
+                    </a:p>
+                  </a:txBody>
+                  <a:tcPr marL="64809" marR="64809" marT="32404" marB="32404" anchor="ctr">
+                    <a:noFill/>
+                  </a:tcPr>
+                </a:tc>
+                <a:tc>
+                  <a:txBody>
+                    <a:bodyPr/>
+                    <a:lstStyle/>
+                    <a:p>
+                      <a:pPr algn="ctr"/>
+                      <a:r>
+                        <a:rPr lang="en-US" sz="1250" dirty="0"/>
+                        <a:t>31</a:t>
+                      </a:r>
+                    </a:p>
+                  </a:txBody>
+                  <a:tcPr marL="64809" marR="64809" marT="32404" marB="32404" anchor="ctr">
+                    <a:noFill/>
+                  </a:tcPr>
+                </a:tc>
+                <a:tc>
+                  <a:txBody>
+                    <a:bodyPr/>
+                    <a:lstStyle/>
+                    <a:p>
+                      <a:pPr algn="r"/>
+                      <a:r>
+                        <a:rPr lang="en-US" sz="1250" dirty="0"/>
+                        <a:t>0 (0%)</a:t>
+                      </a:r>
+                    </a:p>
+                  </a:txBody>
+                  <a:tcPr marL="64809" marR="64809" marT="32404" marB="32404" anchor="ctr">
+                    <a:noFill/>
+                  </a:tcPr>
+                </a:tc>
+                <a:tc>
+                  <a:txBody>
+                    <a:bodyPr/>
+                    <a:lstStyle/>
+                    <a:p>
+                      <a:pPr algn="r"/>
+                      <a:r>
+                        <a:rPr lang="en-US" sz="1250" dirty="0"/>
+                        <a:t>12 (38.7%)</a:t>
+                      </a:r>
+                    </a:p>
+                  </a:txBody>
+                  <a:tcPr marL="64809" marR="64809" marT="32404" marB="32404" anchor="ctr">
+                    <a:noFill/>
+                  </a:tcPr>
+                </a:tc>
+                <a:tc>
+                  <a:txBody>
+                    <a:bodyPr/>
+                    <a:lstStyle/>
+                    <a:p>
+                      <a:pPr algn="r"/>
+                      <a:r>
+                        <a:rPr lang="en-US" sz="1250" dirty="0"/>
+                        <a:t>15 (48.4%)</a:t>
+                      </a:r>
+                    </a:p>
+                  </a:txBody>
+                  <a:tcPr marL="64809" marR="64809" marT="32404" marB="32404" anchor="ctr">
+                    <a:noFill/>
+                  </a:tcPr>
+                </a:tc>
+                <a:tc>
+                  <a:txBody>
+                    <a:bodyPr/>
+                    <a:lstStyle/>
+                    <a:p>
+                      <a:pPr algn="r"/>
+                      <a:r>
+                        <a:rPr lang="en-US" sz="1250" dirty="0"/>
+                        <a:t>4 (12.9%)</a:t>
+                      </a:r>
+                    </a:p>
+                  </a:txBody>
+                  <a:tcPr marL="64809" marR="64809" marT="32404" marB="32404" anchor="ctr">
+                    <a:noFill/>
+                  </a:tcPr>
+                </a:tc>
+                <a:extLst>
+                  <a:ext uri="{0D108BD9-81ED-4DB2-BD59-A6C34878D82A}">
+                    <a16:rowId xmlns:a16="http://schemas.microsoft.com/office/drawing/2014/main" val="2265994310"/>
+                  </a:ext>
+                </a:extLst>
+              </a:tr>
+              <a:tr h="220092">
+                <a:tc>
+                  <a:txBody>
+                    <a:bodyPr/>
+                    <a:lstStyle/>
+                    <a:p>
+                      <a:pPr algn="ctr"/>
+                      <a:r>
+                        <a:rPr lang="en-US" sz="1250" b="1" dirty="0">
+                          <a:solidFill>
+                            <a:srgbClr val="E74C3C"/>
+                          </a:solidFill>
+                        </a:rPr>
+                        <a:t>4</a:t>
+                      </a:r>
+                    </a:p>
+                  </a:txBody>
+                  <a:tcPr marL="64809" marR="64809" marT="32404" marB="32404" anchor="ctr">
+                    <a:noFill/>
+                  </a:tcPr>
+                </a:tc>
+                <a:tc>
+                  <a:txBody>
+                    <a:bodyPr/>
+                    <a:lstStyle/>
+                    <a:p>
+                      <a:pPr algn="ctr"/>
+                      <a:r>
+                        <a:rPr lang="en-US" sz="1250" dirty="0"/>
+                        <a:t>18</a:t>
+                      </a:r>
+                    </a:p>
+                  </a:txBody>
+                  <a:tcPr marL="64809" marR="64809" marT="32404" marB="32404" anchor="ctr">
+                    <a:noFill/>
+                  </a:tcPr>
+                </a:tc>
+                <a:tc>
+                  <a:txBody>
+                    <a:bodyPr/>
+                    <a:lstStyle/>
+                    <a:p>
+                      <a:pPr algn="r"/>
+                      <a:r>
+                        <a:rPr lang="en-US" sz="1250" dirty="0"/>
+                        <a:t>1 (5.6%)</a:t>
+                      </a:r>
+                    </a:p>
+                  </a:txBody>
+                  <a:tcPr marL="64809" marR="64809" marT="32404" marB="32404" anchor="ctr">
+                    <a:noFill/>
+                  </a:tcPr>
+                </a:tc>
+                <a:tc>
+                  <a:txBody>
+                    <a:bodyPr/>
+                    <a:lstStyle/>
+                    <a:p>
+                      <a:pPr algn="r"/>
+                      <a:r>
+                        <a:rPr lang="en-US" sz="1250" dirty="0"/>
+                        <a:t>3 (16.7%)</a:t>
+                      </a:r>
+                    </a:p>
+                  </a:txBody>
+                  <a:tcPr marL="64809" marR="64809" marT="32404" marB="32404" anchor="ctr">
+                    <a:noFill/>
+                  </a:tcPr>
+                </a:tc>
+                <a:tc>
+                  <a:txBody>
+                    <a:bodyPr/>
+                    <a:lstStyle/>
+                    <a:p>
+                      <a:pPr algn="r"/>
+                      <a:r>
+                        <a:rPr lang="en-US" sz="1250" dirty="0"/>
+                        <a:t>5 (27.8%)</a:t>
+                      </a:r>
+                    </a:p>
+                  </a:txBody>
+                  <a:tcPr marL="64809" marR="64809" marT="32404" marB="32404" anchor="ctr">
+                    <a:noFill/>
+                  </a:tcPr>
+                </a:tc>
+                <a:tc>
+                  <a:txBody>
+                    <a:bodyPr/>
+                    <a:lstStyle/>
+                    <a:p>
+                      <a:pPr algn="r"/>
+                      <a:r>
+                        <a:rPr lang="en-US" sz="1250" dirty="0"/>
+                        <a:t>9 (50.0%)</a:t>
+                      </a:r>
+                    </a:p>
+                  </a:txBody>
+                  <a:tcPr marL="64809" marR="64809" marT="32404" marB="32404" anchor="ctr">
+                    <a:noFill/>
+                  </a:tcPr>
+                </a:tc>
+                <a:extLst>
+                  <a:ext uri="{0D108BD9-81ED-4DB2-BD59-A6C34878D82A}">
+                    <a16:rowId xmlns:a16="http://schemas.microsoft.com/office/drawing/2014/main" val="3407453536"/>
+                  </a:ext>
+                </a:extLst>
+              </a:tr>
+              <a:tr h="220092">
+                <a:tc>
+                  <a:txBody>
+                    <a:bodyPr/>
+                    <a:lstStyle/>
+                    <a:p>
+                      <a:pPr algn="ctr"/>
+                      <a:r>
+                        <a:rPr lang="en-US" sz="1250" b="1" dirty="0">
+                          <a:solidFill>
+                            <a:srgbClr val="D979C9"/>
+                          </a:solidFill>
+                        </a:rPr>
+                        <a:t>5</a:t>
+                      </a:r>
+                    </a:p>
+                  </a:txBody>
+                  <a:tcPr marL="64809" marR="64809" marT="32404" marB="32404" anchor="ctr">
+                    <a:noFill/>
+                  </a:tcPr>
+                </a:tc>
+                <a:tc>
+                  <a:txBody>
+                    <a:bodyPr/>
+                    <a:lstStyle/>
+                    <a:p>
+                      <a:pPr algn="ctr"/>
+                      <a:r>
+                        <a:rPr lang="en-US" sz="1250" dirty="0"/>
+                        <a:t>36</a:t>
+                      </a:r>
+                    </a:p>
+                  </a:txBody>
+                  <a:tcPr marL="64809" marR="64809" marT="32404" marB="32404" anchor="ctr">
+                    <a:noFill/>
+                  </a:tcPr>
+                </a:tc>
+                <a:tc>
+                  <a:txBody>
+                    <a:bodyPr/>
+                    <a:lstStyle/>
+                    <a:p>
+                      <a:pPr algn="r"/>
+                      <a:r>
+                        <a:rPr lang="en-US" sz="1250" dirty="0"/>
+                        <a:t>1 (2.8%)</a:t>
+                      </a:r>
+                    </a:p>
+                  </a:txBody>
+                  <a:tcPr marL="64809" marR="64809" marT="32404" marB="32404" anchor="ctr">
+                    <a:noFill/>
+                  </a:tcPr>
+                </a:tc>
+                <a:tc>
+                  <a:txBody>
+                    <a:bodyPr/>
+                    <a:lstStyle/>
+                    <a:p>
+                      <a:pPr algn="r"/>
+                      <a:r>
+                        <a:rPr lang="en-US" sz="1250" dirty="0"/>
+                        <a:t>16 (44.4%)</a:t>
+                      </a:r>
+                    </a:p>
+                  </a:txBody>
+                  <a:tcPr marL="64809" marR="64809" marT="32404" marB="32404" anchor="ctr">
+                    <a:noFill/>
+                  </a:tcPr>
+                </a:tc>
+                <a:tc>
+                  <a:txBody>
+                    <a:bodyPr/>
+                    <a:lstStyle/>
+                    <a:p>
+                      <a:pPr algn="r"/>
+                      <a:r>
+                        <a:rPr lang="en-US" sz="1250" dirty="0"/>
+                        <a:t>6 (16.7%)</a:t>
+                      </a:r>
+                    </a:p>
+                  </a:txBody>
+                  <a:tcPr marL="64809" marR="64809" marT="32404" marB="32404" anchor="ctr">
+                    <a:noFill/>
+                  </a:tcPr>
+                </a:tc>
+                <a:tc>
+                  <a:txBody>
+                    <a:bodyPr/>
+                    <a:lstStyle/>
+                    <a:p>
+                      <a:pPr algn="r"/>
+                      <a:r>
+                        <a:rPr lang="en-US" sz="1250" dirty="0"/>
+                        <a:t>13 (36.1%)</a:t>
+                      </a:r>
+                    </a:p>
+                  </a:txBody>
+                  <a:tcPr marL="64809" marR="64809" marT="32404" marB="32404" anchor="ctr">
+                    <a:noFill/>
+                  </a:tcPr>
+                </a:tc>
+                <a:extLst>
+                  <a:ext uri="{0D108BD9-81ED-4DB2-BD59-A6C34878D82A}">
+                    <a16:rowId xmlns:a16="http://schemas.microsoft.com/office/drawing/2014/main" val="940925462"/>
+                  </a:ext>
+                </a:extLst>
+              </a:tr>
+              <a:tr h="220092">
+                <a:tc>
+                  <a:txBody>
+                    <a:bodyPr/>
+                    <a:lstStyle/>
+                    <a:p>
+                      <a:pPr algn="ctr"/>
+                      <a:r>
+                        <a:rPr lang="en-US" sz="1250" b="1" dirty="0">
+                          <a:solidFill>
+                            <a:srgbClr val="9C59B6"/>
+                          </a:solidFill>
+                        </a:rPr>
+                        <a:t>6</a:t>
+                      </a:r>
+                    </a:p>
+                  </a:txBody>
+                  <a:tcPr marL="64809" marR="64809" marT="32404" marB="32404" anchor="ctr">
+                    <a:noFill/>
+                  </a:tcPr>
+                </a:tc>
+                <a:tc>
+                  <a:txBody>
+                    <a:bodyPr/>
+                    <a:lstStyle/>
+                    <a:p>
+                      <a:pPr algn="ctr"/>
+                      <a:r>
+                        <a:rPr lang="en-US" sz="1250" dirty="0"/>
+                        <a:t>50</a:t>
+                      </a:r>
+                    </a:p>
+                  </a:txBody>
+                  <a:tcPr marL="64809" marR="64809" marT="32404" marB="32404" anchor="ctr">
+                    <a:noFill/>
+                  </a:tcPr>
+                </a:tc>
+                <a:tc>
+                  <a:txBody>
+                    <a:bodyPr/>
+                    <a:lstStyle/>
+                    <a:p>
+                      <a:pPr algn="r"/>
+                      <a:r>
+                        <a:rPr lang="en-US" sz="1250" dirty="0"/>
+                        <a:t>0 (0%)</a:t>
+                      </a:r>
+                    </a:p>
+                  </a:txBody>
+                  <a:tcPr marL="64809" marR="64809" marT="32404" marB="32404" anchor="ctr">
+                    <a:noFill/>
+                  </a:tcPr>
+                </a:tc>
+                <a:tc>
+                  <a:txBody>
+                    <a:bodyPr/>
+                    <a:lstStyle/>
+                    <a:p>
+                      <a:pPr algn="r"/>
+                      <a:r>
+                        <a:rPr lang="en-US" sz="1250" dirty="0"/>
+                        <a:t>14 (28.0%)</a:t>
+                      </a:r>
+                    </a:p>
+                  </a:txBody>
+                  <a:tcPr marL="64809" marR="64809" marT="32404" marB="32404" anchor="ctr">
+                    <a:noFill/>
+                  </a:tcPr>
+                </a:tc>
+                <a:tc>
+                  <a:txBody>
+                    <a:bodyPr/>
+                    <a:lstStyle/>
+                    <a:p>
+                      <a:pPr algn="r"/>
+                      <a:r>
+                        <a:rPr lang="en-US" sz="1250" dirty="0"/>
+                        <a:t>15 (30.0%)</a:t>
+                      </a:r>
+                    </a:p>
+                  </a:txBody>
+                  <a:tcPr marL="64809" marR="64809" marT="32404" marB="32404" anchor="ctr">
+                    <a:noFill/>
+                  </a:tcPr>
+                </a:tc>
+                <a:tc>
+                  <a:txBody>
+                    <a:bodyPr/>
+                    <a:lstStyle/>
+                    <a:p>
+                      <a:pPr algn="r"/>
+                      <a:r>
+                        <a:rPr lang="en-US" sz="1250" dirty="0"/>
+                        <a:t>21 (42.0%)</a:t>
+                      </a:r>
+                    </a:p>
+                  </a:txBody>
+                  <a:tcPr marL="64809" marR="64809" marT="32404" marB="32404" anchor="ctr">
+                    <a:noFill/>
+                  </a:tcPr>
+                </a:tc>
+                <a:extLst>
+                  <a:ext uri="{0D108BD9-81ED-4DB2-BD59-A6C34878D82A}">
+                    <a16:rowId xmlns:a16="http://schemas.microsoft.com/office/drawing/2014/main" val="136471988"/>
+                  </a:ext>
+                </a:extLst>
+              </a:tr>
+              <a:tr h="220092">
+                <a:tc>
+                  <a:txBody>
+                    <a:bodyPr/>
+                    <a:lstStyle/>
+                    <a:p>
+                      <a:pPr algn="ctr"/>
+                      <a:r>
+                        <a:rPr lang="en-US" sz="1250" b="1" dirty="0">
+                          <a:solidFill>
+                            <a:srgbClr val="1ABCB4"/>
+                          </a:solidFill>
+                        </a:rPr>
+                        <a:t>7</a:t>
+                      </a:r>
+                    </a:p>
+                  </a:txBody>
+                  <a:tcPr marL="64809" marR="64809" marT="32404" marB="32404" anchor="ctr">
+                    <a:noFill/>
+                  </a:tcPr>
+                </a:tc>
+                <a:tc>
+                  <a:txBody>
+                    <a:bodyPr/>
+                    <a:lstStyle/>
+                    <a:p>
+                      <a:pPr algn="ctr"/>
+                      <a:r>
+                        <a:rPr lang="en-US" sz="1250" dirty="0"/>
+                        <a:t>69</a:t>
+                      </a:r>
+                    </a:p>
+                  </a:txBody>
+                  <a:tcPr marL="64809" marR="64809" marT="32404" marB="32404" anchor="ctr">
+                    <a:noFill/>
+                  </a:tcPr>
+                </a:tc>
+                <a:tc>
+                  <a:txBody>
+                    <a:bodyPr/>
+                    <a:lstStyle/>
+                    <a:p>
+                      <a:pPr algn="r"/>
+                      <a:r>
+                        <a:rPr lang="en-US" sz="1250" dirty="0"/>
+                        <a:t>1 (1.4%)</a:t>
+                      </a:r>
+                    </a:p>
+                  </a:txBody>
+                  <a:tcPr marL="64809" marR="64809" marT="32404" marB="32404" anchor="ctr">
+                    <a:noFill/>
+                  </a:tcPr>
+                </a:tc>
+                <a:tc>
+                  <a:txBody>
+                    <a:bodyPr/>
+                    <a:lstStyle/>
+                    <a:p>
+                      <a:pPr algn="r"/>
+                      <a:r>
+                        <a:rPr lang="en-US" sz="1250" dirty="0"/>
+                        <a:t>17 (24.6%)</a:t>
+                      </a:r>
+                    </a:p>
+                  </a:txBody>
+                  <a:tcPr marL="64809" marR="64809" marT="32404" marB="32404" anchor="ctr">
+                    <a:noFill/>
+                  </a:tcPr>
+                </a:tc>
+                <a:tc>
+                  <a:txBody>
+                    <a:bodyPr/>
+                    <a:lstStyle/>
+                    <a:p>
+                      <a:pPr algn="r"/>
+                      <a:r>
+                        <a:rPr lang="en-US" sz="1250" dirty="0"/>
+                        <a:t>26 (37.7%)</a:t>
+                      </a:r>
+                    </a:p>
+                  </a:txBody>
+                  <a:tcPr marL="64809" marR="64809" marT="32404" marB="32404" anchor="ctr">
+                    <a:noFill/>
+                  </a:tcPr>
+                </a:tc>
+                <a:tc>
+                  <a:txBody>
+                    <a:bodyPr/>
+                    <a:lstStyle/>
+                    <a:p>
+                      <a:pPr algn="r"/>
+                      <a:r>
+                        <a:rPr lang="en-US" sz="1250" dirty="0"/>
+                        <a:t>25 (36.2%)</a:t>
+                      </a:r>
+                    </a:p>
+                  </a:txBody>
+                  <a:tcPr marL="64809" marR="64809" marT="32404" marB="32404" anchor="ctr">
+                    <a:noFill/>
+                  </a:tcPr>
+                </a:tc>
+                <a:extLst>
+                  <a:ext uri="{0D108BD9-81ED-4DB2-BD59-A6C34878D82A}">
+                    <a16:rowId xmlns:a16="http://schemas.microsoft.com/office/drawing/2014/main" val="3714802818"/>
+                  </a:ext>
+                </a:extLst>
+              </a:tr>
+            </a:tbl>
+          </a:graphicData>
+        </a:graphic>
+      </p:graphicFrame>
+      <p:sp>
+        <p:nvSpPr>
+          <p:cNvPr id="12" name="Content Placeholder 4">
+            <a:extLst>
+              <a:ext uri="{FF2B5EF4-FFF2-40B4-BE49-F238E27FC236}">
+                <a16:creationId xmlns:a16="http://schemas.microsoft.com/office/drawing/2014/main" id="{CD35816C-0351-4CA3-9753-36ED5869F8CD}"/>
+              </a:ext>
+            </a:extLst>
+          </p:cNvPr>
+          <p:cNvSpPr txBox="1">
+            <a:spLocks/>
+          </p:cNvSpPr>
+          <p:nvPr/>
+        </p:nvSpPr>
+        <p:spPr>
+          <a:xfrm>
+            <a:off x="476285" y="1358791"/>
+            <a:ext cx="5615740" cy="3223719"/>
+          </a:xfrm>
+          <a:prstGeom prst="rect">
+            <a:avLst/>
+          </a:prstGeom>
+        </p:spPr>
+        <p:txBody>
+          <a:bodyPr vert="horz" lIns="91440" tIns="45720" rIns="91440" bIns="45720" rtlCol="0">
+            <a:normAutofit/>
+          </a:bodyPr>
+          <a:lstStyle>
+            <a:lvl1pPr marL="228600" indent="-228600" algn="l" defTabSz="914400" rtl="0" eaLnBrk="1" latinLnBrk="0" hangingPunct="1">
+              <a:lnSpc>
+                <a:spcPct val="85000"/>
+              </a:lnSpc>
+              <a:spcBef>
+                <a:spcPts val="1300"/>
+              </a:spcBef>
+              <a:buFont typeface="Arial" panose="020B0604020202020204" pitchFamily="34" charset="0"/>
+              <a:buChar char="•"/>
+              <a:defRPr sz="2400" kern="1200">
+                <a:solidFill>
+                  <a:schemeClr val="tx1">
+                    <a:lumMod val="85000"/>
+                    <a:lumOff val="15000"/>
+                  </a:schemeClr>
+                </a:solidFill>
+                <a:latin typeface="+mn-lt"/>
+                <a:ea typeface="+mn-ea"/>
+                <a:cs typeface="+mn-cs"/>
+              </a:defRPr>
+            </a:lvl1pPr>
+            <a:lvl2pPr marL="685800" indent="-228600" algn="l" defTabSz="914400" rtl="0" eaLnBrk="1" latinLnBrk="0" hangingPunct="1">
+              <a:lnSpc>
+                <a:spcPct val="85000"/>
+              </a:lnSpc>
+              <a:spcBef>
+                <a:spcPts val="600"/>
+              </a:spcBef>
+              <a:buSzPct val="80000"/>
+              <a:buFont typeface="Courier New" panose="02070309020205020404" pitchFamily="49" charset="0"/>
+              <a:buChar char="o"/>
+              <a:defRPr sz="2400" kern="1200">
+                <a:solidFill>
+                  <a:schemeClr val="tx1">
+                    <a:lumMod val="85000"/>
+                    <a:lumOff val="15000"/>
+                  </a:schemeClr>
+                </a:solidFill>
+                <a:latin typeface="+mn-lt"/>
+                <a:ea typeface="+mn-ea"/>
+                <a:cs typeface="+mn-cs"/>
+              </a:defRPr>
+            </a:lvl2pPr>
+            <a:lvl3pPr marL="1143000" indent="-228600" algn="l" defTabSz="914400" rtl="0" eaLnBrk="1" latinLnBrk="0" hangingPunct="1">
+              <a:lnSpc>
+                <a:spcPct val="85000"/>
+              </a:lnSpc>
+              <a:spcBef>
+                <a:spcPts val="600"/>
+              </a:spcBef>
+              <a:buFont typeface="Arial" panose="020B0604020202020204" pitchFamily="34" charset="0"/>
+              <a:buChar char="•"/>
+              <a:defRPr sz="2000" i="0" kern="1200">
+                <a:solidFill>
+                  <a:schemeClr val="tx1">
+                    <a:lumMod val="85000"/>
+                    <a:lumOff val="15000"/>
+                  </a:schemeClr>
+                </a:solidFill>
+                <a:latin typeface="+mn-lt"/>
+                <a:ea typeface="+mn-ea"/>
+                <a:cs typeface="+mn-cs"/>
+              </a:defRPr>
+            </a:lvl3pPr>
+            <a:lvl4pPr marL="1600200" indent="-228600" algn="l" defTabSz="914400" rtl="0" eaLnBrk="1" latinLnBrk="0" hangingPunct="1">
+              <a:lnSpc>
+                <a:spcPct val="85000"/>
+              </a:lnSpc>
+              <a:spcBef>
+                <a:spcPts val="600"/>
+              </a:spcBef>
+              <a:buSzPct val="80000"/>
+              <a:buFont typeface="Courier New" panose="02070309020205020404" pitchFamily="49" charset="0"/>
+              <a:buChar char="o"/>
+              <a:defRPr sz="2000" kern="1200">
+                <a:solidFill>
+                  <a:schemeClr val="tx1">
+                    <a:lumMod val="85000"/>
+                    <a:lumOff val="15000"/>
+                  </a:schemeClr>
+                </a:solidFill>
+                <a:latin typeface="+mn-lt"/>
+                <a:ea typeface="+mn-ea"/>
+                <a:cs typeface="+mn-cs"/>
+              </a:defRPr>
+            </a:lvl4pPr>
+            <a:lvl5pPr marL="2057400" indent="-228600" algn="l" defTabSz="914400" rtl="0" eaLnBrk="1" latinLnBrk="0" hangingPunct="1">
+              <a:lnSpc>
+                <a:spcPct val="85000"/>
+              </a:lnSpc>
+              <a:spcBef>
+                <a:spcPts val="600"/>
+              </a:spcBef>
+              <a:buFont typeface="Arial" panose="020B0604020202020204" pitchFamily="34" charset="0"/>
+              <a:buChar char="•"/>
+              <a:defRPr sz="1800" kern="1200">
+                <a:solidFill>
+                  <a:schemeClr val="tx1">
+                    <a:lumMod val="85000"/>
+                    <a:lumOff val="15000"/>
+                  </a:schemeClr>
+                </a:solidFill>
+                <a:latin typeface="+mn-lt"/>
+                <a:ea typeface="+mn-ea"/>
+                <a:cs typeface="+mn-cs"/>
+              </a:defRPr>
+            </a:lvl5pPr>
+            <a:lvl6pPr marL="1200000" indent="-228600" algn="l" defTabSz="914400" rtl="0" eaLnBrk="1" latinLnBrk="0" hangingPunct="1">
+              <a:lnSpc>
+                <a:spcPct val="85000"/>
+              </a:lnSpc>
+              <a:spcBef>
+                <a:spcPts val="600"/>
+              </a:spcBef>
+              <a:buFont typeface="Arial" pitchFamily="34" charset="0"/>
+              <a:buChar char=" "/>
+              <a:defRPr sz="1800" kern="1200">
+                <a:solidFill>
+                  <a:schemeClr val="tx1">
+                    <a:lumMod val="85000"/>
+                    <a:lumOff val="15000"/>
+                  </a:schemeClr>
+                </a:solidFill>
+                <a:latin typeface="+mn-lt"/>
+                <a:ea typeface="+mn-ea"/>
+                <a:cs typeface="+mn-cs"/>
+              </a:defRPr>
+            </a:lvl6pPr>
+            <a:lvl7pPr marL="1400000" indent="-228600" algn="l" defTabSz="914400" rtl="0" eaLnBrk="1" latinLnBrk="0" hangingPunct="1">
+              <a:lnSpc>
+                <a:spcPct val="85000"/>
+              </a:lnSpc>
+              <a:spcBef>
+                <a:spcPts val="600"/>
+              </a:spcBef>
+              <a:buFont typeface="Arial" pitchFamily="34" charset="0"/>
+              <a:buChar char=" "/>
+              <a:defRPr sz="1800" kern="1200">
+                <a:solidFill>
+                  <a:schemeClr val="tx1">
+                    <a:lumMod val="85000"/>
+                    <a:lumOff val="15000"/>
+                  </a:schemeClr>
+                </a:solidFill>
+                <a:latin typeface="+mn-lt"/>
+                <a:ea typeface="+mn-ea"/>
+                <a:cs typeface="+mn-cs"/>
+              </a:defRPr>
+            </a:lvl7pPr>
+            <a:lvl8pPr marL="1600000" indent="-228600" algn="l" defTabSz="914400" rtl="0" eaLnBrk="1" latinLnBrk="0" hangingPunct="1">
+              <a:lnSpc>
+                <a:spcPct val="85000"/>
+              </a:lnSpc>
+              <a:spcBef>
+                <a:spcPts val="600"/>
+              </a:spcBef>
+              <a:buFont typeface="Arial" pitchFamily="34" charset="0"/>
+              <a:buChar char=" "/>
+              <a:defRPr sz="1800" kern="1200">
+                <a:solidFill>
+                  <a:schemeClr val="tx1">
+                    <a:lumMod val="85000"/>
+                    <a:lumOff val="15000"/>
+                  </a:schemeClr>
+                </a:solidFill>
+                <a:latin typeface="+mn-lt"/>
+                <a:ea typeface="+mn-ea"/>
+                <a:cs typeface="+mn-cs"/>
+              </a:defRPr>
+            </a:lvl8pPr>
+            <a:lvl9pPr marL="1800000" indent="-228600" algn="l" defTabSz="914400" rtl="0" eaLnBrk="1" latinLnBrk="0" hangingPunct="1">
+              <a:lnSpc>
+                <a:spcPct val="85000"/>
+              </a:lnSpc>
+              <a:spcBef>
+                <a:spcPts val="600"/>
+              </a:spcBef>
+              <a:buFont typeface="Arial" pitchFamily="34" charset="0"/>
+              <a:buChar char=" "/>
+              <a:defRPr sz="1800" kern="1200">
+                <a:solidFill>
+                  <a:schemeClr val="tx1">
+                    <a:lumMod val="85000"/>
+                    <a:lumOff val="15000"/>
+                  </a:schemeClr>
+                </a:solidFill>
+                <a:latin typeface="+mn-lt"/>
+                <a:ea typeface="+mn-ea"/>
+                <a:cs typeface="+mn-cs"/>
+              </a:defRPr>
+            </a:lvl9pPr>
+          </a:lstStyle>
+          <a:p>
+            <a:r>
+              <a:rPr lang="en-US" sz="2000" dirty="0"/>
+              <a:t>Cluster 1 showed high homogeneity (83.3% obese) but was small (n=12)</a:t>
+            </a:r>
+          </a:p>
+          <a:p>
+            <a:r>
+              <a:rPr lang="en-US" sz="2000" dirty="0"/>
+              <a:t>Cluster 7 showed poorest homogeneity (37.7% overweight, 36.2% obese, 24.6% healthy weight) and was also largest</a:t>
+            </a:r>
+          </a:p>
+          <a:p>
+            <a:r>
+              <a:rPr lang="en-US" sz="2000" dirty="0"/>
+              <a:t>Increasing </a:t>
+            </a:r>
+            <a:r>
+              <a:rPr lang="en-US" sz="2000" i="1" dirty="0"/>
+              <a:t>k</a:t>
+            </a:r>
+            <a:r>
+              <a:rPr lang="en-US" sz="2000" dirty="0"/>
+              <a:t> may help, particularly for Clusters 6 and 7 (they have areas of homogeneity that could be isolated with more clusters)</a:t>
+            </a:r>
+          </a:p>
+          <a:p>
+            <a:r>
+              <a:rPr lang="en-US" sz="2000" dirty="0"/>
+              <a:t>Dichotomizing BMI (overweight &amp; obese vs. others) may also be of use</a:t>
+            </a:r>
+          </a:p>
+        </p:txBody>
+      </p:sp>
+      <p:sp>
+        <p:nvSpPr>
+          <p:cNvPr id="4" name="Title 3">
+            <a:extLst>
+              <a:ext uri="{FF2B5EF4-FFF2-40B4-BE49-F238E27FC236}">
+                <a16:creationId xmlns:a16="http://schemas.microsoft.com/office/drawing/2014/main" id="{A1EDCC7D-D674-4934-8B85-570B1298810E}"/>
+              </a:ext>
+            </a:extLst>
+          </p:cNvPr>
+          <p:cNvSpPr>
+            <a:spLocks noGrp="1"/>
+          </p:cNvSpPr>
+          <p:nvPr>
+            <p:ph type="title"/>
+          </p:nvPr>
+        </p:nvSpPr>
+        <p:spPr/>
+        <p:txBody>
+          <a:bodyPr/>
+          <a:lstStyle/>
+          <a:p>
+            <a:r>
+              <a:rPr lang="en-US" dirty="0"/>
+              <a:t>INITIAL RESULTS, AGNES (</a:t>
+            </a:r>
+            <a:r>
+              <a:rPr lang="en-US" i="1" dirty="0"/>
+              <a:t>k</a:t>
+            </a:r>
+            <a:r>
+              <a:rPr lang="en-US" dirty="0"/>
+              <a:t> = 7)</a:t>
+            </a:r>
+          </a:p>
+        </p:txBody>
+      </p:sp>
+    </p:spTree>
+    <p:extLst>
+      <p:ext uri="{BB962C8B-B14F-4D97-AF65-F5344CB8AC3E}">
+        <p14:creationId xmlns:p14="http://schemas.microsoft.com/office/powerpoint/2010/main" val="3277929920"/>
+      </p:ext>
+    </p:extLst>
+  </p:cSld>
+  <p:clrMapOvr>
+    <a:masterClrMapping/>
+  </p:clrMapOvr>
+</p:sld>
+</file>
+
+<file path=ppt/slides/slide13.xml><?xml version="1.0" encoding="utf-8"?>
+<p:sld xmlns:a="http://schemas.openxmlformats.org/drawingml/2006/main" xmlns:r="http://schemas.openxmlformats.org/officeDocument/2006/relationships" xmlns:p="http://schemas.openxmlformats.org/presentationml/2006/main">
+  <p:cSld>
+    <p:spTree>
+      <p:nvGrpSpPr>
+        <p:cNvPr id="1" name=""/>
+        <p:cNvGrpSpPr/>
+        <p:nvPr/>
+      </p:nvGrpSpPr>
+      <p:grpSpPr>
+        <a:xfrm>
+          <a:off x="0" y="0"/>
+          <a:ext cx="0" cy="0"/>
+          <a:chOff x="0" y="0"/>
+          <a:chExt cx="0" cy="0"/>
+        </a:xfrm>
+      </p:grpSpPr>
+      <p:pic>
+        <p:nvPicPr>
+          <p:cNvPr id="8" name="Content Placeholder 7">
+            <a:extLst>
+              <a:ext uri="{FF2B5EF4-FFF2-40B4-BE49-F238E27FC236}">
+                <a16:creationId xmlns:a16="http://schemas.microsoft.com/office/drawing/2014/main" id="{7539105E-6BE9-4309-8D06-35A4EDEDA34E}"/>
+              </a:ext>
+            </a:extLst>
+          </p:cNvPr>
+          <p:cNvPicPr>
+            <a:picLocks noGrp="1" noChangeAspect="1"/>
+          </p:cNvPicPr>
+          <p:nvPr>
+            <p:ph idx="1"/>
+          </p:nvPr>
+        </p:nvPicPr>
+        <p:blipFill>
+          <a:blip r:embed="rId2"/>
+          <a:stretch>
+            <a:fillRect/>
+          </a:stretch>
+        </p:blipFill>
+        <p:spPr>
+          <a:xfrm>
+            <a:off x="6264822" y="182880"/>
+            <a:ext cx="5529756" cy="5314310"/>
+          </a:xfrm>
+        </p:spPr>
+      </p:pic>
+      <p:pic>
+        <p:nvPicPr>
+          <p:cNvPr id="10" name="Graphic 9">
+            <a:extLst>
+              <a:ext uri="{FF2B5EF4-FFF2-40B4-BE49-F238E27FC236}">
+                <a16:creationId xmlns:a16="http://schemas.microsoft.com/office/drawing/2014/main" id="{670A668A-0891-4EF3-BBD9-795B86C81679}"/>
+              </a:ext>
+            </a:extLst>
+          </p:cNvPr>
+          <p:cNvPicPr>
+            <a:picLocks noChangeAspect="1"/>
+          </p:cNvPicPr>
+          <p:nvPr/>
+        </p:nvPicPr>
+        <p:blipFill>
+          <a:blip r:embed="rId3"/>
+          <a:stretch>
+            <a:fillRect/>
+          </a:stretch>
+        </p:blipFill>
+        <p:spPr>
+          <a:xfrm>
+            <a:off x="10584047" y="5433116"/>
+            <a:ext cx="1372965" cy="1240403"/>
+          </a:xfrm>
+          <a:prstGeom prst="rect">
+            <a:avLst/>
+          </a:prstGeom>
+        </p:spPr>
+      </p:pic>
+      <p:graphicFrame>
+        <p:nvGraphicFramePr>
+          <p:cNvPr id="11" name="Table 10">
+            <a:extLst>
+              <a:ext uri="{FF2B5EF4-FFF2-40B4-BE49-F238E27FC236}">
+                <a16:creationId xmlns:a16="http://schemas.microsoft.com/office/drawing/2014/main" id="{08270A69-1614-4D5D-AC1E-88E4DB4B0177}"/>
+              </a:ext>
+            </a:extLst>
+          </p:cNvPr>
+          <p:cNvGraphicFramePr>
+            <a:graphicFrameLocks noGrp="1"/>
+          </p:cNvGraphicFramePr>
+          <p:nvPr>
+            <p:extLst>
+              <p:ext uri="{D42A27DB-BD31-4B8C-83A1-F6EECF244321}">
+                <p14:modId xmlns:p14="http://schemas.microsoft.com/office/powerpoint/2010/main" val="713576055"/>
+              </p:ext>
+            </p:extLst>
+          </p:nvPr>
+        </p:nvGraphicFramePr>
+        <p:xfrm>
+          <a:off x="156066" y="4880344"/>
+          <a:ext cx="6234224" cy="1787156"/>
+        </p:xfrm>
+        <a:graphic>
+          <a:graphicData uri="http://schemas.openxmlformats.org/drawingml/2006/table">
+            <a:tbl>
+              <a:tblPr firstRow="1" bandRow="1">
+                <a:tableStyleId>{5C22544A-7EE6-4342-B048-85BDC9FD1C3A}</a:tableStyleId>
+              </a:tblPr>
+              <a:tblGrid>
+                <a:gridCol w="593040">
+                  <a:extLst>
+                    <a:ext uri="{9D8B030D-6E8A-4147-A177-3AD203B41FA5}">
+                      <a16:colId xmlns:a16="http://schemas.microsoft.com/office/drawing/2014/main" val="997632948"/>
+                    </a:ext>
+                  </a:extLst>
+                </a:gridCol>
+                <a:gridCol w="605529">
+                  <a:extLst>
+                    <a:ext uri="{9D8B030D-6E8A-4147-A177-3AD203B41FA5}">
+                      <a16:colId xmlns:a16="http://schemas.microsoft.com/office/drawing/2014/main" val="654047492"/>
+                    </a:ext>
+                  </a:extLst>
+                </a:gridCol>
+                <a:gridCol w="1348104">
+                  <a:extLst>
+                    <a:ext uri="{9D8B030D-6E8A-4147-A177-3AD203B41FA5}">
+                      <a16:colId xmlns:a16="http://schemas.microsoft.com/office/drawing/2014/main" val="2209490111"/>
+                    </a:ext>
+                  </a:extLst>
+                </a:gridCol>
+                <a:gridCol w="1490535">
+                  <a:extLst>
+                    <a:ext uri="{9D8B030D-6E8A-4147-A177-3AD203B41FA5}">
+                      <a16:colId xmlns:a16="http://schemas.microsoft.com/office/drawing/2014/main" val="807552395"/>
+                    </a:ext>
+                  </a:extLst>
+                </a:gridCol>
+                <a:gridCol w="1257636">
+                  <a:extLst>
+                    <a:ext uri="{9D8B030D-6E8A-4147-A177-3AD203B41FA5}">
+                      <a16:colId xmlns:a16="http://schemas.microsoft.com/office/drawing/2014/main" val="4127109187"/>
+                    </a:ext>
+                  </a:extLst>
+                </a:gridCol>
+                <a:gridCol w="939380">
+                  <a:extLst>
+                    <a:ext uri="{9D8B030D-6E8A-4147-A177-3AD203B41FA5}">
+                      <a16:colId xmlns:a16="http://schemas.microsoft.com/office/drawing/2014/main" val="2258230400"/>
+                    </a:ext>
+                  </a:extLst>
+                </a:gridCol>
+              </a:tblGrid>
+              <a:tr h="220092">
+                <a:tc>
+                  <a:txBody>
+                    <a:bodyPr/>
+                    <a:lstStyle/>
+                    <a:p>
+                      <a:r>
+                        <a:rPr lang="en-US" sz="1250" dirty="0">
+                          <a:solidFill>
+                            <a:schemeClr val="tx1"/>
+                          </a:solidFill>
+                        </a:rPr>
+                        <a:t>Cluster</a:t>
+                      </a:r>
+                    </a:p>
+                  </a:txBody>
+                  <a:tcPr marL="64809" marR="64809" marT="32404" marB="32404" anchor="b">
+                    <a:lnB w="12700" cap="flat" cmpd="sng" algn="ctr">
+                      <a:solidFill>
+                        <a:schemeClr val="tx1"/>
+                      </a:solidFill>
+                      <a:prstDash val="solid"/>
+                      <a:round/>
+                      <a:headEnd type="none" w="med" len="med"/>
+                      <a:tailEnd type="none" w="med" len="med"/>
+                    </a:lnB>
+                    <a:noFill/>
+                  </a:tcPr>
+                </a:tc>
+                <a:tc>
+                  <a:txBody>
+                    <a:bodyPr/>
+                    <a:lstStyle/>
+                    <a:p>
+                      <a:r>
+                        <a:rPr lang="en-US" sz="1250" dirty="0">
+                          <a:solidFill>
+                            <a:schemeClr val="tx1"/>
+                          </a:solidFill>
+                        </a:rPr>
+                        <a:t>Size (n)</a:t>
+                      </a:r>
+                    </a:p>
+                  </a:txBody>
+                  <a:tcPr marL="64809" marR="64809" marT="32404" marB="32404" anchor="b">
+                    <a:lnB w="12700" cap="flat" cmpd="sng" algn="ctr">
+                      <a:solidFill>
+                        <a:schemeClr val="tx1"/>
+                      </a:solidFill>
+                      <a:prstDash val="solid"/>
+                      <a:round/>
+                      <a:headEnd type="none" w="med" len="med"/>
+                      <a:tailEnd type="none" w="med" len="med"/>
+                    </a:lnB>
+                    <a:noFill/>
+                  </a:tcPr>
+                </a:tc>
+                <a:tc>
+                  <a:txBody>
+                    <a:bodyPr/>
+                    <a:lstStyle/>
+                    <a:p>
+                      <a:r>
+                        <a:rPr lang="en-US" sz="1250" dirty="0">
+                          <a:solidFill>
+                            <a:schemeClr val="tx1"/>
+                          </a:solidFill>
+                        </a:rPr>
+                        <a:t>Underweight (n, %)</a:t>
+                      </a:r>
+                    </a:p>
+                  </a:txBody>
+                  <a:tcPr marL="64809" marR="64809" marT="32404" marB="32404" anchor="b">
+                    <a:lnB w="12700" cap="flat" cmpd="sng" algn="ctr">
+                      <a:solidFill>
+                        <a:schemeClr val="tx1"/>
+                      </a:solidFill>
+                      <a:prstDash val="solid"/>
+                      <a:round/>
+                      <a:headEnd type="none" w="med" len="med"/>
+                      <a:tailEnd type="none" w="med" len="med"/>
+                    </a:lnB>
+                    <a:noFill/>
+                  </a:tcPr>
+                </a:tc>
+                <a:tc>
+                  <a:txBody>
+                    <a:bodyPr/>
+                    <a:lstStyle/>
+                    <a:p>
+                      <a:r>
+                        <a:rPr lang="en-US" sz="1250" dirty="0">
+                          <a:solidFill>
+                            <a:schemeClr val="tx1"/>
+                          </a:solidFill>
+                        </a:rPr>
+                        <a:t>Healthy Weight (n, %)</a:t>
+                      </a:r>
+                    </a:p>
+                  </a:txBody>
+                  <a:tcPr marL="64809" marR="64809" marT="32404" marB="32404" anchor="b">
+                    <a:lnB w="12700" cap="flat" cmpd="sng" algn="ctr">
+                      <a:solidFill>
+                        <a:schemeClr val="tx1"/>
+                      </a:solidFill>
+                      <a:prstDash val="solid"/>
+                      <a:round/>
+                      <a:headEnd type="none" w="med" len="med"/>
+                      <a:tailEnd type="none" w="med" len="med"/>
+                    </a:lnB>
+                    <a:noFill/>
+                  </a:tcPr>
+                </a:tc>
+                <a:tc>
+                  <a:txBody>
+                    <a:bodyPr/>
+                    <a:lstStyle/>
+                    <a:p>
+                      <a:r>
+                        <a:rPr lang="en-US" sz="1250" dirty="0">
+                          <a:solidFill>
+                            <a:schemeClr val="tx1"/>
+                          </a:solidFill>
+                        </a:rPr>
+                        <a:t>Overweight (n, %)</a:t>
+                      </a:r>
+                    </a:p>
+                  </a:txBody>
+                  <a:tcPr marL="64809" marR="64809" marT="32404" marB="32404" anchor="b">
+                    <a:lnB w="12700" cap="flat" cmpd="sng" algn="ctr">
+                      <a:solidFill>
+                        <a:schemeClr val="tx1"/>
+                      </a:solidFill>
+                      <a:prstDash val="solid"/>
+                      <a:round/>
+                      <a:headEnd type="none" w="med" len="med"/>
+                      <a:tailEnd type="none" w="med" len="med"/>
+                    </a:lnB>
+                    <a:noFill/>
+                  </a:tcPr>
+                </a:tc>
+                <a:tc>
+                  <a:txBody>
+                    <a:bodyPr/>
+                    <a:lstStyle/>
+                    <a:p>
+                      <a:r>
+                        <a:rPr lang="en-US" sz="1250" dirty="0">
+                          <a:solidFill>
+                            <a:schemeClr val="tx1"/>
+                          </a:solidFill>
+                        </a:rPr>
+                        <a:t>Obese (n, %)</a:t>
+                      </a:r>
+                    </a:p>
+                  </a:txBody>
+                  <a:tcPr marL="64809" marR="64809" marT="32404" marB="32404" anchor="b">
+                    <a:lnB w="12700" cap="flat" cmpd="sng" algn="ctr">
+                      <a:solidFill>
+                        <a:schemeClr val="tx1"/>
+                      </a:solidFill>
+                      <a:prstDash val="solid"/>
+                      <a:round/>
+                      <a:headEnd type="none" w="med" len="med"/>
+                      <a:tailEnd type="none" w="med" len="med"/>
+                    </a:lnB>
+                    <a:noFill/>
+                  </a:tcPr>
+                </a:tc>
+                <a:extLst>
+                  <a:ext uri="{0D108BD9-81ED-4DB2-BD59-A6C34878D82A}">
+                    <a16:rowId xmlns:a16="http://schemas.microsoft.com/office/drawing/2014/main" val="2979969401"/>
+                  </a:ext>
+                </a:extLst>
+              </a:tr>
+              <a:tr h="220092">
+                <a:tc>
+                  <a:txBody>
+                    <a:bodyPr/>
+                    <a:lstStyle/>
+                    <a:p>
+                      <a:pPr algn="ctr"/>
+                      <a:r>
+                        <a:rPr lang="en-US" sz="1250" b="1" dirty="0">
+                          <a:solidFill>
+                            <a:srgbClr val="3498DB"/>
+                          </a:solidFill>
+                        </a:rPr>
+                        <a:t>1</a:t>
+                      </a:r>
+                    </a:p>
+                  </a:txBody>
+                  <a:tcPr marL="64809" marR="64809" marT="32404" marB="32404" anchor="ctr">
+                    <a:lnT w="12700" cap="flat" cmpd="sng" algn="ctr">
+                      <a:solidFill>
+                        <a:schemeClr val="tx1"/>
+                      </a:solidFill>
+                      <a:prstDash val="solid"/>
+                      <a:round/>
+                      <a:headEnd type="none" w="med" len="med"/>
+                      <a:tailEnd type="none" w="med" len="med"/>
+                    </a:lnT>
+                    <a:noFill/>
+                  </a:tcPr>
+                </a:tc>
+                <a:tc>
+                  <a:txBody>
+                    <a:bodyPr/>
+                    <a:lstStyle/>
+                    <a:p>
+                      <a:pPr algn="ctr"/>
+                      <a:r>
+                        <a:rPr lang="en-US" sz="1250" dirty="0"/>
+                        <a:t>61</a:t>
+                      </a:r>
+                    </a:p>
+                  </a:txBody>
+                  <a:tcPr marL="64809" marR="64809" marT="32404" marB="32404" anchor="ctr">
+                    <a:lnT w="12700" cap="flat" cmpd="sng" algn="ctr">
+                      <a:solidFill>
+                        <a:schemeClr val="tx1"/>
+                      </a:solidFill>
+                      <a:prstDash val="solid"/>
+                      <a:round/>
+                      <a:headEnd type="none" w="med" len="med"/>
+                      <a:tailEnd type="none" w="med" len="med"/>
+                    </a:lnT>
+                    <a:noFill/>
+                  </a:tcPr>
+                </a:tc>
+                <a:tc>
+                  <a:txBody>
+                    <a:bodyPr/>
+                    <a:lstStyle/>
+                    <a:p>
+                      <a:pPr algn="r"/>
+                      <a:r>
+                        <a:rPr lang="en-US" sz="1250" dirty="0"/>
+                        <a:t>2 (3.3%)</a:t>
+                      </a:r>
+                    </a:p>
+                  </a:txBody>
+                  <a:tcPr marL="64809" marR="64809" marT="32404" marB="32404" anchor="ctr">
+                    <a:lnT w="12700" cap="flat" cmpd="sng" algn="ctr">
+                      <a:solidFill>
+                        <a:schemeClr val="tx1"/>
+                      </a:solidFill>
+                      <a:prstDash val="solid"/>
+                      <a:round/>
+                      <a:headEnd type="none" w="med" len="med"/>
+                      <a:tailEnd type="none" w="med" len="med"/>
+                    </a:lnT>
+                    <a:noFill/>
+                  </a:tcPr>
+                </a:tc>
+                <a:tc>
+                  <a:txBody>
+                    <a:bodyPr/>
+                    <a:lstStyle/>
+                    <a:p>
+                      <a:pPr algn="r"/>
+                      <a:r>
+                        <a:rPr lang="en-US" sz="1250" dirty="0"/>
+                        <a:t>22 (36.1%)</a:t>
+                      </a:r>
+                    </a:p>
+                  </a:txBody>
+                  <a:tcPr marL="64809" marR="64809" marT="32404" marB="32404" anchor="ctr">
+                    <a:lnT w="12700" cap="flat" cmpd="sng" algn="ctr">
+                      <a:solidFill>
+                        <a:schemeClr val="tx1"/>
+                      </a:solidFill>
+                      <a:prstDash val="solid"/>
+                      <a:round/>
+                      <a:headEnd type="none" w="med" len="med"/>
+                      <a:tailEnd type="none" w="med" len="med"/>
+                    </a:lnT>
+                    <a:noFill/>
+                  </a:tcPr>
+                </a:tc>
+                <a:tc>
+                  <a:txBody>
+                    <a:bodyPr/>
+                    <a:lstStyle/>
+                    <a:p>
+                      <a:pPr algn="r"/>
+                      <a:r>
+                        <a:rPr lang="en-US" sz="1250" dirty="0"/>
+                        <a:t>19 (31.1%)</a:t>
+                      </a:r>
+                    </a:p>
+                  </a:txBody>
+                  <a:tcPr marL="64809" marR="64809" marT="32404" marB="32404" anchor="ctr">
+                    <a:lnT w="12700" cap="flat" cmpd="sng" algn="ctr">
+                      <a:solidFill>
+                        <a:schemeClr val="tx1"/>
+                      </a:solidFill>
+                      <a:prstDash val="solid"/>
+                      <a:round/>
+                      <a:headEnd type="none" w="med" len="med"/>
+                      <a:tailEnd type="none" w="med" len="med"/>
+                    </a:lnT>
+                    <a:noFill/>
+                  </a:tcPr>
+                </a:tc>
+                <a:tc>
+                  <a:txBody>
+                    <a:bodyPr/>
+                    <a:lstStyle/>
+                    <a:p>
+                      <a:pPr algn="r"/>
+                      <a:r>
+                        <a:rPr lang="en-US" sz="1250" dirty="0"/>
+                        <a:t>18 (29.5%)</a:t>
+                      </a:r>
+                    </a:p>
+                  </a:txBody>
+                  <a:tcPr marL="64809" marR="64809" marT="32404" marB="32404" anchor="ctr">
+                    <a:lnT w="12700" cap="flat" cmpd="sng" algn="ctr">
+                      <a:solidFill>
+                        <a:schemeClr val="tx1"/>
+                      </a:solidFill>
+                      <a:prstDash val="solid"/>
+                      <a:round/>
+                      <a:headEnd type="none" w="med" len="med"/>
+                      <a:tailEnd type="none" w="med" len="med"/>
+                    </a:lnT>
+                    <a:noFill/>
+                  </a:tcPr>
+                </a:tc>
+                <a:extLst>
+                  <a:ext uri="{0D108BD9-81ED-4DB2-BD59-A6C34878D82A}">
+                    <a16:rowId xmlns:a16="http://schemas.microsoft.com/office/drawing/2014/main" val="63325010"/>
+                  </a:ext>
+                </a:extLst>
+              </a:tr>
+              <a:tr h="220092">
+                <a:tc>
+                  <a:txBody>
+                    <a:bodyPr/>
+                    <a:lstStyle/>
+                    <a:p>
+                      <a:pPr algn="ctr"/>
+                      <a:r>
+                        <a:rPr lang="en-US" sz="1250" b="1" dirty="0">
+                          <a:solidFill>
+                            <a:srgbClr val="28CC72"/>
+                          </a:solidFill>
+                        </a:rPr>
+                        <a:t>2</a:t>
+                      </a:r>
+                    </a:p>
+                  </a:txBody>
+                  <a:tcPr marL="64809" marR="64809" marT="32404" marB="32404" anchor="ctr">
+                    <a:noFill/>
+                  </a:tcPr>
+                </a:tc>
+                <a:tc>
+                  <a:txBody>
+                    <a:bodyPr/>
+                    <a:lstStyle/>
+                    <a:p>
+                      <a:pPr algn="ctr"/>
+                      <a:r>
+                        <a:rPr lang="en-US" sz="1250" dirty="0"/>
+                        <a:t>69</a:t>
+                      </a:r>
+                    </a:p>
+                  </a:txBody>
+                  <a:tcPr marL="64809" marR="64809" marT="32404" marB="32404" anchor="ctr">
+                    <a:noFill/>
+                  </a:tcPr>
+                </a:tc>
+                <a:tc>
+                  <a:txBody>
+                    <a:bodyPr/>
+                    <a:lstStyle/>
+                    <a:p>
+                      <a:pPr algn="r"/>
+                      <a:r>
+                        <a:rPr lang="en-US" sz="1250" dirty="0"/>
+                        <a:t>1 (1.4%)</a:t>
+                      </a:r>
+                    </a:p>
+                  </a:txBody>
+                  <a:tcPr marL="64809" marR="64809" marT="32404" marB="32404" anchor="ctr">
+                    <a:noFill/>
+                  </a:tcPr>
+                </a:tc>
+                <a:tc>
+                  <a:txBody>
+                    <a:bodyPr/>
+                    <a:lstStyle/>
+                    <a:p>
+                      <a:pPr algn="r"/>
+                      <a:r>
+                        <a:rPr lang="en-US" sz="1250" dirty="0"/>
+                        <a:t>23 (33.3%)</a:t>
+                      </a:r>
+                    </a:p>
+                  </a:txBody>
+                  <a:tcPr marL="64809" marR="64809" marT="32404" marB="32404" anchor="ctr">
+                    <a:noFill/>
+                  </a:tcPr>
+                </a:tc>
+                <a:tc>
+                  <a:txBody>
+                    <a:bodyPr/>
+                    <a:lstStyle/>
+                    <a:p>
+                      <a:pPr algn="r"/>
+                      <a:r>
+                        <a:rPr lang="en-US" sz="1250" dirty="0"/>
+                        <a:t>22 (31.9%)</a:t>
+                      </a:r>
+                    </a:p>
+                  </a:txBody>
+                  <a:tcPr marL="64809" marR="64809" marT="32404" marB="32404" anchor="ctr">
+                    <a:noFill/>
+                  </a:tcPr>
+                </a:tc>
+                <a:tc>
+                  <a:txBody>
+                    <a:bodyPr/>
+                    <a:lstStyle/>
+                    <a:p>
+                      <a:pPr algn="r"/>
+                      <a:r>
+                        <a:rPr lang="en-US" sz="1250" dirty="0"/>
+                        <a:t>23 (33.3%)</a:t>
+                      </a:r>
+                    </a:p>
+                  </a:txBody>
+                  <a:tcPr marL="64809" marR="64809" marT="32404" marB="32404" anchor="ctr">
+                    <a:noFill/>
+                  </a:tcPr>
+                </a:tc>
+                <a:extLst>
+                  <a:ext uri="{0D108BD9-81ED-4DB2-BD59-A6C34878D82A}">
+                    <a16:rowId xmlns:a16="http://schemas.microsoft.com/office/drawing/2014/main" val="1541275744"/>
+                  </a:ext>
+                </a:extLst>
+              </a:tr>
+              <a:tr h="220092">
+                <a:tc>
+                  <a:txBody>
+                    <a:bodyPr/>
+                    <a:lstStyle/>
+                    <a:p>
+                      <a:pPr algn="ctr"/>
+                      <a:r>
+                        <a:rPr lang="en-US" sz="1250" b="1" dirty="0">
+                          <a:solidFill>
+                            <a:srgbClr val="F39C12"/>
+                          </a:solidFill>
+                        </a:rPr>
+                        <a:t>3</a:t>
+                      </a:r>
+                    </a:p>
+                  </a:txBody>
+                  <a:tcPr marL="64809" marR="64809" marT="32404" marB="32404" anchor="ctr">
+                    <a:noFill/>
+                  </a:tcPr>
+                </a:tc>
+                <a:tc>
+                  <a:txBody>
+                    <a:bodyPr/>
+                    <a:lstStyle/>
+                    <a:p>
+                      <a:pPr algn="ctr"/>
+                      <a:r>
+                        <a:rPr lang="en-US" sz="1250" dirty="0"/>
+                        <a:t>28</a:t>
+                      </a:r>
+                    </a:p>
+                  </a:txBody>
+                  <a:tcPr marL="64809" marR="64809" marT="32404" marB="32404" anchor="ctr">
+                    <a:noFill/>
+                  </a:tcPr>
+                </a:tc>
+                <a:tc>
+                  <a:txBody>
+                    <a:bodyPr/>
+                    <a:lstStyle/>
+                    <a:p>
+                      <a:pPr algn="r"/>
+                      <a:r>
+                        <a:rPr lang="en-US" sz="1250" dirty="0"/>
+                        <a:t>0 (0%)</a:t>
+                      </a:r>
+                    </a:p>
+                  </a:txBody>
+                  <a:tcPr marL="64809" marR="64809" marT="32404" marB="32404" anchor="ctr">
+                    <a:noFill/>
+                  </a:tcPr>
+                </a:tc>
+                <a:tc>
+                  <a:txBody>
+                    <a:bodyPr/>
+                    <a:lstStyle/>
+                    <a:p>
+                      <a:pPr algn="r"/>
+                      <a:r>
+                        <a:rPr lang="en-US" sz="1250" dirty="0"/>
+                        <a:t>12 (42.9%)</a:t>
+                      </a:r>
+                    </a:p>
+                  </a:txBody>
+                  <a:tcPr marL="64809" marR="64809" marT="32404" marB="32404" anchor="ctr">
+                    <a:noFill/>
+                  </a:tcPr>
+                </a:tc>
+                <a:tc>
+                  <a:txBody>
+                    <a:bodyPr/>
+                    <a:lstStyle/>
+                    <a:p>
+                      <a:pPr algn="r"/>
+                      <a:r>
+                        <a:rPr lang="en-US" sz="1250" dirty="0"/>
+                        <a:t>15 (53.6%)</a:t>
+                      </a:r>
+                    </a:p>
+                  </a:txBody>
+                  <a:tcPr marL="64809" marR="64809" marT="32404" marB="32404" anchor="ctr">
+                    <a:noFill/>
+                  </a:tcPr>
+                </a:tc>
+                <a:tc>
+                  <a:txBody>
+                    <a:bodyPr/>
+                    <a:lstStyle/>
+                    <a:p>
+                      <a:pPr algn="r"/>
+                      <a:r>
+                        <a:rPr lang="en-US" sz="1250" dirty="0"/>
+                        <a:t>1 (3.6%)</a:t>
+                      </a:r>
+                    </a:p>
+                  </a:txBody>
+                  <a:tcPr marL="64809" marR="64809" marT="32404" marB="32404" anchor="ctr">
+                    <a:noFill/>
+                  </a:tcPr>
+                </a:tc>
+                <a:extLst>
+                  <a:ext uri="{0D108BD9-81ED-4DB2-BD59-A6C34878D82A}">
+                    <a16:rowId xmlns:a16="http://schemas.microsoft.com/office/drawing/2014/main" val="2265994310"/>
+                  </a:ext>
+                </a:extLst>
+              </a:tr>
+              <a:tr h="220092">
+                <a:tc>
+                  <a:txBody>
+                    <a:bodyPr/>
+                    <a:lstStyle/>
+                    <a:p>
+                      <a:pPr algn="ctr"/>
+                      <a:r>
+                        <a:rPr lang="en-US" sz="1250" b="1" dirty="0">
+                          <a:solidFill>
+                            <a:srgbClr val="E74C3C"/>
+                          </a:solidFill>
+                        </a:rPr>
+                        <a:t>4</a:t>
+                      </a:r>
+                    </a:p>
+                  </a:txBody>
+                  <a:tcPr marL="64809" marR="64809" marT="32404" marB="32404" anchor="ctr">
+                    <a:noFill/>
+                  </a:tcPr>
+                </a:tc>
+                <a:tc>
+                  <a:txBody>
+                    <a:bodyPr/>
+                    <a:lstStyle/>
+                    <a:p>
+                      <a:pPr algn="ctr"/>
+                      <a:r>
+                        <a:rPr lang="en-US" sz="1250" dirty="0"/>
+                        <a:t>22</a:t>
+                      </a:r>
+                    </a:p>
+                  </a:txBody>
+                  <a:tcPr marL="64809" marR="64809" marT="32404" marB="32404" anchor="ctr">
+                    <a:noFill/>
+                  </a:tcPr>
+                </a:tc>
+                <a:tc>
+                  <a:txBody>
+                    <a:bodyPr/>
+                    <a:lstStyle/>
+                    <a:p>
+                      <a:pPr algn="r"/>
+                      <a:r>
+                        <a:rPr lang="en-US" sz="1250" dirty="0"/>
+                        <a:t>0 (0%)</a:t>
+                      </a:r>
+                    </a:p>
+                  </a:txBody>
+                  <a:tcPr marL="64809" marR="64809" marT="32404" marB="32404" anchor="ctr">
+                    <a:noFill/>
+                  </a:tcPr>
+                </a:tc>
+                <a:tc>
+                  <a:txBody>
+                    <a:bodyPr/>
+                    <a:lstStyle/>
+                    <a:p>
+                      <a:pPr algn="r"/>
+                      <a:r>
+                        <a:rPr lang="en-US" sz="1250" dirty="0"/>
+                        <a:t>2 (9.1%)</a:t>
+                      </a:r>
+                    </a:p>
+                  </a:txBody>
+                  <a:tcPr marL="64809" marR="64809" marT="32404" marB="32404" anchor="ctr">
+                    <a:noFill/>
+                  </a:tcPr>
+                </a:tc>
+                <a:tc>
+                  <a:txBody>
+                    <a:bodyPr/>
+                    <a:lstStyle/>
+                    <a:p>
+                      <a:pPr algn="r"/>
+                      <a:r>
+                        <a:rPr lang="en-US" sz="1250" dirty="0"/>
+                        <a:t>6 (27.3%)</a:t>
+                      </a:r>
+                    </a:p>
+                  </a:txBody>
+                  <a:tcPr marL="64809" marR="64809" marT="32404" marB="32404" anchor="ctr">
+                    <a:noFill/>
+                  </a:tcPr>
+                </a:tc>
+                <a:tc>
+                  <a:txBody>
+                    <a:bodyPr/>
+                    <a:lstStyle/>
+                    <a:p>
+                      <a:pPr algn="r"/>
+                      <a:r>
+                        <a:rPr lang="en-US" sz="1250" dirty="0"/>
+                        <a:t>14 (63.6%)</a:t>
+                      </a:r>
+                    </a:p>
+                  </a:txBody>
+                  <a:tcPr marL="64809" marR="64809" marT="32404" marB="32404" anchor="ctr">
+                    <a:noFill/>
+                  </a:tcPr>
+                </a:tc>
+                <a:extLst>
+                  <a:ext uri="{0D108BD9-81ED-4DB2-BD59-A6C34878D82A}">
+                    <a16:rowId xmlns:a16="http://schemas.microsoft.com/office/drawing/2014/main" val="3407453536"/>
+                  </a:ext>
+                </a:extLst>
+              </a:tr>
+              <a:tr h="220092">
+                <a:tc>
+                  <a:txBody>
+                    <a:bodyPr/>
+                    <a:lstStyle/>
+                    <a:p>
+                      <a:pPr algn="ctr"/>
+                      <a:r>
+                        <a:rPr lang="en-US" sz="1250" b="1" dirty="0">
+                          <a:solidFill>
+                            <a:srgbClr val="D979C9"/>
+                          </a:solidFill>
+                        </a:rPr>
+                        <a:t>5</a:t>
+                      </a:r>
+                    </a:p>
+                  </a:txBody>
+                  <a:tcPr marL="64809" marR="64809" marT="32404" marB="32404" anchor="ctr">
+                    <a:noFill/>
+                  </a:tcPr>
+                </a:tc>
+                <a:tc>
+                  <a:txBody>
+                    <a:bodyPr/>
+                    <a:lstStyle/>
+                    <a:p>
+                      <a:pPr algn="ctr"/>
+                      <a:r>
+                        <a:rPr lang="en-US" sz="1250" dirty="0"/>
+                        <a:t>39</a:t>
+                      </a:r>
+                    </a:p>
+                  </a:txBody>
+                  <a:tcPr marL="64809" marR="64809" marT="32404" marB="32404" anchor="ctr">
+                    <a:noFill/>
+                  </a:tcPr>
+                </a:tc>
+                <a:tc>
+                  <a:txBody>
+                    <a:bodyPr/>
+                    <a:lstStyle/>
+                    <a:p>
+                      <a:pPr algn="r"/>
+                      <a:r>
+                        <a:rPr lang="en-US" sz="1250" dirty="0"/>
+                        <a:t>0 (0%)</a:t>
+                      </a:r>
+                    </a:p>
+                  </a:txBody>
+                  <a:tcPr marL="64809" marR="64809" marT="32404" marB="32404" anchor="ctr">
+                    <a:noFill/>
+                  </a:tcPr>
+                </a:tc>
+                <a:tc>
+                  <a:txBody>
+                    <a:bodyPr/>
+                    <a:lstStyle/>
+                    <a:p>
+                      <a:pPr algn="r"/>
+                      <a:r>
+                        <a:rPr lang="en-US" sz="1250" dirty="0"/>
+                        <a:t>2 (5.1%)</a:t>
+                      </a:r>
+                    </a:p>
+                  </a:txBody>
+                  <a:tcPr marL="64809" marR="64809" marT="32404" marB="32404" anchor="ctr">
+                    <a:noFill/>
+                  </a:tcPr>
+                </a:tc>
+                <a:tc>
+                  <a:txBody>
+                    <a:bodyPr/>
+                    <a:lstStyle/>
+                    <a:p>
+                      <a:pPr algn="r"/>
+                      <a:r>
+                        <a:rPr lang="en-US" sz="1250" dirty="0"/>
+                        <a:t>12 (30.8%)</a:t>
+                      </a:r>
+                    </a:p>
+                  </a:txBody>
+                  <a:tcPr marL="64809" marR="64809" marT="32404" marB="32404" anchor="ctr">
+                    <a:noFill/>
+                  </a:tcPr>
+                </a:tc>
+                <a:tc>
+                  <a:txBody>
+                    <a:bodyPr/>
+                    <a:lstStyle/>
+                    <a:p>
+                      <a:pPr algn="r"/>
+                      <a:r>
+                        <a:rPr lang="en-US" sz="1250" dirty="0"/>
+                        <a:t>25 (64.1%)</a:t>
+                      </a:r>
+                    </a:p>
+                  </a:txBody>
+                  <a:tcPr marL="64809" marR="64809" marT="32404" marB="32404" anchor="ctr">
+                    <a:noFill/>
+                  </a:tcPr>
+                </a:tc>
+                <a:extLst>
+                  <a:ext uri="{0D108BD9-81ED-4DB2-BD59-A6C34878D82A}">
+                    <a16:rowId xmlns:a16="http://schemas.microsoft.com/office/drawing/2014/main" val="940925462"/>
+                  </a:ext>
+                </a:extLst>
+              </a:tr>
+              <a:tr h="220092">
+                <a:tc>
+                  <a:txBody>
+                    <a:bodyPr/>
+                    <a:lstStyle/>
+                    <a:p>
+                      <a:pPr algn="ctr"/>
+                      <a:r>
+                        <a:rPr lang="en-US" sz="1250" b="1" dirty="0">
+                          <a:solidFill>
+                            <a:srgbClr val="9C59B6"/>
+                          </a:solidFill>
+                        </a:rPr>
+                        <a:t>6</a:t>
+                      </a:r>
+                    </a:p>
+                  </a:txBody>
+                  <a:tcPr marL="64809" marR="64809" marT="32404" marB="32404" anchor="ctr">
+                    <a:noFill/>
+                  </a:tcPr>
+                </a:tc>
+                <a:tc>
+                  <a:txBody>
+                    <a:bodyPr/>
+                    <a:lstStyle/>
+                    <a:p>
+                      <a:pPr algn="ctr"/>
+                      <a:r>
+                        <a:rPr lang="en-US" sz="1250" dirty="0"/>
+                        <a:t>22</a:t>
+                      </a:r>
+                    </a:p>
+                  </a:txBody>
+                  <a:tcPr marL="64809" marR="64809" marT="32404" marB="32404" anchor="ctr">
+                    <a:noFill/>
+                  </a:tcPr>
+                </a:tc>
+                <a:tc>
+                  <a:txBody>
+                    <a:bodyPr/>
+                    <a:lstStyle/>
+                    <a:p>
+                      <a:pPr algn="r"/>
+                      <a:r>
+                        <a:rPr lang="en-US" sz="1250" dirty="0"/>
+                        <a:t>0 (0%)</a:t>
+                      </a:r>
+                    </a:p>
+                  </a:txBody>
+                  <a:tcPr marL="64809" marR="64809" marT="32404" marB="32404" anchor="ctr">
+                    <a:noFill/>
+                  </a:tcPr>
+                </a:tc>
+                <a:tc>
+                  <a:txBody>
+                    <a:bodyPr/>
+                    <a:lstStyle/>
+                    <a:p>
+                      <a:pPr algn="r"/>
+                      <a:r>
+                        <a:rPr lang="en-US" sz="1250" dirty="0"/>
+                        <a:t>2 (9.1%)</a:t>
+                      </a:r>
+                    </a:p>
+                  </a:txBody>
+                  <a:tcPr marL="64809" marR="64809" marT="32404" marB="32404" anchor="ctr">
+                    <a:noFill/>
+                  </a:tcPr>
+                </a:tc>
+                <a:tc>
+                  <a:txBody>
+                    <a:bodyPr/>
+                    <a:lstStyle/>
+                    <a:p>
+                      <a:pPr algn="r"/>
+                      <a:r>
+                        <a:rPr lang="en-US" sz="1250" dirty="0"/>
+                        <a:t>3 (13.6%)</a:t>
+                      </a:r>
+                    </a:p>
+                  </a:txBody>
+                  <a:tcPr marL="64809" marR="64809" marT="32404" marB="32404" anchor="ctr">
+                    <a:noFill/>
+                  </a:tcPr>
+                </a:tc>
+                <a:tc>
+                  <a:txBody>
+                    <a:bodyPr/>
+                    <a:lstStyle/>
+                    <a:p>
+                      <a:pPr algn="r"/>
+                      <a:r>
+                        <a:rPr lang="en-US" sz="1250" dirty="0"/>
+                        <a:t>17 (77.3%)</a:t>
+                      </a:r>
+                    </a:p>
+                  </a:txBody>
+                  <a:tcPr marL="64809" marR="64809" marT="32404" marB="32404" anchor="ctr">
+                    <a:noFill/>
+                  </a:tcPr>
+                </a:tc>
+                <a:extLst>
+                  <a:ext uri="{0D108BD9-81ED-4DB2-BD59-A6C34878D82A}">
+                    <a16:rowId xmlns:a16="http://schemas.microsoft.com/office/drawing/2014/main" val="136471988"/>
+                  </a:ext>
+                </a:extLst>
+              </a:tr>
+            </a:tbl>
+          </a:graphicData>
+        </a:graphic>
+      </p:graphicFrame>
+      <p:sp>
+        <p:nvSpPr>
+          <p:cNvPr id="12" name="Content Placeholder 4">
+            <a:extLst>
+              <a:ext uri="{FF2B5EF4-FFF2-40B4-BE49-F238E27FC236}">
+                <a16:creationId xmlns:a16="http://schemas.microsoft.com/office/drawing/2014/main" id="{CD35816C-0351-4CA3-9753-36ED5869F8CD}"/>
+              </a:ext>
+            </a:extLst>
+          </p:cNvPr>
+          <p:cNvSpPr txBox="1">
+            <a:spLocks/>
+          </p:cNvSpPr>
+          <p:nvPr/>
+        </p:nvSpPr>
+        <p:spPr>
+          <a:xfrm>
+            <a:off x="476285" y="1358791"/>
+            <a:ext cx="5615740" cy="3223719"/>
+          </a:xfrm>
+          <a:prstGeom prst="rect">
+            <a:avLst/>
+          </a:prstGeom>
+        </p:spPr>
+        <p:txBody>
+          <a:bodyPr vert="horz" lIns="91440" tIns="45720" rIns="91440" bIns="45720" rtlCol="0">
+            <a:normAutofit/>
+          </a:bodyPr>
+          <a:lstStyle>
+            <a:lvl1pPr marL="228600" indent="-228600" algn="l" defTabSz="914400" rtl="0" eaLnBrk="1" latinLnBrk="0" hangingPunct="1">
+              <a:lnSpc>
+                <a:spcPct val="85000"/>
+              </a:lnSpc>
+              <a:spcBef>
+                <a:spcPts val="1300"/>
+              </a:spcBef>
+              <a:buFont typeface="Arial" panose="020B0604020202020204" pitchFamily="34" charset="0"/>
+              <a:buChar char="•"/>
+              <a:defRPr sz="2400" kern="1200">
+                <a:solidFill>
+                  <a:schemeClr val="tx1">
+                    <a:lumMod val="85000"/>
+                    <a:lumOff val="15000"/>
+                  </a:schemeClr>
+                </a:solidFill>
+                <a:latin typeface="+mn-lt"/>
+                <a:ea typeface="+mn-ea"/>
+                <a:cs typeface="+mn-cs"/>
+              </a:defRPr>
+            </a:lvl1pPr>
+            <a:lvl2pPr marL="685800" indent="-228600" algn="l" defTabSz="914400" rtl="0" eaLnBrk="1" latinLnBrk="0" hangingPunct="1">
+              <a:lnSpc>
+                <a:spcPct val="85000"/>
+              </a:lnSpc>
+              <a:spcBef>
+                <a:spcPts val="600"/>
+              </a:spcBef>
+              <a:buSzPct val="80000"/>
+              <a:buFont typeface="Courier New" panose="02070309020205020404" pitchFamily="49" charset="0"/>
+              <a:buChar char="o"/>
+              <a:defRPr sz="2400" kern="1200">
+                <a:solidFill>
+                  <a:schemeClr val="tx1">
+                    <a:lumMod val="85000"/>
+                    <a:lumOff val="15000"/>
+                  </a:schemeClr>
+                </a:solidFill>
+                <a:latin typeface="+mn-lt"/>
+                <a:ea typeface="+mn-ea"/>
+                <a:cs typeface="+mn-cs"/>
+              </a:defRPr>
+            </a:lvl2pPr>
+            <a:lvl3pPr marL="1143000" indent="-228600" algn="l" defTabSz="914400" rtl="0" eaLnBrk="1" latinLnBrk="0" hangingPunct="1">
+              <a:lnSpc>
+                <a:spcPct val="85000"/>
+              </a:lnSpc>
+              <a:spcBef>
+                <a:spcPts val="600"/>
+              </a:spcBef>
+              <a:buFont typeface="Arial" panose="020B0604020202020204" pitchFamily="34" charset="0"/>
+              <a:buChar char="•"/>
+              <a:defRPr sz="2000" i="0" kern="1200">
+                <a:solidFill>
+                  <a:schemeClr val="tx1">
+                    <a:lumMod val="85000"/>
+                    <a:lumOff val="15000"/>
+                  </a:schemeClr>
+                </a:solidFill>
+                <a:latin typeface="+mn-lt"/>
+                <a:ea typeface="+mn-ea"/>
+                <a:cs typeface="+mn-cs"/>
+              </a:defRPr>
+            </a:lvl3pPr>
+            <a:lvl4pPr marL="1600200" indent="-228600" algn="l" defTabSz="914400" rtl="0" eaLnBrk="1" latinLnBrk="0" hangingPunct="1">
+              <a:lnSpc>
+                <a:spcPct val="85000"/>
+              </a:lnSpc>
+              <a:spcBef>
+                <a:spcPts val="600"/>
+              </a:spcBef>
+              <a:buSzPct val="80000"/>
+              <a:buFont typeface="Courier New" panose="02070309020205020404" pitchFamily="49" charset="0"/>
+              <a:buChar char="o"/>
+              <a:defRPr sz="2000" kern="1200">
+                <a:solidFill>
+                  <a:schemeClr val="tx1">
+                    <a:lumMod val="85000"/>
+                    <a:lumOff val="15000"/>
+                  </a:schemeClr>
+                </a:solidFill>
+                <a:latin typeface="+mn-lt"/>
+                <a:ea typeface="+mn-ea"/>
+                <a:cs typeface="+mn-cs"/>
+              </a:defRPr>
+            </a:lvl4pPr>
+            <a:lvl5pPr marL="2057400" indent="-228600" algn="l" defTabSz="914400" rtl="0" eaLnBrk="1" latinLnBrk="0" hangingPunct="1">
+              <a:lnSpc>
+                <a:spcPct val="85000"/>
+              </a:lnSpc>
+              <a:spcBef>
+                <a:spcPts val="600"/>
+              </a:spcBef>
+              <a:buFont typeface="Arial" panose="020B0604020202020204" pitchFamily="34" charset="0"/>
+              <a:buChar char="•"/>
+              <a:defRPr sz="1800" kern="1200">
+                <a:solidFill>
+                  <a:schemeClr val="tx1">
+                    <a:lumMod val="85000"/>
+                    <a:lumOff val="15000"/>
+                  </a:schemeClr>
+                </a:solidFill>
+                <a:latin typeface="+mn-lt"/>
+                <a:ea typeface="+mn-ea"/>
+                <a:cs typeface="+mn-cs"/>
+              </a:defRPr>
+            </a:lvl5pPr>
+            <a:lvl6pPr marL="1200000" indent="-228600" algn="l" defTabSz="914400" rtl="0" eaLnBrk="1" latinLnBrk="0" hangingPunct="1">
+              <a:lnSpc>
+                <a:spcPct val="85000"/>
+              </a:lnSpc>
+              <a:spcBef>
+                <a:spcPts val="600"/>
+              </a:spcBef>
+              <a:buFont typeface="Arial" pitchFamily="34" charset="0"/>
+              <a:buChar char=" "/>
+              <a:defRPr sz="1800" kern="1200">
+                <a:solidFill>
+                  <a:schemeClr val="tx1">
+                    <a:lumMod val="85000"/>
+                    <a:lumOff val="15000"/>
+                  </a:schemeClr>
+                </a:solidFill>
+                <a:latin typeface="+mn-lt"/>
+                <a:ea typeface="+mn-ea"/>
+                <a:cs typeface="+mn-cs"/>
+              </a:defRPr>
+            </a:lvl6pPr>
+            <a:lvl7pPr marL="1400000" indent="-228600" algn="l" defTabSz="914400" rtl="0" eaLnBrk="1" latinLnBrk="0" hangingPunct="1">
+              <a:lnSpc>
+                <a:spcPct val="85000"/>
+              </a:lnSpc>
+              <a:spcBef>
+                <a:spcPts val="600"/>
+              </a:spcBef>
+              <a:buFont typeface="Arial" pitchFamily="34" charset="0"/>
+              <a:buChar char=" "/>
+              <a:defRPr sz="1800" kern="1200">
+                <a:solidFill>
+                  <a:schemeClr val="tx1">
+                    <a:lumMod val="85000"/>
+                    <a:lumOff val="15000"/>
+                  </a:schemeClr>
+                </a:solidFill>
+                <a:latin typeface="+mn-lt"/>
+                <a:ea typeface="+mn-ea"/>
+                <a:cs typeface="+mn-cs"/>
+              </a:defRPr>
+            </a:lvl7pPr>
+            <a:lvl8pPr marL="1600000" indent="-228600" algn="l" defTabSz="914400" rtl="0" eaLnBrk="1" latinLnBrk="0" hangingPunct="1">
+              <a:lnSpc>
+                <a:spcPct val="85000"/>
+              </a:lnSpc>
+              <a:spcBef>
+                <a:spcPts val="600"/>
+              </a:spcBef>
+              <a:buFont typeface="Arial" pitchFamily="34" charset="0"/>
+              <a:buChar char=" "/>
+              <a:defRPr sz="1800" kern="1200">
+                <a:solidFill>
+                  <a:schemeClr val="tx1">
+                    <a:lumMod val="85000"/>
+                    <a:lumOff val="15000"/>
+                  </a:schemeClr>
+                </a:solidFill>
+                <a:latin typeface="+mn-lt"/>
+                <a:ea typeface="+mn-ea"/>
+                <a:cs typeface="+mn-cs"/>
+              </a:defRPr>
+            </a:lvl8pPr>
+            <a:lvl9pPr marL="1800000" indent="-228600" algn="l" defTabSz="914400" rtl="0" eaLnBrk="1" latinLnBrk="0" hangingPunct="1">
+              <a:lnSpc>
+                <a:spcPct val="85000"/>
+              </a:lnSpc>
+              <a:spcBef>
+                <a:spcPts val="600"/>
+              </a:spcBef>
+              <a:buFont typeface="Arial" pitchFamily="34" charset="0"/>
+              <a:buChar char=" "/>
+              <a:defRPr sz="1800" kern="1200">
+                <a:solidFill>
+                  <a:schemeClr val="tx1">
+                    <a:lumMod val="85000"/>
+                    <a:lumOff val="15000"/>
+                  </a:schemeClr>
+                </a:solidFill>
+                <a:latin typeface="+mn-lt"/>
+                <a:ea typeface="+mn-ea"/>
+                <a:cs typeface="+mn-cs"/>
+              </a:defRPr>
+            </a:lvl9pPr>
+          </a:lstStyle>
+          <a:p>
+            <a:r>
+              <a:rPr lang="en-US" sz="2000" dirty="0"/>
+              <a:t>Cluster 6 was the most homogeneous with 17 (77.3%) obese</a:t>
+            </a:r>
+          </a:p>
+          <a:p>
+            <a:r>
+              <a:rPr lang="en-US" sz="2000" dirty="0"/>
+              <a:t>Clusters 4 and 5 also had reasonable homogeneity</a:t>
+            </a:r>
+          </a:p>
+          <a:p>
+            <a:r>
+              <a:rPr lang="en-US" sz="2000" dirty="0"/>
+              <a:t>Cluster 2 was the largest and most heterogeneous</a:t>
+            </a:r>
+          </a:p>
+          <a:p>
+            <a:r>
+              <a:rPr lang="en-US" sz="2000" dirty="0"/>
+              <a:t>Similar to the initial AGNES results, increasing </a:t>
+            </a:r>
+            <a:r>
+              <a:rPr lang="en-US" sz="2000" i="1" dirty="0"/>
+              <a:t>k</a:t>
+            </a:r>
+            <a:r>
+              <a:rPr lang="en-US" sz="2000" dirty="0"/>
+              <a:t> and/or dichotomizing BMI category may help</a:t>
+            </a:r>
+          </a:p>
+        </p:txBody>
+      </p:sp>
+      <p:sp>
+        <p:nvSpPr>
+          <p:cNvPr id="4" name="Title 3">
+            <a:extLst>
+              <a:ext uri="{FF2B5EF4-FFF2-40B4-BE49-F238E27FC236}">
+                <a16:creationId xmlns:a16="http://schemas.microsoft.com/office/drawing/2014/main" id="{A1EDCC7D-D674-4934-8B85-570B1298810E}"/>
+              </a:ext>
+            </a:extLst>
+          </p:cNvPr>
+          <p:cNvSpPr>
+            <a:spLocks noGrp="1"/>
+          </p:cNvSpPr>
+          <p:nvPr>
+            <p:ph type="title"/>
+          </p:nvPr>
+        </p:nvSpPr>
+        <p:spPr/>
+        <p:txBody>
+          <a:bodyPr/>
+          <a:lstStyle/>
+          <a:p>
+            <a:r>
+              <a:rPr lang="en-US" dirty="0"/>
+              <a:t>INITIAL RESULTS, DIANA (</a:t>
+            </a:r>
+            <a:r>
+              <a:rPr lang="en-US" i="1" dirty="0"/>
+              <a:t>k</a:t>
+            </a:r>
+            <a:r>
+              <a:rPr lang="en-US" dirty="0"/>
+              <a:t> = 6)</a:t>
+            </a:r>
+          </a:p>
+        </p:txBody>
+      </p:sp>
+    </p:spTree>
+    <p:extLst>
+      <p:ext uri="{BB962C8B-B14F-4D97-AF65-F5344CB8AC3E}">
+        <p14:creationId xmlns:p14="http://schemas.microsoft.com/office/powerpoint/2010/main" val="2145721999"/>
+      </p:ext>
+    </p:extLst>
+  </p:cSld>
+  <p:clrMapOvr>
+    <a:masterClrMapping/>
+  </p:clrMapOvr>
+</p:sld>
+</file>
+
+<file path=ppt/slides/slide14.xml><?xml version="1.0" encoding="utf-8"?>
+<p:sld xmlns:a="http://schemas.openxmlformats.org/drawingml/2006/main" xmlns:r="http://schemas.openxmlformats.org/officeDocument/2006/relationships" xmlns:p="http://schemas.openxmlformats.org/presentationml/2006/main">
+  <p:cSld>
+    <p:spTree>
+      <p:nvGrpSpPr>
+        <p:cNvPr id="1" name=""/>
+        <p:cNvGrpSpPr/>
+        <p:nvPr/>
+      </p:nvGrpSpPr>
+      <p:grpSpPr>
+        <a:xfrm>
+          <a:off x="0" y="0"/>
+          <a:ext cx="0" cy="0"/>
+          <a:chOff x="0" y="0"/>
+          <a:chExt cx="0" cy="0"/>
+        </a:xfrm>
+      </p:grpSpPr>
+      <p:sp>
+        <p:nvSpPr>
+          <p:cNvPr id="4" name="Title 3">
+            <a:extLst>
+              <a:ext uri="{FF2B5EF4-FFF2-40B4-BE49-F238E27FC236}">
+                <a16:creationId xmlns:a16="http://schemas.microsoft.com/office/drawing/2014/main" id="{A1EDCC7D-D674-4934-8B85-570B1298810E}"/>
+              </a:ext>
+            </a:extLst>
+          </p:cNvPr>
+          <p:cNvSpPr>
+            <a:spLocks noGrp="1"/>
+          </p:cNvSpPr>
+          <p:nvPr>
+            <p:ph type="title"/>
+          </p:nvPr>
+        </p:nvSpPr>
+        <p:spPr/>
+        <p:txBody>
+          <a:bodyPr/>
+          <a:lstStyle/>
+          <a:p>
+            <a:endParaRPr lang="en-US"/>
+          </a:p>
+        </p:txBody>
+      </p:sp>
+      <p:sp>
+        <p:nvSpPr>
+          <p:cNvPr id="5" name="Content Placeholder 4">
+            <a:extLst>
+              <a:ext uri="{FF2B5EF4-FFF2-40B4-BE49-F238E27FC236}">
+                <a16:creationId xmlns:a16="http://schemas.microsoft.com/office/drawing/2014/main" id="{2A27504C-7113-428D-B871-F4321379D089}"/>
+              </a:ext>
+            </a:extLst>
+          </p:cNvPr>
+          <p:cNvSpPr>
+            <a:spLocks noGrp="1"/>
+          </p:cNvSpPr>
+          <p:nvPr>
+            <p:ph idx="1"/>
+          </p:nvPr>
+        </p:nvSpPr>
+        <p:spPr>
+          <a:xfrm>
+            <a:off x="476285" y="1358791"/>
+            <a:ext cx="11213722" cy="5308709"/>
+          </a:xfrm>
+        </p:spPr>
+        <p:txBody>
+          <a:bodyPr/>
+          <a:lstStyle/>
+          <a:p>
+            <a:endParaRPr lang="en-US"/>
+          </a:p>
+        </p:txBody>
+      </p:sp>
+    </p:spTree>
+    <p:extLst>
+      <p:ext uri="{BB962C8B-B14F-4D97-AF65-F5344CB8AC3E}">
+        <p14:creationId xmlns:p14="http://schemas.microsoft.com/office/powerpoint/2010/main" val="3490891185"/>
+      </p:ext>
+    </p:extLst>
+  </p:cSld>
+  <p:clrMapOvr>
+    <a:masterClrMapping/>
+  </p:clrMapOvr>
+</p:sld>
+</file>
+
+<file path=ppt/slides/slide15.xml><?xml version="1.0" encoding="utf-8"?>
 <p:sld xmlns:a="http://schemas.openxmlformats.org/drawingml/2006/main" xmlns:r="http://schemas.openxmlformats.org/officeDocument/2006/relationships" xmlns:p="http://schemas.openxmlformats.org/presentationml/2006/main">
   <p:cSld>
     <p:spTree>
@@ -3891,7 +6807,7 @@
 </p:sld>
 </file>
 
-<file path=ppt/slides/slide13.xml><?xml version="1.0" encoding="utf-8"?>
+<file path=ppt/slides/slide16.xml><?xml version="1.0" encoding="utf-8"?>
 <p:sld xmlns:a="http://schemas.openxmlformats.org/drawingml/2006/main" xmlns:r="http://schemas.openxmlformats.org/officeDocument/2006/relationships" xmlns:p="http://schemas.openxmlformats.org/presentationml/2006/main">
   <p:cSld>
     <p:spTree>
@@ -4061,7 +6977,7 @@
 </p:sld>
 </file>
 
-<file path=ppt/slides/slide14.xml><?xml version="1.0" encoding="utf-8"?>
+<file path=ppt/slides/slide17.xml><?xml version="1.0" encoding="utf-8"?>
 <p:sld xmlns:a="http://schemas.openxmlformats.org/drawingml/2006/main" xmlns:r="http://schemas.openxmlformats.org/officeDocument/2006/relationships" xmlns:p="http://schemas.openxmlformats.org/presentationml/2006/main">
   <p:cSld>
     <p:spTree>
@@ -4189,7 +7105,7 @@
 </p:sld>
 </file>
 
-<file path=ppt/slides/slide15.xml><?xml version="1.0" encoding="utf-8"?>
+<file path=ppt/slides/slide18.xml><?xml version="1.0" encoding="utf-8"?>
 <p:sld xmlns:a="http://schemas.openxmlformats.org/drawingml/2006/main" xmlns:r="http://schemas.openxmlformats.org/officeDocument/2006/relationships" xmlns:p="http://schemas.openxmlformats.org/presentationml/2006/main">
   <p:cSld>
     <p:spTree>
@@ -4465,7 +7381,7 @@
 </p:sld>
 </file>
 
-<file path=ppt/slides/slide16.xml><?xml version="1.0" encoding="utf-8"?>
+<file path=ppt/slides/slide19.xml><?xml version="1.0" encoding="utf-8"?>
 <p:sld xmlns:a="http://schemas.openxmlformats.org/drawingml/2006/main" xmlns:r="http://schemas.openxmlformats.org/officeDocument/2006/relationships" xmlns:p="http://schemas.openxmlformats.org/presentationml/2006/main">
   <p:cSld>
     <p:spTree>
@@ -5273,7 +8189,7 @@
               <a:t>Used Wilcoxon RS tests at the </a:t>
             </a:r>
             <a:r>
-              <a:rPr lang="el-GR" dirty="0"/>
+              <a:rPr lang="el-GR" i="1" dirty="0"/>
               <a:t>α</a:t>
             </a:r>
             <a:r>
@@ -5397,7 +8313,7 @@
 </file>
 
 <file path=ppt/slides/slide6.xml><?xml version="1.0" encoding="utf-8"?>
-<p:sld xmlns:a="http://schemas.openxmlformats.org/drawingml/2006/main" xmlns:r="http://schemas.openxmlformats.org/officeDocument/2006/relationships" xmlns:p="http://schemas.openxmlformats.org/presentationml/2006/main">
+<p:sld xmlns:a="http://schemas.openxmlformats.org/drawingml/2006/main" xmlns:r="http://schemas.openxmlformats.org/officeDocument/2006/relationships" xmlns:p="http://schemas.openxmlformats.org/presentationml/2006/main" show="0">
   <p:cSld>
     <p:spTree>
       <p:nvGrpSpPr>
@@ -5606,48 +8522,6 @@
             <a:r>
               <a:rPr lang="en-US" sz="2400" dirty="0"/>
               <a:t>Dichotomized BMI (underweight &amp; healthy weight vs. overweight &amp; obese), reduced number of variables suspected to be most highly correlated with BMI, and reran analysis</a:t>
-            </a:r>
-          </a:p>
-        </p:txBody>
-      </p:sp>
-      <p:sp>
-        <p:nvSpPr>
-          <p:cNvPr id="4" name="TextBox 3">
-            <a:extLst>
-              <a:ext uri="{FF2B5EF4-FFF2-40B4-BE49-F238E27FC236}">
-                <a16:creationId xmlns:a16="http://schemas.microsoft.com/office/drawing/2014/main" id="{247B2A31-CC84-4EA2-B2B6-D57A86D398D9}"/>
-              </a:ext>
-            </a:extLst>
-          </p:cNvPr>
-          <p:cNvSpPr txBox="1"/>
-          <p:nvPr/>
-        </p:nvSpPr>
-        <p:spPr>
-          <a:xfrm>
-            <a:off x="8420431" y="326003"/>
-            <a:ext cx="3045350" cy="369332"/>
-          </a:xfrm>
-          <a:prstGeom prst="rect">
-            <a:avLst/>
-          </a:prstGeom>
-          <a:solidFill>
-            <a:srgbClr val="FF33CC"/>
-          </a:solidFill>
-        </p:spPr>
-        <p:txBody>
-          <a:bodyPr wrap="square" rtlCol="0">
-            <a:spAutoFit/>
-          </a:bodyPr>
-          <a:lstStyle/>
-          <a:p>
-            <a:pPr algn="ctr"/>
-            <a:r>
-              <a:rPr lang="en-US" b="1" dirty="0">
-                <a:solidFill>
-                  <a:schemeClr val="bg1"/>
-                </a:solidFill>
-              </a:rPr>
-              <a:t>ADD MORE DETAIL?</a:t>
             </a:r>
           </a:p>
         </p:txBody>
@@ -6529,7 +9403,7 @@
 </file>
 
 <file path=ppt/slides/slide9.xml><?xml version="1.0" encoding="utf-8"?>
-<p:sld xmlns:a="http://schemas.openxmlformats.org/drawingml/2006/main" xmlns:r="http://schemas.openxmlformats.org/officeDocument/2006/relationships" xmlns:p="http://schemas.openxmlformats.org/presentationml/2006/main">
+<p:sld xmlns:a="http://schemas.openxmlformats.org/drawingml/2006/main" xmlns:r="http://schemas.openxmlformats.org/officeDocument/2006/relationships" xmlns:p="http://schemas.openxmlformats.org/presentationml/2006/main" show="0">
   <p:cSld>
     <p:spTree>
       <p:nvGrpSpPr>

</xml_diff>

<commit_message>
Organizing presentation directory; minor edit to slides
</commit_message>
<xml_diff>
--- a/presentation/Prioli_presentation.pptx
+++ b/presentation/Prioli_presentation.pptx
@@ -14020,7 +14020,9 @@
           </a:xfrm>
         </p:spPr>
         <p:txBody>
-          <a:bodyPr/>
+          <a:bodyPr>
+            <a:normAutofit lnSpcReduction="10000"/>
+          </a:bodyPr>
           <a:lstStyle/>
           <a:p>
             <a:r>
@@ -14050,6 +14052,18 @@
               <a:rPr lang="en-US" baseline="30000" dirty="0"/>
               <a:t>7</a:t>
             </a:r>
+          </a:p>
+          <a:p>
+            <a:pPr lvl="1"/>
+            <a:r>
+              <a:rPr lang="en-US" dirty="0"/>
+              <a:t>ASW is a measure of dissimilarity between vs. within clusters based on a given </a:t>
+            </a:r>
+            <a:r>
+              <a:rPr lang="en-US" i="1" dirty="0"/>
+              <a:t>k</a:t>
+            </a:r>
+            <a:endParaRPr lang="en-US" dirty="0"/>
           </a:p>
           <a:p>
             <a:pPr lvl="1"/>

</xml_diff>

<commit_message>
Proofreading edits to report and slides
</commit_message>
<xml_diff>
--- a/presentation/Prioli_presentation.pptx
+++ b/presentation/Prioli_presentation.pptx
@@ -5,7 +5,7 @@
     <p:sldMasterId id="2147483726" r:id="rId1"/>
   </p:sldMasterIdLst>
   <p:notesMasterIdLst>
-    <p:notesMasterId r:id="rId25"/>
+    <p:notesMasterId r:id="rId22"/>
   </p:notesMasterIdLst>
   <p:sldIdLst>
     <p:sldId id="256" r:id="rId2"/>
@@ -28,9 +28,6 @@
     <p:sldId id="281" r:id="rId19"/>
     <p:sldId id="261" r:id="rId20"/>
     <p:sldId id="262" r:id="rId21"/>
-    <p:sldId id="303" r:id="rId22"/>
-    <p:sldId id="287" r:id="rId23"/>
-    <p:sldId id="297" r:id="rId24"/>
   </p:sldIdLst>
   <p:sldSz cx="12192000" cy="6858000"/>
   <p:notesSz cx="6858000" cy="9144000"/>
@@ -235,7 +232,7 @@
           <a:p>
             <a:fld id="{4EE169DE-67F4-4753-9B1C-F1A309C78068}" type="datetimeFigureOut">
               <a:rPr lang="en-US" smtClean="0"/>
-              <a:t>12/1/2019</a:t>
+              <a:t>12/2/2019</a:t>
             </a:fld>
             <a:endParaRPr lang="en-US"/>
           </a:p>
@@ -805,7 +802,7 @@
           <a:p>
             <a:fld id="{CF647BC4-379F-449B-8ACB-1D0356C51E22}" type="datetimeFigureOut">
               <a:rPr lang="en-US" smtClean="0"/>
-              <a:t>12/1/2019</a:t>
+              <a:t>12/2/2019</a:t>
             </a:fld>
             <a:endParaRPr lang="en-US"/>
           </a:p>
@@ -3489,14 +3486,14 @@
           <a:lstStyle/>
           <a:p>
             <a:r>
-              <a:rPr lang="en-US" sz="4400" dirty="0"/>
+              <a:rPr lang="en-US" sz="5200" dirty="0"/>
               <a:t>Understanding Correlates of Obesity:</a:t>
             </a:r>
             <a:br>
-              <a:rPr lang="en-US" sz="4400" dirty="0"/>
+              <a:rPr lang="en-US" sz="5200" dirty="0"/>
             </a:br>
             <a:r>
-              <a:rPr lang="en-US" sz="4400" dirty="0"/>
+              <a:rPr lang="en-US" sz="5200" dirty="0"/>
               <a:t>Hierarchical Clustering Approaches</a:t>
             </a:r>
           </a:p>
@@ -3534,7 +3531,7 @@
               </a:spcBef>
             </a:pPr>
             <a:r>
-              <a:rPr lang="en-US" sz="2800" dirty="0"/>
+              <a:rPr lang="en-US" dirty="0"/>
               <a:t>Katherine M. Prioli</a:t>
             </a:r>
           </a:p>
@@ -3548,7 +3545,7 @@
               </a:spcBef>
             </a:pPr>
             <a:r>
-              <a:rPr lang="en-US" sz="2800" dirty="0"/>
+              <a:rPr lang="en-US" dirty="0"/>
               <a:t>CSC 8515 Final Project</a:t>
             </a:r>
           </a:p>
@@ -3562,7 +3559,7 @@
               </a:spcBef>
             </a:pPr>
             <a:r>
-              <a:rPr lang="en-US" sz="2800" dirty="0"/>
+              <a:rPr lang="en-US" dirty="0"/>
               <a:t>December 05, 2019</a:t>
             </a:r>
           </a:p>
@@ -10179,7 +10176,7 @@
                   <a:schemeClr val="tx1"/>
                 </a:solidFill>
               </a:rPr>
-              <a:t>Found a cluster which is predominantly not overweight or obese (Cluster 4)</a:t>
+              <a:t>Found a cluster which is predominantly Not Overweight or Obese (Cluster 4)</a:t>
             </a:r>
           </a:p>
         </p:txBody>
@@ -11917,7 +11914,7 @@
             </a:pPr>
             <a:r>
               <a:rPr lang="en-US" dirty="0"/>
-              <a:t>71.6% of American adults are overweight; 39.8 are obese%.</a:t>
+              <a:t>71.6% of American adults are overweight; 39.8 are obese%</a:t>
             </a:r>
             <a:r>
               <a:rPr lang="en-US" baseline="30000" dirty="0"/>
@@ -11933,7 +11930,7 @@
             </a:pPr>
             <a:r>
               <a:rPr lang="en-US" dirty="0"/>
-              <a:t>Obesity strongly correlates with increased morbidity and mortality.</a:t>
+              <a:t>Obesity strongly correlates with increased morbidity and mortality</a:t>
             </a:r>
             <a:r>
               <a:rPr lang="en-US" baseline="30000" dirty="0"/>
@@ -11949,7 +11946,7 @@
             </a:pPr>
             <a:r>
               <a:rPr lang="en-US" dirty="0"/>
-              <a:t>Economic burden of obesity is high, both for direct costs (e.g., healthcare utilization) and indirect costs (e.g., work productivity loss).</a:t>
+              <a:t>Economic burden of obesity is high, both for direct costs (e.g., healthcare utilization) and indirect costs (e.g., work productivity loss)</a:t>
             </a:r>
             <a:r>
               <a:rPr lang="en-US" baseline="30000" dirty="0"/>
@@ -11964,7 +11961,7 @@
             </a:pPr>
             <a:r>
               <a:rPr lang="en-US" dirty="0"/>
-              <a:t>The National Health and Nutrition Examination Survey (NHANES) is a biennial health surveillance study performed by the Centers for Disease Control and Prevention (CDC).</a:t>
+              <a:t>The National Health and Nutrition Examination Survey (NHANES) is a biennial health surveillance study performed by the Centers for Disease Control and Prevention (CDC)</a:t>
             </a:r>
           </a:p>
           <a:p>
@@ -12148,391 +12145,6 @@
     <p:extLst>
       <p:ext uri="{BB962C8B-B14F-4D97-AF65-F5344CB8AC3E}">
         <p14:creationId xmlns:p14="http://schemas.microsoft.com/office/powerpoint/2010/main" val="3235795678"/>
-      </p:ext>
-    </p:extLst>
-  </p:cSld>
-  <p:clrMapOvr>
-    <a:masterClrMapping/>
-  </p:clrMapOvr>
-</p:sld>
-</file>
-
-<file path=ppt/slides/slide21.xml><?xml version="1.0" encoding="utf-8"?>
-<p:sld xmlns:a="http://schemas.openxmlformats.org/drawingml/2006/main" xmlns:r="http://schemas.openxmlformats.org/officeDocument/2006/relationships" xmlns:p="http://schemas.openxmlformats.org/presentationml/2006/main" show="0">
-  <p:cSld>
-    <p:spTree>
-      <p:nvGrpSpPr>
-        <p:cNvPr id="1" name=""/>
-        <p:cNvGrpSpPr/>
-        <p:nvPr/>
-      </p:nvGrpSpPr>
-      <p:grpSpPr>
-        <a:xfrm>
-          <a:off x="0" y="0"/>
-          <a:ext cx="0" cy="0"/>
-          <a:chOff x="0" y="0"/>
-          <a:chExt cx="0" cy="0"/>
-        </a:xfrm>
-      </p:grpSpPr>
-      <p:sp>
-        <p:nvSpPr>
-          <p:cNvPr id="4" name="Title 3">
-            <a:extLst>
-              <a:ext uri="{FF2B5EF4-FFF2-40B4-BE49-F238E27FC236}">
-                <a16:creationId xmlns:a16="http://schemas.microsoft.com/office/drawing/2014/main" id="{9781CF48-75BE-434B-9AD7-20A301880895}"/>
-              </a:ext>
-            </a:extLst>
-          </p:cNvPr>
-          <p:cNvSpPr>
-            <a:spLocks noGrp="1"/>
-          </p:cNvSpPr>
-          <p:nvPr>
-            <p:ph type="title"/>
-          </p:nvPr>
-        </p:nvSpPr>
-        <p:spPr/>
-        <p:txBody>
-          <a:bodyPr>
-            <a:normAutofit/>
-          </a:bodyPr>
-          <a:lstStyle/>
-          <a:p>
-            <a:r>
-              <a:rPr lang="en-US" sz="6000" b="1" dirty="0">
-                <a:solidFill>
-                  <a:srgbClr val="58B6C0"/>
-                </a:solidFill>
-              </a:rPr>
-              <a:t>SUPPLEMENTAL SLIDES</a:t>
-            </a:r>
-          </a:p>
-        </p:txBody>
-      </p:sp>
-    </p:spTree>
-    <p:extLst>
-      <p:ext uri="{BB962C8B-B14F-4D97-AF65-F5344CB8AC3E}">
-        <p14:creationId xmlns:p14="http://schemas.microsoft.com/office/powerpoint/2010/main" val="40248472"/>
-      </p:ext>
-    </p:extLst>
-  </p:cSld>
-  <p:clrMapOvr>
-    <a:masterClrMapping/>
-  </p:clrMapOvr>
-</p:sld>
-</file>
-
-<file path=ppt/slides/slide22.xml><?xml version="1.0" encoding="utf-8"?>
-<p:sld xmlns:a="http://schemas.openxmlformats.org/drawingml/2006/main" xmlns:r="http://schemas.openxmlformats.org/officeDocument/2006/relationships" xmlns:p="http://schemas.openxmlformats.org/presentationml/2006/main" show="0">
-  <p:cSld>
-    <p:spTree>
-      <p:nvGrpSpPr>
-        <p:cNvPr id="1" name=""/>
-        <p:cNvGrpSpPr/>
-        <p:nvPr/>
-      </p:nvGrpSpPr>
-      <p:grpSpPr>
-        <a:xfrm>
-          <a:off x="0" y="0"/>
-          <a:ext cx="0" cy="0"/>
-          <a:chOff x="0" y="0"/>
-          <a:chExt cx="0" cy="0"/>
-        </a:xfrm>
-      </p:grpSpPr>
-      <p:sp>
-        <p:nvSpPr>
-          <p:cNvPr id="4" name="Title 3">
-            <a:extLst>
-              <a:ext uri="{FF2B5EF4-FFF2-40B4-BE49-F238E27FC236}">
-                <a16:creationId xmlns:a16="http://schemas.microsoft.com/office/drawing/2014/main" id="{9781CF48-75BE-434B-9AD7-20A301880895}"/>
-              </a:ext>
-            </a:extLst>
-          </p:cNvPr>
-          <p:cNvSpPr>
-            <a:spLocks noGrp="1"/>
-          </p:cNvSpPr>
-          <p:nvPr>
-            <p:ph type="title"/>
-          </p:nvPr>
-        </p:nvSpPr>
-        <p:spPr/>
-        <p:txBody>
-          <a:bodyPr>
-            <a:normAutofit/>
-          </a:bodyPr>
-          <a:lstStyle/>
-          <a:p>
-            <a:r>
-              <a:rPr lang="en-US" sz="6000" b="1" dirty="0">
-                <a:solidFill>
-                  <a:srgbClr val="58B6C0"/>
-                </a:solidFill>
-              </a:rPr>
-              <a:t>RANDOM FOREST</a:t>
-            </a:r>
-          </a:p>
-        </p:txBody>
-      </p:sp>
-    </p:spTree>
-    <p:extLst>
-      <p:ext uri="{BB962C8B-B14F-4D97-AF65-F5344CB8AC3E}">
-        <p14:creationId xmlns:p14="http://schemas.microsoft.com/office/powerpoint/2010/main" val="2678867874"/>
-      </p:ext>
-    </p:extLst>
-  </p:cSld>
-  <p:clrMapOvr>
-    <a:masterClrMapping/>
-  </p:clrMapOvr>
-</p:sld>
-</file>
-
-<file path=ppt/slides/slide23.xml><?xml version="1.0" encoding="utf-8"?>
-<p:sld xmlns:a="http://schemas.openxmlformats.org/drawingml/2006/main" xmlns:r="http://schemas.openxmlformats.org/officeDocument/2006/relationships" xmlns:p="http://schemas.openxmlformats.org/presentationml/2006/main" show="0">
-  <p:cSld>
-    <p:spTree>
-      <p:nvGrpSpPr>
-        <p:cNvPr id="1" name=""/>
-        <p:cNvGrpSpPr/>
-        <p:nvPr/>
-      </p:nvGrpSpPr>
-      <p:grpSpPr>
-        <a:xfrm>
-          <a:off x="0" y="0"/>
-          <a:ext cx="0" cy="0"/>
-          <a:chOff x="0" y="0"/>
-          <a:chExt cx="0" cy="0"/>
-        </a:xfrm>
-      </p:grpSpPr>
-      <p:sp>
-        <p:nvSpPr>
-          <p:cNvPr id="2" name="Title 1">
-            <a:extLst>
-              <a:ext uri="{FF2B5EF4-FFF2-40B4-BE49-F238E27FC236}">
-                <a16:creationId xmlns:a16="http://schemas.microsoft.com/office/drawing/2014/main" id="{7F4CC3D0-0CA1-49D1-A58D-ED170897A490}"/>
-              </a:ext>
-            </a:extLst>
-          </p:cNvPr>
-          <p:cNvSpPr>
-            <a:spLocks noGrp="1"/>
-          </p:cNvSpPr>
-          <p:nvPr>
-            <p:ph type="title"/>
-          </p:nvPr>
-        </p:nvSpPr>
-        <p:spPr/>
-        <p:txBody>
-          <a:bodyPr/>
-          <a:lstStyle/>
-          <a:p>
-            <a:r>
-              <a:rPr lang="en-US" dirty="0"/>
-              <a:t>METHODS</a:t>
-            </a:r>
-          </a:p>
-        </p:txBody>
-      </p:sp>
-      <p:sp>
-        <p:nvSpPr>
-          <p:cNvPr id="3" name="Content Placeholder 2">
-            <a:extLst>
-              <a:ext uri="{FF2B5EF4-FFF2-40B4-BE49-F238E27FC236}">
-                <a16:creationId xmlns:a16="http://schemas.microsoft.com/office/drawing/2014/main" id="{32F52577-0D70-4F76-A5F5-16B90F38E66F}"/>
-              </a:ext>
-            </a:extLst>
-          </p:cNvPr>
-          <p:cNvSpPr>
-            <a:spLocks noGrp="1"/>
-          </p:cNvSpPr>
-          <p:nvPr>
-            <p:ph idx="1"/>
-          </p:nvPr>
-        </p:nvSpPr>
-        <p:spPr>
-          <a:xfrm>
-            <a:off x="755373" y="1358790"/>
-            <a:ext cx="10934633" cy="5308709"/>
-          </a:xfrm>
-        </p:spPr>
-        <p:txBody>
-          <a:bodyPr>
-            <a:normAutofit/>
-          </a:bodyPr>
-          <a:lstStyle/>
-          <a:p>
-            <a:r>
-              <a:rPr lang="en-US" sz="2400" dirty="0"/>
-              <a:t>Classified data via </a:t>
-            </a:r>
-            <a:r>
-              <a:rPr lang="en-US" sz="2000" dirty="0" err="1">
-                <a:solidFill>
-                  <a:srgbClr val="1FC967"/>
-                </a:solidFill>
-                <a:latin typeface="Lucida Console" panose="020B0609040504020204" pitchFamily="49" charset="0"/>
-              </a:rPr>
-              <a:t>RandomForestClassifier</a:t>
-            </a:r>
-            <a:r>
-              <a:rPr lang="en-US" sz="2000" dirty="0">
-                <a:solidFill>
-                  <a:srgbClr val="1FC967"/>
-                </a:solidFill>
-                <a:latin typeface="Lucida Console" panose="020B0609040504020204" pitchFamily="49" charset="0"/>
-              </a:rPr>
-              <a:t>()</a:t>
-            </a:r>
-            <a:endParaRPr lang="en-US" sz="2400" dirty="0"/>
-          </a:p>
-          <a:p>
-            <a:pPr lvl="1"/>
-            <a:r>
-              <a:rPr lang="en-US" sz="2400" dirty="0"/>
-              <a:t>Used </a:t>
-            </a:r>
-            <a:r>
-              <a:rPr lang="en-US" sz="1800" dirty="0" err="1">
-                <a:solidFill>
-                  <a:srgbClr val="1FC967"/>
-                </a:solidFill>
-                <a:latin typeface="Lucida Console" panose="020B0609040504020204" pitchFamily="49" charset="0"/>
-              </a:rPr>
-              <a:t>RepeatedKFold</a:t>
-            </a:r>
-            <a:r>
-              <a:rPr lang="en-US" sz="1800" dirty="0">
-                <a:solidFill>
-                  <a:srgbClr val="1FC967"/>
-                </a:solidFill>
-                <a:latin typeface="Lucida Console" panose="020B0609040504020204" pitchFamily="49" charset="0"/>
-              </a:rPr>
-              <a:t>()</a:t>
-            </a:r>
-            <a:r>
-              <a:rPr lang="en-US" sz="2400" dirty="0"/>
-              <a:t> for </a:t>
-            </a:r>
-            <a:r>
-              <a:rPr lang="en-US" sz="2400" i="1" dirty="0"/>
-              <a:t>n</a:t>
-            </a:r>
-            <a:r>
-              <a:rPr lang="en-US" sz="2400" dirty="0"/>
-              <a:t> × </a:t>
-            </a:r>
-            <a:r>
-              <a:rPr lang="en-US" sz="2400" i="1" dirty="0"/>
-              <a:t>k</a:t>
-            </a:r>
-            <a:r>
-              <a:rPr lang="en-US" sz="2400" dirty="0"/>
-              <a:t>-fold </a:t>
-            </a:r>
-            <a:r>
-              <a:rPr lang="en-US" sz="2400" dirty="0" err="1"/>
-              <a:t>crossvalidation</a:t>
-            </a:r>
-            <a:endParaRPr lang="en-US" sz="2400" dirty="0"/>
-          </a:p>
-          <a:p>
-            <a:pPr lvl="1"/>
-            <a:r>
-              <a:rPr lang="en-US" sz="2400" dirty="0"/>
-              <a:t>Assessed mean model accuracy</a:t>
-            </a:r>
-          </a:p>
-          <a:p>
-            <a:pPr lvl="1"/>
-            <a:r>
-              <a:rPr lang="en-US" sz="2400" dirty="0"/>
-              <a:t>Tuned hyperparameters to maximize accuracy:</a:t>
-            </a:r>
-          </a:p>
-          <a:p>
-            <a:pPr lvl="2"/>
-            <a:r>
-              <a:rPr lang="en-US" sz="2000" i="1" dirty="0"/>
-              <a:t>n</a:t>
-            </a:r>
-            <a:r>
-              <a:rPr lang="en-US" sz="2000" dirty="0"/>
-              <a:t> (number of repeats)</a:t>
-            </a:r>
-          </a:p>
-          <a:p>
-            <a:pPr lvl="2"/>
-            <a:r>
-              <a:rPr lang="en-US" sz="2000" i="1" dirty="0"/>
-              <a:t>k</a:t>
-            </a:r>
-            <a:r>
-              <a:rPr lang="en-US" sz="2000" dirty="0"/>
-              <a:t> (number of splits)</a:t>
-            </a:r>
-            <a:endParaRPr lang="en-US" sz="2000" i="1" dirty="0"/>
-          </a:p>
-          <a:p>
-            <a:pPr lvl="2"/>
-            <a:r>
-              <a:rPr lang="en-US" sz="2000" dirty="0"/>
-              <a:t>Number of trees in the forest</a:t>
-            </a:r>
-          </a:p>
-          <a:p>
-            <a:pPr lvl="2"/>
-            <a:r>
-              <a:rPr lang="en-US" sz="2000" dirty="0"/>
-              <a:t>Minimum leaf size</a:t>
-            </a:r>
-          </a:p>
-          <a:p>
-            <a:pPr lvl="2"/>
-            <a:r>
-              <a:rPr lang="en-US" sz="2000" dirty="0"/>
-              <a:t>Maximum tree depth</a:t>
-            </a:r>
-          </a:p>
-          <a:p>
-            <a:pPr lvl="1"/>
-            <a:r>
-              <a:rPr lang="en-US" sz="2400" dirty="0"/>
-              <a:t>Dichotomized BMI (underweight &amp; healthy weight vs. overweight &amp; obese), reduced number of variables suspected to be most highly correlated with BMI, and reran analysis</a:t>
-            </a:r>
-          </a:p>
-        </p:txBody>
-      </p:sp>
-      <p:pic>
-        <p:nvPicPr>
-          <p:cNvPr id="5" name="Picture 4">
-            <a:extLst>
-              <a:ext uri="{FF2B5EF4-FFF2-40B4-BE49-F238E27FC236}">
-                <a16:creationId xmlns:a16="http://schemas.microsoft.com/office/drawing/2014/main" id="{8AB93484-9C18-410F-B1B1-E4040EF5DA9B}"/>
-              </a:ext>
-            </a:extLst>
-          </p:cNvPr>
-          <p:cNvPicPr>
-            <a:picLocks noChangeAspect="1"/>
-          </p:cNvPicPr>
-          <p:nvPr/>
-        </p:nvPicPr>
-        <p:blipFill>
-          <a:blip r:embed="rId2"/>
-          <a:stretch>
-            <a:fillRect/>
-          </a:stretch>
-        </p:blipFill>
-        <p:spPr>
-          <a:xfrm>
-            <a:off x="260696" y="1316736"/>
-            <a:ext cx="482596" cy="486830"/>
-          </a:xfrm>
-          <a:prstGeom prst="rect">
-            <a:avLst/>
-          </a:prstGeom>
-        </p:spPr>
-      </p:pic>
-    </p:spTree>
-    <p:extLst>
-      <p:ext uri="{BB962C8B-B14F-4D97-AF65-F5344CB8AC3E}">
-        <p14:creationId xmlns:p14="http://schemas.microsoft.com/office/powerpoint/2010/main" val="1667482573"/>
       </p:ext>
     </p:extLst>
   </p:cSld>

</xml_diff>

<commit_message>
Final tweaks to presentation slides
</commit_message>
<xml_diff>
--- a/presentation/Prioli_presentation.pptx
+++ b/presentation/Prioli_presentation.pptx
@@ -9,13 +9,13 @@
   </p:notesMasterIdLst>
   <p:sldIdLst>
     <p:sldId id="256" r:id="rId2"/>
-    <p:sldId id="257" r:id="rId3"/>
-    <p:sldId id="294" r:id="rId4"/>
+    <p:sldId id="294" r:id="rId3"/>
+    <p:sldId id="257" r:id="rId4"/>
     <p:sldId id="258" r:id="rId5"/>
     <p:sldId id="259" r:id="rId6"/>
-    <p:sldId id="296" r:id="rId7"/>
-    <p:sldId id="304" r:id="rId8"/>
-    <p:sldId id="260" r:id="rId9"/>
+    <p:sldId id="260" r:id="rId7"/>
+    <p:sldId id="296" r:id="rId8"/>
+    <p:sldId id="304" r:id="rId9"/>
     <p:sldId id="300" r:id="rId10"/>
     <p:sldId id="298" r:id="rId11"/>
     <p:sldId id="301" r:id="rId12"/>
@@ -232,7 +232,7 @@
           <a:p>
             <a:fld id="{4EE169DE-67F4-4753-9B1C-F1A309C78068}" type="datetimeFigureOut">
               <a:rPr lang="en-US" smtClean="0"/>
-              <a:t>12/2/2019</a:t>
+              <a:t>12/4/2019</a:t>
             </a:fld>
             <a:endParaRPr lang="en-US"/>
           </a:p>
@@ -572,7 +572,7 @@
           <a:p>
             <a:fld id="{40EDFAE6-A768-4BB7-B8BD-1839A89597C4}" type="slidenum">
               <a:rPr lang="en-US" smtClean="0"/>
-              <a:t>8</a:t>
+              <a:t>6</a:t>
             </a:fld>
             <a:endParaRPr lang="en-US"/>
           </a:p>
@@ -802,7 +802,7 @@
           <a:p>
             <a:fld id="{CF647BC4-379F-449B-8ACB-1D0356C51E22}" type="datetimeFigureOut">
               <a:rPr lang="en-US" smtClean="0"/>
-              <a:t>12/2/2019</a:t>
+              <a:t>12/4/2019</a:t>
             </a:fld>
             <a:endParaRPr lang="en-US"/>
           </a:p>
@@ -11823,7 +11823,7 @@
           <p:cNvPr id="2" name="Title 1">
             <a:extLst>
               <a:ext uri="{FF2B5EF4-FFF2-40B4-BE49-F238E27FC236}">
-                <a16:creationId xmlns:a16="http://schemas.microsoft.com/office/drawing/2014/main" id="{7F4CC3D0-0CA1-49D1-A58D-ED170897A490}"/>
+                <a16:creationId xmlns:a16="http://schemas.microsoft.com/office/drawing/2014/main" id="{4761F65D-9769-4D8B-ABF9-D3747C09B2AA}"/>
               </a:ext>
             </a:extLst>
           </p:cNvPr>
@@ -11841,171 +11841,80 @@
           <a:p>
             <a:r>
               <a:rPr lang="en-US" dirty="0"/>
-              <a:t>BACKGROUND</a:t>
+              <a:t>INCREASING NATIONAL OBESITY, 1985-2008</a:t>
+            </a:r>
+            <a:r>
+              <a:rPr lang="en-US" baseline="30000" dirty="0"/>
+              <a:t>*</a:t>
             </a:r>
           </a:p>
         </p:txBody>
       </p:sp>
-      <p:sp>
-        <p:nvSpPr>
-          <p:cNvPr id="3" name="Content Placeholder 2">
+      <p:pic>
+        <p:nvPicPr>
+          <p:cNvPr id="5" name="Picture 4">
             <a:extLst>
               <a:ext uri="{FF2B5EF4-FFF2-40B4-BE49-F238E27FC236}">
-                <a16:creationId xmlns:a16="http://schemas.microsoft.com/office/drawing/2014/main" id="{32F52577-0D70-4F76-A5F5-16B90F38E66F}"/>
+                <a16:creationId xmlns:a16="http://schemas.microsoft.com/office/drawing/2014/main" id="{5BA3643C-4C2B-4F51-8AFA-9427E79DF470}"/>
               </a:ext>
             </a:extLst>
           </p:cNvPr>
-          <p:cNvSpPr>
-            <a:spLocks noGrp="1"/>
-          </p:cNvSpPr>
-          <p:nvPr>
-            <p:ph idx="1"/>
-          </p:nvPr>
+          <p:cNvPicPr>
+            <a:picLocks noChangeAspect="1"/>
+          </p:cNvPicPr>
+          <p:nvPr/>
+        </p:nvPicPr>
+        <p:blipFill>
+          <a:blip r:embed="rId2"/>
+          <a:stretch>
+            <a:fillRect/>
+          </a:stretch>
+        </p:blipFill>
+        <p:spPr>
+          <a:xfrm>
+            <a:off x="2793202" y="1864579"/>
+            <a:ext cx="6605596" cy="3844458"/>
+          </a:xfrm>
+          <a:prstGeom prst="rect">
+            <a:avLst/>
+          </a:prstGeom>
+        </p:spPr>
+      </p:pic>
+      <p:sp>
+        <p:nvSpPr>
+          <p:cNvPr id="6" name="TextBox 5">
+            <a:extLst>
+              <a:ext uri="{FF2B5EF4-FFF2-40B4-BE49-F238E27FC236}">
+                <a16:creationId xmlns:a16="http://schemas.microsoft.com/office/drawing/2014/main" id="{BA2237E6-004B-46D6-BAC6-BCE0CF4D708D}"/>
+              </a:ext>
+            </a:extLst>
+          </p:cNvPr>
+          <p:cNvSpPr txBox="1"/>
+          <p:nvPr/>
         </p:nvSpPr>
-        <p:spPr/>
+        <p:spPr>
+          <a:xfrm>
+            <a:off x="354917" y="6359723"/>
+            <a:ext cx="11487497" cy="307777"/>
+          </a:xfrm>
+          <a:prstGeom prst="rect">
+            <a:avLst/>
+          </a:prstGeom>
+          <a:noFill/>
+        </p:spPr>
         <p:txBody>
-          <a:bodyPr>
-            <a:normAutofit fontScale="92500" lnSpcReduction="10000"/>
+          <a:bodyPr wrap="square" rtlCol="0">
+            <a:spAutoFit/>
           </a:bodyPr>
           <a:lstStyle/>
           <a:p>
-            <a:pPr>
-              <a:lnSpc>
-                <a:spcPct val="100000"/>
-              </a:lnSpc>
-            </a:pPr>
-            <a:r>
-              <a:rPr lang="en-US" dirty="0"/>
-              <a:t>Overweight and obesity are growing public health concerns</a:t>
-            </a:r>
-          </a:p>
-          <a:p>
-            <a:pPr lvl="1">
-              <a:lnSpc>
-                <a:spcPct val="100000"/>
-              </a:lnSpc>
-            </a:pPr>
-            <a:r>
-              <a:rPr lang="en-US" dirty="0"/>
-              <a:t>Obesity is defined as body mass index (BMI) ≥ 30 </a:t>
-            </a:r>
-            <a:r>
-              <a:rPr lang="en-US" i="1" dirty="0"/>
-              <a:t>kg</a:t>
-            </a:r>
-            <a:r>
-              <a:rPr lang="en-US" dirty="0"/>
-              <a:t>/</a:t>
-            </a:r>
-            <a:r>
-              <a:rPr lang="en-US" i="1" dirty="0"/>
-              <a:t>m</a:t>
-            </a:r>
-            <a:r>
-              <a:rPr lang="en-US" baseline="30000" dirty="0"/>
-              <a:t>2</a:t>
-            </a:r>
-          </a:p>
-          <a:p>
-            <a:pPr lvl="1">
-              <a:lnSpc>
-                <a:spcPct val="100000"/>
-              </a:lnSpc>
-            </a:pPr>
-            <a:r>
-              <a:rPr lang="en-US" dirty="0"/>
-              <a:t>71.6% of American adults are overweight; 39.8 are obese%</a:t>
-            </a:r>
-            <a:r>
-              <a:rPr lang="en-US" baseline="30000" dirty="0"/>
-              <a:t>1</a:t>
-            </a:r>
-            <a:endParaRPr lang="en-US" dirty="0"/>
-          </a:p>
-          <a:p>
-            <a:pPr lvl="1">
-              <a:lnSpc>
-                <a:spcPct val="100000"/>
-              </a:lnSpc>
-            </a:pPr>
-            <a:r>
-              <a:rPr lang="en-US" dirty="0"/>
-              <a:t>Obesity strongly correlates with increased morbidity and mortality</a:t>
-            </a:r>
-            <a:r>
-              <a:rPr lang="en-US" baseline="30000" dirty="0"/>
-              <a:t>2</a:t>
-            </a:r>
-            <a:endParaRPr lang="en-US" dirty="0"/>
-          </a:p>
-          <a:p>
-            <a:pPr>
-              <a:lnSpc>
-                <a:spcPct val="100000"/>
-              </a:lnSpc>
-            </a:pPr>
-            <a:r>
-              <a:rPr lang="en-US" dirty="0"/>
-              <a:t>Economic burden of obesity is high, both for direct costs (e.g., healthcare utilization) and indirect costs (e.g., work productivity loss)</a:t>
-            </a:r>
-            <a:r>
-              <a:rPr lang="en-US" baseline="30000" dirty="0"/>
-              <a:t>3,4</a:t>
-            </a:r>
-          </a:p>
-          <a:p>
-            <a:pPr>
-              <a:lnSpc>
-                <a:spcPct val="100000"/>
-              </a:lnSpc>
-            </a:pPr>
-            <a:r>
-              <a:rPr lang="en-US" dirty="0"/>
-              <a:t>The National Health and Nutrition Examination Survey (NHANES) is a biennial health surveillance study performed by the Centers for Disease Control and Prevention (CDC)</a:t>
-            </a:r>
-          </a:p>
-          <a:p>
-            <a:pPr lvl="1">
-              <a:lnSpc>
-                <a:spcPct val="100000"/>
-              </a:lnSpc>
-            </a:pPr>
-            <a:r>
-              <a:rPr lang="en-US" dirty="0"/>
-              <a:t>Seeks to understand population-level health by gathering demographic, medical, mental health, and behavioral data</a:t>
-            </a:r>
-          </a:p>
-          <a:p>
-            <a:pPr lvl="1">
-              <a:lnSpc>
-                <a:spcPct val="100000"/>
-              </a:lnSpc>
-            </a:pPr>
-            <a:r>
-              <a:rPr lang="en-US" dirty="0"/>
-              <a:t>Data collection through self-report and physical examination</a:t>
-            </a:r>
-          </a:p>
-          <a:p>
-            <a:pPr lvl="1">
-              <a:lnSpc>
-                <a:spcPct val="100000"/>
-              </a:lnSpc>
-            </a:pPr>
-            <a:r>
-              <a:rPr lang="en-US" dirty="0"/>
-              <a:t>NHANES has uncovered some demographic correlates of obesity</a:t>
-            </a:r>
-          </a:p>
-          <a:p>
-            <a:pPr lvl="1">
-              <a:lnSpc>
-                <a:spcPct val="100000"/>
-              </a:lnSpc>
-            </a:pPr>
-            <a:r>
-              <a:rPr lang="en-US" dirty="0"/>
-              <a:t>Much remains unknown about the interactions of these correlates and how constellations of these correlates may be used to identify obesity at the population level</a:t>
+            <a:r>
+              <a:rPr lang="en-US" sz="1400" dirty="0"/>
+              <a:t>*CDC data, based on self-reported height and weight gathered on the Behavioral Risk Factor Surveillance annual survey; .gif from Wikimedia Commons</a:t>
+            </a:r>
+            <a:r>
+              <a:rPr lang="en-US" sz="1400" baseline="30000" dirty="0"/>
+              <a:t>5</a:t>
             </a:r>
           </a:p>
         </p:txBody>
@@ -12013,7 +11922,7 @@
     </p:spTree>
     <p:extLst>
       <p:ext uri="{BB962C8B-B14F-4D97-AF65-F5344CB8AC3E}">
-        <p14:creationId xmlns:p14="http://schemas.microsoft.com/office/powerpoint/2010/main" val="2720812227"/>
+        <p14:creationId xmlns:p14="http://schemas.microsoft.com/office/powerpoint/2010/main" val="2184420127"/>
       </p:ext>
     </p:extLst>
   </p:cSld>
@@ -12176,7 +12085,7 @@
           <p:cNvPr id="2" name="Title 1">
             <a:extLst>
               <a:ext uri="{FF2B5EF4-FFF2-40B4-BE49-F238E27FC236}">
-                <a16:creationId xmlns:a16="http://schemas.microsoft.com/office/drawing/2014/main" id="{4761F65D-9769-4D8B-ABF9-D3747C09B2AA}"/>
+                <a16:creationId xmlns:a16="http://schemas.microsoft.com/office/drawing/2014/main" id="{7F4CC3D0-0CA1-49D1-A58D-ED170897A490}"/>
               </a:ext>
             </a:extLst>
           </p:cNvPr>
@@ -12194,80 +12103,149 @@
           <a:p>
             <a:r>
               <a:rPr lang="en-US" dirty="0"/>
-              <a:t>INCREASING NATIONAL OBESITY, 1985-2008</a:t>
-            </a:r>
-            <a:r>
-              <a:rPr lang="en-US" baseline="30000" dirty="0"/>
-              <a:t>*</a:t>
+              <a:t>BACKGROUND</a:t>
             </a:r>
           </a:p>
         </p:txBody>
       </p:sp>
-      <p:pic>
-        <p:nvPicPr>
-          <p:cNvPr id="5" name="Picture 4">
+      <p:sp>
+        <p:nvSpPr>
+          <p:cNvPr id="3" name="Content Placeholder 2">
             <a:extLst>
               <a:ext uri="{FF2B5EF4-FFF2-40B4-BE49-F238E27FC236}">
-                <a16:creationId xmlns:a16="http://schemas.microsoft.com/office/drawing/2014/main" id="{5BA3643C-4C2B-4F51-8AFA-9427E79DF470}"/>
+                <a16:creationId xmlns:a16="http://schemas.microsoft.com/office/drawing/2014/main" id="{32F52577-0D70-4F76-A5F5-16B90F38E66F}"/>
               </a:ext>
             </a:extLst>
           </p:cNvPr>
-          <p:cNvPicPr>
-            <a:picLocks noChangeAspect="1"/>
-          </p:cNvPicPr>
-          <p:nvPr/>
-        </p:nvPicPr>
-        <p:blipFill>
-          <a:blip r:embed="rId2"/>
-          <a:stretch>
-            <a:fillRect/>
-          </a:stretch>
-        </p:blipFill>
-        <p:spPr>
-          <a:xfrm>
-            <a:off x="2793202" y="1864579"/>
-            <a:ext cx="6605596" cy="3844458"/>
-          </a:xfrm>
-          <a:prstGeom prst="rect">
-            <a:avLst/>
-          </a:prstGeom>
-        </p:spPr>
-      </p:pic>
-      <p:sp>
-        <p:nvSpPr>
-          <p:cNvPr id="6" name="TextBox 5">
-            <a:extLst>
-              <a:ext uri="{FF2B5EF4-FFF2-40B4-BE49-F238E27FC236}">
-                <a16:creationId xmlns:a16="http://schemas.microsoft.com/office/drawing/2014/main" id="{BA2237E6-004B-46D6-BAC6-BCE0CF4D708D}"/>
-              </a:ext>
-            </a:extLst>
-          </p:cNvPr>
-          <p:cNvSpPr txBox="1"/>
-          <p:nvPr/>
+          <p:cNvSpPr>
+            <a:spLocks noGrp="1"/>
+          </p:cNvSpPr>
+          <p:nvPr>
+            <p:ph idx="1"/>
+          </p:nvPr>
         </p:nvSpPr>
         <p:spPr>
           <a:xfrm>
-            <a:off x="354917" y="6359723"/>
-            <a:ext cx="11487497" cy="307777"/>
+            <a:off x="476285" y="1358791"/>
+            <a:ext cx="11213722" cy="5308709"/>
           </a:xfrm>
-          <a:prstGeom prst="rect">
-            <a:avLst/>
-          </a:prstGeom>
-          <a:noFill/>
         </p:spPr>
         <p:txBody>
-          <a:bodyPr wrap="square" rtlCol="0">
-            <a:spAutoFit/>
+          <a:bodyPr>
+            <a:normAutofit fontScale="92500" lnSpcReduction="10000"/>
           </a:bodyPr>
           <a:lstStyle/>
           <a:p>
-            <a:r>
-              <a:rPr lang="en-US" sz="1400" dirty="0"/>
-              <a:t>*CDC data, based on self-reported height and weight gathered on the Behavioral Risk Factor Surveillance annual survey; .gif from Wikimedia Commons</a:t>
-            </a:r>
-            <a:r>
-              <a:rPr lang="en-US" sz="1400" baseline="30000" dirty="0"/>
-              <a:t>5</a:t>
+            <a:pPr>
+              <a:lnSpc>
+                <a:spcPct val="100000"/>
+              </a:lnSpc>
+            </a:pPr>
+            <a:r>
+              <a:rPr lang="en-US" dirty="0"/>
+              <a:t>Overweight and obesity, defined by Body Mass Index (BMI), are growing public health concerns</a:t>
+            </a:r>
+          </a:p>
+          <a:p>
+            <a:pPr lvl="1">
+              <a:lnSpc>
+                <a:spcPct val="100000"/>
+              </a:lnSpc>
+            </a:pPr>
+            <a:r>
+              <a:rPr lang="en-US" dirty="0"/>
+              <a:t>71.6% of American adults are overweight; 39.8 are obese%</a:t>
+            </a:r>
+            <a:r>
+              <a:rPr lang="en-US" baseline="30000" dirty="0"/>
+              <a:t>1</a:t>
+            </a:r>
+            <a:endParaRPr lang="en-US" dirty="0"/>
+          </a:p>
+          <a:p>
+            <a:pPr lvl="1">
+              <a:lnSpc>
+                <a:spcPct val="100000"/>
+              </a:lnSpc>
+            </a:pPr>
+            <a:r>
+              <a:rPr lang="en-US" dirty="0"/>
+              <a:t>Obesity strongly correlates with increased morbidity and mortality</a:t>
+            </a:r>
+            <a:r>
+              <a:rPr lang="en-US" baseline="30000" dirty="0"/>
+              <a:t>2</a:t>
+            </a:r>
+            <a:endParaRPr lang="en-US" dirty="0"/>
+          </a:p>
+          <a:p>
+            <a:pPr>
+              <a:lnSpc>
+                <a:spcPct val="100000"/>
+              </a:lnSpc>
+            </a:pPr>
+            <a:r>
+              <a:rPr lang="en-US" dirty="0"/>
+              <a:t>Economic burden of obesity is high, both for direct costs (e.g., healthcare utilization) and indirect costs (e.g., work productivity loss)</a:t>
+            </a:r>
+            <a:r>
+              <a:rPr lang="en-US" baseline="30000" dirty="0"/>
+              <a:t>3,4</a:t>
+            </a:r>
+          </a:p>
+          <a:p>
+            <a:pPr>
+              <a:lnSpc>
+                <a:spcPct val="100000"/>
+              </a:lnSpc>
+            </a:pPr>
+            <a:r>
+              <a:rPr lang="en-US" dirty="0"/>
+              <a:t>The National Health and Nutrition Examination Survey (NHANES) is a biennial health surveillance study performed by the Centers for Disease Control and Prevention (CDC)</a:t>
+            </a:r>
+          </a:p>
+          <a:p>
+            <a:pPr lvl="1">
+              <a:lnSpc>
+                <a:spcPct val="100000"/>
+              </a:lnSpc>
+            </a:pPr>
+            <a:r>
+              <a:rPr lang="en-US" dirty="0"/>
+              <a:t>Seeks to understand population-level health and attitudes and behaviors about diet, nutrition, and exercise by gathering demographic, medical, mental health, and behavioral data</a:t>
+            </a:r>
+          </a:p>
+          <a:p>
+            <a:pPr lvl="1">
+              <a:lnSpc>
+                <a:spcPct val="100000"/>
+              </a:lnSpc>
+            </a:pPr>
+            <a:r>
+              <a:rPr lang="en-US" dirty="0"/>
+              <a:t>Data collection through self-report and physical examination</a:t>
+            </a:r>
+          </a:p>
+          <a:p>
+            <a:pPr lvl="1">
+              <a:lnSpc>
+                <a:spcPct val="100000"/>
+              </a:lnSpc>
+            </a:pPr>
+            <a:r>
+              <a:rPr lang="en-US" dirty="0"/>
+              <a:t>NHANES has uncovered some demographic correlates of obesity</a:t>
+            </a:r>
+          </a:p>
+          <a:p>
+            <a:pPr lvl="1">
+              <a:lnSpc>
+                <a:spcPct val="100000"/>
+              </a:lnSpc>
+            </a:pPr>
+            <a:r>
+              <a:rPr lang="en-US" dirty="0"/>
+              <a:t>Much remains unknown about the interactions of these correlates and how constellations of these correlates may be used to identify obesity at the population level</a:t>
             </a:r>
           </a:p>
         </p:txBody>
@@ -12275,7 +12253,7 @@
     </p:spTree>
     <p:extLst>
       <p:ext uri="{BB962C8B-B14F-4D97-AF65-F5344CB8AC3E}">
-        <p14:creationId xmlns:p14="http://schemas.microsoft.com/office/powerpoint/2010/main" val="2184420127"/>
+        <p14:creationId xmlns:p14="http://schemas.microsoft.com/office/powerpoint/2010/main" val="2720812227"/>
       </p:ext>
     </p:extLst>
   </p:cSld>
@@ -12360,128 +12338,13 @@
           <a:p>
             <a:r>
               <a:rPr lang="en-US" dirty="0"/>
-              <a:t>Explore a carefully selected set of NHANES variables with respect to BMI weight category through two hierarchical clustering methods (unsupervised)</a:t>
-            </a:r>
-          </a:p>
-          <a:p>
-            <a:pPr lvl="1"/>
-            <a:r>
-              <a:rPr lang="en-US" sz="2600" dirty="0"/>
-              <a:t>4 weight categories of BMI:</a:t>
-            </a:r>
-          </a:p>
-          <a:p>
-            <a:pPr lvl="2"/>
-            <a:r>
-              <a:rPr lang="en-US" sz="2200" dirty="0"/>
-              <a:t>Underweight (BMI &lt; 18.5 </a:t>
-            </a:r>
-            <a:r>
-              <a:rPr lang="en-US" sz="2200" i="1" dirty="0"/>
-              <a:t>kg</a:t>
-            </a:r>
-            <a:r>
-              <a:rPr lang="en-US" sz="2200" dirty="0"/>
-              <a:t>/</a:t>
-            </a:r>
-            <a:r>
-              <a:rPr lang="en-US" sz="2200" i="1" dirty="0"/>
-              <a:t>m</a:t>
-            </a:r>
-            <a:r>
-              <a:rPr lang="en-US" sz="2200" baseline="30000" dirty="0"/>
-              <a:t>2</a:t>
-            </a:r>
-            <a:r>
-              <a:rPr lang="en-US" sz="2200" dirty="0"/>
-              <a:t>)</a:t>
-            </a:r>
-          </a:p>
-          <a:p>
-            <a:pPr lvl="2"/>
-            <a:r>
-              <a:rPr lang="en-US" sz="2200" dirty="0"/>
-              <a:t>Healthy weight (18.5 ≤ BMI &lt; 25.0 </a:t>
-            </a:r>
-            <a:r>
-              <a:rPr lang="en-US" sz="2200" i="1" dirty="0"/>
-              <a:t>kg</a:t>
-            </a:r>
-            <a:r>
-              <a:rPr lang="en-US" sz="2200" dirty="0"/>
-              <a:t>/</a:t>
-            </a:r>
-            <a:r>
-              <a:rPr lang="en-US" sz="2200" i="1" dirty="0"/>
-              <a:t>m</a:t>
-            </a:r>
-            <a:r>
-              <a:rPr lang="en-US" sz="2200" baseline="30000" dirty="0"/>
-              <a:t>2</a:t>
-            </a:r>
-            <a:r>
-              <a:rPr lang="en-US" sz="2200" dirty="0"/>
-              <a:t>)</a:t>
-            </a:r>
-          </a:p>
-          <a:p>
-            <a:pPr lvl="2"/>
-            <a:r>
-              <a:rPr lang="en-US" sz="2200" dirty="0"/>
-              <a:t>Overweight (25.0 ≤ BMI &lt; 30.0 </a:t>
-            </a:r>
-            <a:r>
-              <a:rPr lang="en-US" sz="2200" i="1" dirty="0"/>
-              <a:t>kg</a:t>
-            </a:r>
-            <a:r>
-              <a:rPr lang="en-US" sz="2200" dirty="0"/>
-              <a:t>/</a:t>
-            </a:r>
-            <a:r>
-              <a:rPr lang="en-US" sz="2200" i="1" dirty="0"/>
-              <a:t>m</a:t>
-            </a:r>
-            <a:r>
-              <a:rPr lang="en-US" sz="2200" baseline="30000" dirty="0"/>
-              <a:t>2</a:t>
-            </a:r>
-            <a:r>
-              <a:rPr lang="en-US" sz="2200" dirty="0"/>
-              <a:t>)</a:t>
-            </a:r>
-          </a:p>
-          <a:p>
-            <a:pPr lvl="2"/>
-            <a:r>
-              <a:rPr lang="en-US" sz="2200" dirty="0"/>
-              <a:t>Obese (BMI ≥ 30 </a:t>
-            </a:r>
-            <a:r>
-              <a:rPr lang="en-US" sz="2200" i="1" dirty="0"/>
-              <a:t>kg</a:t>
-            </a:r>
-            <a:r>
-              <a:rPr lang="en-US" sz="2200" dirty="0"/>
-              <a:t>/</a:t>
-            </a:r>
-            <a:r>
-              <a:rPr lang="en-US" sz="2200" i="1" dirty="0"/>
-              <a:t>m</a:t>
-            </a:r>
-            <a:r>
-              <a:rPr lang="en-US" sz="2200" baseline="30000" dirty="0"/>
-              <a:t>2</a:t>
-            </a:r>
-            <a:r>
-              <a:rPr lang="en-US" sz="2200" dirty="0"/>
-              <a:t>)</a:t>
+              <a:t>Apply agglomerative and divisive clustering methods to a carefully selected set of NHANES variables to identify obesity</a:t>
             </a:r>
           </a:p>
           <a:p>
             <a:r>
               <a:rPr lang="en-US" dirty="0"/>
-              <a:t>Compare cluster homogeneity by BMI weight category between methods</a:t>
+              <a:t>Compare cluster homogeneity by Body Mass Index (BMI) weight categories between methods</a:t>
             </a:r>
           </a:p>
         </p:txBody>
@@ -12500,7 +12363,7 @@
 </file>
 
 <file path=ppt/slides/slide5.xml><?xml version="1.0" encoding="utf-8"?>
-<p:sld xmlns:a="http://schemas.openxmlformats.org/drawingml/2006/main" xmlns:r="http://schemas.openxmlformats.org/officeDocument/2006/relationships" xmlns:p="http://schemas.openxmlformats.org/presentationml/2006/main">
+<p:sld xmlns:a="http://schemas.openxmlformats.org/drawingml/2006/main" xmlns:r="http://schemas.openxmlformats.org/officeDocument/2006/relationships" xmlns:p="http://schemas.openxmlformats.org/presentationml/2006/main" show="0">
   <p:cSld>
     <p:spTree>
       <p:nvGrpSpPr>
@@ -12617,6 +12480,15 @@
               <a:rPr lang="en-US" dirty="0"/>
               <a:t>Omitted any post-imputation variables found to be statistically different than the pre-imputation versions</a:t>
             </a:r>
+          </a:p>
+          <a:p>
+            <a:r>
+              <a:rPr lang="en-US" dirty="0"/>
+              <a:t>Selected variables that were ≥90% complete, then subset to include complete cases only</a:t>
+            </a:r>
+          </a:p>
+          <a:p>
+            <a:endParaRPr lang="en-US" dirty="0"/>
           </a:p>
           <a:p>
             <a:endParaRPr lang="en-US" dirty="0"/>
@@ -12658,371 +12530,6 @@
           <p:cNvPr id="2" name="Title 1">
             <a:extLst>
               <a:ext uri="{FF2B5EF4-FFF2-40B4-BE49-F238E27FC236}">
-                <a16:creationId xmlns:a16="http://schemas.microsoft.com/office/drawing/2014/main" id="{7F4CC3D0-0CA1-49D1-A58D-ED170897A490}"/>
-              </a:ext>
-            </a:extLst>
-          </p:cNvPr>
-          <p:cNvSpPr>
-            <a:spLocks noGrp="1"/>
-          </p:cNvSpPr>
-          <p:nvPr>
-            <p:ph type="title"/>
-          </p:nvPr>
-        </p:nvSpPr>
-        <p:spPr/>
-        <p:txBody>
-          <a:bodyPr/>
-          <a:lstStyle/>
-          <a:p>
-            <a:r>
-              <a:rPr lang="en-US" dirty="0"/>
-              <a:t>METHODS</a:t>
-            </a:r>
-          </a:p>
-        </p:txBody>
-      </p:sp>
-      <p:sp>
-        <p:nvSpPr>
-          <p:cNvPr id="3" name="Content Placeholder 2">
-            <a:extLst>
-              <a:ext uri="{FF2B5EF4-FFF2-40B4-BE49-F238E27FC236}">
-                <a16:creationId xmlns:a16="http://schemas.microsoft.com/office/drawing/2014/main" id="{32F52577-0D70-4F76-A5F5-16B90F38E66F}"/>
-              </a:ext>
-            </a:extLst>
-          </p:cNvPr>
-          <p:cNvSpPr>
-            <a:spLocks noGrp="1"/>
-          </p:cNvSpPr>
-          <p:nvPr>
-            <p:ph idx="1"/>
-          </p:nvPr>
-        </p:nvSpPr>
-        <p:spPr>
-          <a:xfrm>
-            <a:off x="755373" y="1358790"/>
-            <a:ext cx="10934633" cy="5308709"/>
-          </a:xfrm>
-        </p:spPr>
-        <p:txBody>
-          <a:bodyPr>
-            <a:normAutofit/>
-          </a:bodyPr>
-          <a:lstStyle/>
-          <a:p>
-            <a:r>
-              <a:rPr lang="en-US" sz="2400" dirty="0"/>
-              <a:t>Performed agglomerative clustering (AGNES) and divisive clustering (DIANA)</a:t>
-            </a:r>
-          </a:p>
-          <a:p>
-            <a:pPr lvl="1"/>
-            <a:r>
-              <a:rPr lang="en-US" sz="2400" dirty="0"/>
-              <a:t>Selected variables that were ≥90% complete, then subset to include complete cases only</a:t>
-            </a:r>
-          </a:p>
-          <a:p>
-            <a:pPr lvl="1"/>
-            <a:r>
-              <a:rPr lang="en-US" sz="2400" dirty="0"/>
-              <a:t>Created representative 5% sample stratified by BMI category</a:t>
-            </a:r>
-          </a:p>
-          <a:p>
-            <a:pPr lvl="2"/>
-            <a:r>
-              <a:rPr lang="en-US" sz="2000" dirty="0"/>
-              <a:t>Necessary to use a smaller dataset because visualizing ~5,000 cases in a dendrogram plot isn’t very informative!</a:t>
-            </a:r>
-          </a:p>
-          <a:p>
-            <a:pPr lvl="1"/>
-            <a:r>
-              <a:rPr lang="en-US" sz="2400" dirty="0"/>
-              <a:t>Generated dissimilarity matrix based on Gower distance</a:t>
-            </a:r>
-            <a:r>
-              <a:rPr lang="en-US" sz="2400" baseline="30000" dirty="0"/>
-              <a:t>6</a:t>
-            </a:r>
-          </a:p>
-          <a:p>
-            <a:pPr lvl="2"/>
-            <a:r>
-              <a:rPr lang="en-US" sz="2000" dirty="0"/>
-              <a:t>Gower distance was used because variables were of mixed type (continuous, categorical)</a:t>
-            </a:r>
-          </a:p>
-          <a:p>
-            <a:pPr lvl="1"/>
-            <a:r>
-              <a:rPr lang="en-US" sz="2400" dirty="0"/>
-              <a:t>Used clustering statistics to generate scree and silhouette plots</a:t>
-            </a:r>
-          </a:p>
-          <a:p>
-            <a:pPr lvl="2"/>
-            <a:r>
-              <a:rPr lang="en-US" sz="2000" dirty="0"/>
-              <a:t>Used these plots to inform number of clusters needed for each approach</a:t>
-            </a:r>
-          </a:p>
-        </p:txBody>
-      </p:sp>
-    </p:spTree>
-    <p:extLst>
-      <p:ext uri="{BB962C8B-B14F-4D97-AF65-F5344CB8AC3E}">
-        <p14:creationId xmlns:p14="http://schemas.microsoft.com/office/powerpoint/2010/main" val="3104049242"/>
-      </p:ext>
-    </p:extLst>
-  </p:cSld>
-  <p:clrMapOvr>
-    <a:masterClrMapping/>
-  </p:clrMapOvr>
-</p:sld>
-</file>
-
-<file path=ppt/slides/slide7.xml><?xml version="1.0" encoding="utf-8"?>
-<p:sld xmlns:a="http://schemas.openxmlformats.org/drawingml/2006/main" xmlns:r="http://schemas.openxmlformats.org/officeDocument/2006/relationships" xmlns:p="http://schemas.openxmlformats.org/presentationml/2006/main">
-  <p:cSld>
-    <p:spTree>
-      <p:nvGrpSpPr>
-        <p:cNvPr id="1" name=""/>
-        <p:cNvGrpSpPr/>
-        <p:nvPr/>
-      </p:nvGrpSpPr>
-      <p:grpSpPr>
-        <a:xfrm>
-          <a:off x="0" y="0"/>
-          <a:ext cx="0" cy="0"/>
-          <a:chOff x="0" y="0"/>
-          <a:chExt cx="0" cy="0"/>
-        </a:xfrm>
-      </p:grpSpPr>
-      <p:sp>
-        <p:nvSpPr>
-          <p:cNvPr id="2" name="Title 1">
-            <a:extLst>
-              <a:ext uri="{FF2B5EF4-FFF2-40B4-BE49-F238E27FC236}">
-                <a16:creationId xmlns:a16="http://schemas.microsoft.com/office/drawing/2014/main" id="{7F4CC3D0-0CA1-49D1-A58D-ED170897A490}"/>
-              </a:ext>
-            </a:extLst>
-          </p:cNvPr>
-          <p:cNvSpPr>
-            <a:spLocks noGrp="1"/>
-          </p:cNvSpPr>
-          <p:nvPr>
-            <p:ph type="title"/>
-          </p:nvPr>
-        </p:nvSpPr>
-        <p:spPr/>
-        <p:txBody>
-          <a:bodyPr/>
-          <a:lstStyle/>
-          <a:p>
-            <a:r>
-              <a:rPr lang="en-US" dirty="0"/>
-              <a:t>METHODS</a:t>
-            </a:r>
-          </a:p>
-        </p:txBody>
-      </p:sp>
-      <p:sp>
-        <p:nvSpPr>
-          <p:cNvPr id="3" name="Content Placeholder 2">
-            <a:extLst>
-              <a:ext uri="{FF2B5EF4-FFF2-40B4-BE49-F238E27FC236}">
-                <a16:creationId xmlns:a16="http://schemas.microsoft.com/office/drawing/2014/main" id="{32F52577-0D70-4F76-A5F5-16B90F38E66F}"/>
-              </a:ext>
-            </a:extLst>
-          </p:cNvPr>
-          <p:cNvSpPr>
-            <a:spLocks noGrp="1"/>
-          </p:cNvSpPr>
-          <p:nvPr>
-            <p:ph idx="1"/>
-          </p:nvPr>
-        </p:nvSpPr>
-        <p:spPr>
-          <a:xfrm>
-            <a:off x="755373" y="1358790"/>
-            <a:ext cx="10934633" cy="5308709"/>
-          </a:xfrm>
-        </p:spPr>
-        <p:txBody>
-          <a:bodyPr>
-            <a:normAutofit/>
-          </a:bodyPr>
-          <a:lstStyle/>
-          <a:p>
-            <a:r>
-              <a:rPr lang="en-US" dirty="0"/>
-              <a:t>Three analyses:</a:t>
-            </a:r>
-          </a:p>
-          <a:p>
-            <a:pPr marL="914400" lvl="1" indent="-457200">
-              <a:buFont typeface="+mj-lt"/>
-              <a:buAutoNum type="arabicPeriod"/>
-            </a:pPr>
-            <a:r>
-              <a:rPr lang="en-US" dirty="0"/>
-              <a:t>4-level BMI categories, AGNES </a:t>
-            </a:r>
-            <a:r>
-              <a:rPr lang="en-US" i="1" dirty="0"/>
-              <a:t>k</a:t>
-            </a:r>
-            <a:r>
-              <a:rPr lang="en-US" dirty="0"/>
-              <a:t> = 7, DIANA </a:t>
-            </a:r>
-            <a:r>
-              <a:rPr lang="en-US" i="1" dirty="0"/>
-              <a:t>k</a:t>
-            </a:r>
-            <a:r>
-              <a:rPr lang="en-US" dirty="0"/>
-              <a:t> = 6</a:t>
-            </a:r>
-          </a:p>
-          <a:p>
-            <a:pPr marL="914400" lvl="1" indent="-457200">
-              <a:buFont typeface="+mj-lt"/>
-              <a:buAutoNum type="arabicPeriod"/>
-            </a:pPr>
-            <a:r>
-              <a:rPr lang="en-US" dirty="0"/>
-              <a:t>Dichotomous BMI categories*, AGNES </a:t>
-            </a:r>
-            <a:r>
-              <a:rPr lang="en-US" i="1" dirty="0"/>
-              <a:t>k</a:t>
-            </a:r>
-            <a:r>
-              <a:rPr lang="en-US" dirty="0"/>
-              <a:t> = 7, DIANA </a:t>
-            </a:r>
-            <a:r>
-              <a:rPr lang="en-US" i="1" dirty="0"/>
-              <a:t>k</a:t>
-            </a:r>
-            <a:r>
-              <a:rPr lang="en-US" dirty="0"/>
-              <a:t> = 6</a:t>
-            </a:r>
-          </a:p>
-          <a:p>
-            <a:pPr marL="914400" lvl="1" indent="-457200">
-              <a:buFont typeface="+mj-lt"/>
-              <a:buAutoNum type="arabicPeriod"/>
-            </a:pPr>
-            <a:r>
-              <a:rPr lang="en-US" dirty="0"/>
-              <a:t>Dichotomous BMI categories*, AGNES </a:t>
-            </a:r>
-            <a:r>
-              <a:rPr lang="en-US" i="1" dirty="0"/>
-              <a:t>k</a:t>
-            </a:r>
-            <a:r>
-              <a:rPr lang="en-US" dirty="0"/>
-              <a:t> = 10, DIANA </a:t>
-            </a:r>
-            <a:r>
-              <a:rPr lang="en-US" i="1" dirty="0"/>
-              <a:t>k</a:t>
-            </a:r>
-            <a:r>
-              <a:rPr lang="en-US" dirty="0"/>
-              <a:t> = 9</a:t>
-            </a:r>
-          </a:p>
-          <a:p>
-            <a:r>
-              <a:rPr lang="en-US" dirty="0"/>
-              <a:t>For each analysis:</a:t>
-            </a:r>
-          </a:p>
-          <a:p>
-            <a:pPr lvl="1"/>
-            <a:r>
-              <a:rPr lang="en-US" dirty="0"/>
-              <a:t>Plotted radial dendrograms with colored branches to indicate clusters and colored leaves to indicate BMI category</a:t>
-            </a:r>
-          </a:p>
-          <a:p>
-            <a:pPr lvl="1"/>
-            <a:r>
-              <a:rPr lang="en-US" dirty="0"/>
-              <a:t>Assessed cluster homogeneity and congruency of clusters vs. BMI category labels</a:t>
-            </a:r>
-          </a:p>
-          <a:p>
-            <a:pPr lvl="1"/>
-            <a:r>
-              <a:rPr lang="en-US" dirty="0"/>
-              <a:t>Compared AGNES and DIANA</a:t>
-            </a:r>
-          </a:p>
-          <a:p>
-            <a:pPr marL="0" indent="0">
-              <a:buNone/>
-            </a:pPr>
-            <a:endParaRPr lang="en-US" dirty="0"/>
-          </a:p>
-          <a:p>
-            <a:pPr marL="0" indent="0">
-              <a:buNone/>
-            </a:pPr>
-            <a:endParaRPr lang="en-US" dirty="0"/>
-          </a:p>
-          <a:p>
-            <a:pPr marL="0" indent="0">
-              <a:buNone/>
-            </a:pPr>
-            <a:r>
-              <a:rPr lang="en-US" sz="2000" dirty="0"/>
-              <a:t>* Dichotomous BMI categories defined as not overweight or obese vs. overweight or obese</a:t>
-            </a:r>
-          </a:p>
-        </p:txBody>
-      </p:sp>
-    </p:spTree>
-    <p:extLst>
-      <p:ext uri="{BB962C8B-B14F-4D97-AF65-F5344CB8AC3E}">
-        <p14:creationId xmlns:p14="http://schemas.microsoft.com/office/powerpoint/2010/main" val="242010851"/>
-      </p:ext>
-    </p:extLst>
-  </p:cSld>
-  <p:clrMapOvr>
-    <a:masterClrMapping/>
-  </p:clrMapOvr>
-</p:sld>
-</file>
-
-<file path=ppt/slides/slide8.xml><?xml version="1.0" encoding="utf-8"?>
-<p:sld xmlns:a="http://schemas.openxmlformats.org/drawingml/2006/main" xmlns:r="http://schemas.openxmlformats.org/officeDocument/2006/relationships" xmlns:p="http://schemas.openxmlformats.org/presentationml/2006/main">
-  <p:cSld>
-    <p:spTree>
-      <p:nvGrpSpPr>
-        <p:cNvPr id="1" name=""/>
-        <p:cNvGrpSpPr/>
-        <p:nvPr/>
-      </p:nvGrpSpPr>
-      <p:grpSpPr>
-        <a:xfrm>
-          <a:off x="0" y="0"/>
-          <a:ext cx="0" cy="0"/>
-          <a:chOff x="0" y="0"/>
-          <a:chExt cx="0" cy="0"/>
-        </a:xfrm>
-      </p:grpSpPr>
-      <p:sp>
-        <p:nvSpPr>
-          <p:cNvPr id="2" name="Title 1">
-            <a:extLst>
-              <a:ext uri="{FF2B5EF4-FFF2-40B4-BE49-F238E27FC236}">
                 <a16:creationId xmlns:a16="http://schemas.microsoft.com/office/drawing/2014/main" id="{7E08F702-C1E7-49FE-9B72-7185D7E4F0AC}"/>
               </a:ext>
             </a:extLst>
@@ -13062,7 +12569,7 @@
             <p:ph idx="1"/>
             <p:extLst>
               <p:ext uri="{D42A27DB-BD31-4B8C-83A1-F6EECF244321}">
-                <p14:modId xmlns:p14="http://schemas.microsoft.com/office/powerpoint/2010/main" val="2315035954"/>
+                <p14:modId xmlns:p14="http://schemas.microsoft.com/office/powerpoint/2010/main" val="9105225"/>
               </p:ext>
             </p:extLst>
           </p:nvPr>
@@ -13208,7 +12715,7 @@
                             <a:srgbClr val="404040"/>
                           </a:solidFill>
                         </a:rPr>
-                        <a:t>Comorbidities (diabetes, hypertension, coronary artery disease, myocardial infarction, thyroid disease, depression), has been advised by doctor to lose weight and/or exercise, functional limitations, BMI category</a:t>
+                        <a:t>Comorbidities (diabetes, hypertension, coronary artery disease, myocardial infarction, thyroid disease, depression), has been advised by doctor to lose weight and/or exercise, functional limitations, Body Mass Index (BMI) category</a:t>
                       </a:r>
                     </a:p>
                   </a:txBody>
@@ -13334,8 +12841,8 @@
         </p:nvSpPr>
         <p:spPr>
           <a:xfrm>
-            <a:off x="476285" y="4397529"/>
-            <a:ext cx="11213722" cy="2269971"/>
+            <a:off x="476285" y="4538749"/>
+            <a:ext cx="11213722" cy="2128751"/>
           </a:xfrm>
           <a:prstGeom prst="rect">
             <a:avLst/>
@@ -13540,40 +13047,26 @@
           </a:lstStyle>
           <a:p>
             <a:r>
+              <a:rPr lang="en-US" sz="2400" dirty="0"/>
+              <a:t>All variables were obtained from 2015-2016 NHANES survey (most recent available)</a:t>
+            </a:r>
+          </a:p>
+          <a:p>
+            <a:pPr lvl="1"/>
+            <a:r>
               <a:rPr lang="en-US" sz="2000" dirty="0"/>
-              <a:t>All variables were obtained from 2015-2016 NHANES survey (most recent available)</a:t>
-            </a:r>
-          </a:p>
-          <a:p>
-            <a:pPr lvl="1"/>
-            <a:r>
-              <a:rPr lang="en-US" sz="1800" dirty="0"/>
               <a:t>Historic data excluded due to rapidly changing epidemiology of obesity</a:t>
             </a:r>
           </a:p>
           <a:p>
             <a:r>
-              <a:rPr lang="en-US" sz="2000" dirty="0"/>
-              <a:t>Inclusion criteria were age ≥</a:t>
-            </a:r>
-            <a:r>
-              <a:rPr lang="en-US" sz="1800" dirty="0"/>
-              <a:t>20</a:t>
-            </a:r>
-            <a:r>
-              <a:rPr lang="en-US" sz="2000" dirty="0"/>
-              <a:t> and non-missing BMI data</a:t>
-            </a:r>
-          </a:p>
-          <a:p>
-            <a:r>
-              <a:rPr lang="en-US" sz="2000" dirty="0"/>
-              <a:t>Final dataset comprised 5,406 cases and 39 variables</a:t>
-            </a:r>
-          </a:p>
-          <a:p>
-            <a:r>
-              <a:rPr lang="en-US" sz="2000" dirty="0"/>
+              <a:rPr lang="en-US" sz="2400" dirty="0"/>
+              <a:t>Inclusion criteria were age ≥20 and non-missing BMI data</a:t>
+            </a:r>
+          </a:p>
+          <a:p>
+            <a:r>
+              <a:rPr lang="en-US" sz="2400" dirty="0"/>
               <a:t>Majority of variables are categorical!</a:t>
             </a:r>
           </a:p>
@@ -13583,6 +13076,600 @@
     <p:extLst>
       <p:ext uri="{BB962C8B-B14F-4D97-AF65-F5344CB8AC3E}">
         <p14:creationId xmlns:p14="http://schemas.microsoft.com/office/powerpoint/2010/main" val="2751398052"/>
+      </p:ext>
+    </p:extLst>
+  </p:cSld>
+  <p:clrMapOvr>
+    <a:masterClrMapping/>
+  </p:clrMapOvr>
+</p:sld>
+</file>
+
+<file path=ppt/slides/slide7.xml><?xml version="1.0" encoding="utf-8"?>
+<p:sld xmlns:a="http://schemas.openxmlformats.org/drawingml/2006/main" xmlns:r="http://schemas.openxmlformats.org/officeDocument/2006/relationships" xmlns:p="http://schemas.openxmlformats.org/presentationml/2006/main">
+  <p:cSld>
+    <p:spTree>
+      <p:nvGrpSpPr>
+        <p:cNvPr id="1" name=""/>
+        <p:cNvGrpSpPr/>
+        <p:nvPr/>
+      </p:nvGrpSpPr>
+      <p:grpSpPr>
+        <a:xfrm>
+          <a:off x="0" y="0"/>
+          <a:ext cx="0" cy="0"/>
+          <a:chOff x="0" y="0"/>
+          <a:chExt cx="0" cy="0"/>
+        </a:xfrm>
+      </p:grpSpPr>
+      <p:sp>
+        <p:nvSpPr>
+          <p:cNvPr id="2" name="Title 1">
+            <a:extLst>
+              <a:ext uri="{FF2B5EF4-FFF2-40B4-BE49-F238E27FC236}">
+                <a16:creationId xmlns:a16="http://schemas.microsoft.com/office/drawing/2014/main" id="{7F4CC3D0-0CA1-49D1-A58D-ED170897A490}"/>
+              </a:ext>
+            </a:extLst>
+          </p:cNvPr>
+          <p:cNvSpPr>
+            <a:spLocks noGrp="1"/>
+          </p:cNvSpPr>
+          <p:nvPr>
+            <p:ph type="title"/>
+          </p:nvPr>
+        </p:nvSpPr>
+        <p:spPr/>
+        <p:txBody>
+          <a:bodyPr/>
+          <a:lstStyle/>
+          <a:p>
+            <a:r>
+              <a:rPr lang="en-US" dirty="0"/>
+              <a:t>METHODS</a:t>
+            </a:r>
+          </a:p>
+        </p:txBody>
+      </p:sp>
+      <p:sp>
+        <p:nvSpPr>
+          <p:cNvPr id="3" name="Content Placeholder 2">
+            <a:extLst>
+              <a:ext uri="{FF2B5EF4-FFF2-40B4-BE49-F238E27FC236}">
+                <a16:creationId xmlns:a16="http://schemas.microsoft.com/office/drawing/2014/main" id="{32F52577-0D70-4F76-A5F5-16B90F38E66F}"/>
+              </a:ext>
+            </a:extLst>
+          </p:cNvPr>
+          <p:cNvSpPr>
+            <a:spLocks noGrp="1"/>
+          </p:cNvSpPr>
+          <p:nvPr>
+            <p:ph idx="1"/>
+          </p:nvPr>
+        </p:nvSpPr>
+        <p:spPr>
+          <a:xfrm>
+            <a:off x="755373" y="1358790"/>
+            <a:ext cx="10934633" cy="5308709"/>
+          </a:xfrm>
+        </p:spPr>
+        <p:txBody>
+          <a:bodyPr>
+            <a:normAutofit/>
+          </a:bodyPr>
+          <a:lstStyle/>
+          <a:p>
+            <a:r>
+              <a:rPr lang="en-US" dirty="0"/>
+              <a:t>Created representative 5% sample of data stratified by BMI category</a:t>
+            </a:r>
+          </a:p>
+          <a:p>
+            <a:pPr lvl="1"/>
+            <a:r>
+              <a:rPr lang="en-US" dirty="0"/>
+              <a:t>Necessary to use a smaller dataset because visualizing ~5,000 cases in a dendrogram plot isn’t very informative!</a:t>
+            </a:r>
+          </a:p>
+          <a:p>
+            <a:pPr lvl="1"/>
+            <a:r>
+              <a:rPr lang="en-US" dirty="0"/>
+              <a:t>5% sample included n=241 cases and 17 variables</a:t>
+            </a:r>
+          </a:p>
+          <a:p>
+            <a:r>
+              <a:rPr lang="en-US" dirty="0"/>
+              <a:t>Generated dissimilarity matrix based on Gower distance</a:t>
+            </a:r>
+            <a:r>
+              <a:rPr lang="en-US" baseline="30000" dirty="0"/>
+              <a:t>6</a:t>
+            </a:r>
+          </a:p>
+          <a:p>
+            <a:pPr lvl="1"/>
+            <a:r>
+              <a:rPr lang="en-US" dirty="0"/>
+              <a:t>Gower distance was used because variables were of mixed type (continuous, categorical)</a:t>
+            </a:r>
+          </a:p>
+          <a:p>
+            <a:r>
+              <a:rPr lang="en-US" dirty="0"/>
+              <a:t>Performed agglomerative clustering (AGNES) and divisive clustering (DIANA)</a:t>
+            </a:r>
+          </a:p>
+          <a:p>
+            <a:r>
+              <a:rPr lang="en-US" dirty="0"/>
+              <a:t>Used clustering statistics to generate scree and silhouette plots</a:t>
+            </a:r>
+          </a:p>
+          <a:p>
+            <a:pPr lvl="1"/>
+            <a:r>
+              <a:rPr lang="en-US" dirty="0"/>
+              <a:t>Used these plots to inform number of clusters needed for each approach</a:t>
+            </a:r>
+          </a:p>
+        </p:txBody>
+      </p:sp>
+    </p:spTree>
+    <p:extLst>
+      <p:ext uri="{BB962C8B-B14F-4D97-AF65-F5344CB8AC3E}">
+        <p14:creationId xmlns:p14="http://schemas.microsoft.com/office/powerpoint/2010/main" val="3104049242"/>
+      </p:ext>
+    </p:extLst>
+  </p:cSld>
+  <p:clrMapOvr>
+    <a:masterClrMapping/>
+  </p:clrMapOvr>
+</p:sld>
+</file>
+
+<file path=ppt/slides/slide8.xml><?xml version="1.0" encoding="utf-8"?>
+<p:sld xmlns:a="http://schemas.openxmlformats.org/drawingml/2006/main" xmlns:r="http://schemas.openxmlformats.org/officeDocument/2006/relationships" xmlns:p="http://schemas.openxmlformats.org/presentationml/2006/main">
+  <p:cSld>
+    <p:spTree>
+      <p:nvGrpSpPr>
+        <p:cNvPr id="1" name=""/>
+        <p:cNvGrpSpPr/>
+        <p:nvPr/>
+      </p:nvGrpSpPr>
+      <p:grpSpPr>
+        <a:xfrm>
+          <a:off x="0" y="0"/>
+          <a:ext cx="0" cy="0"/>
+          <a:chOff x="0" y="0"/>
+          <a:chExt cx="0" cy="0"/>
+        </a:xfrm>
+      </p:grpSpPr>
+      <p:sp>
+        <p:nvSpPr>
+          <p:cNvPr id="2" name="Title 1">
+            <a:extLst>
+              <a:ext uri="{FF2B5EF4-FFF2-40B4-BE49-F238E27FC236}">
+                <a16:creationId xmlns:a16="http://schemas.microsoft.com/office/drawing/2014/main" id="{7F4CC3D0-0CA1-49D1-A58D-ED170897A490}"/>
+              </a:ext>
+            </a:extLst>
+          </p:cNvPr>
+          <p:cNvSpPr>
+            <a:spLocks noGrp="1"/>
+          </p:cNvSpPr>
+          <p:nvPr>
+            <p:ph type="title"/>
+          </p:nvPr>
+        </p:nvSpPr>
+        <p:spPr/>
+        <p:txBody>
+          <a:bodyPr/>
+          <a:lstStyle/>
+          <a:p>
+            <a:r>
+              <a:rPr lang="en-US" dirty="0"/>
+              <a:t>METHODS</a:t>
+            </a:r>
+          </a:p>
+        </p:txBody>
+      </p:sp>
+      <p:sp>
+        <p:nvSpPr>
+          <p:cNvPr id="3" name="Content Placeholder 2">
+            <a:extLst>
+              <a:ext uri="{FF2B5EF4-FFF2-40B4-BE49-F238E27FC236}">
+                <a16:creationId xmlns:a16="http://schemas.microsoft.com/office/drawing/2014/main" id="{32F52577-0D70-4F76-A5F5-16B90F38E66F}"/>
+              </a:ext>
+            </a:extLst>
+          </p:cNvPr>
+          <p:cNvSpPr>
+            <a:spLocks noGrp="1"/>
+          </p:cNvSpPr>
+          <p:nvPr>
+            <p:ph idx="1"/>
+          </p:nvPr>
+        </p:nvSpPr>
+        <p:spPr>
+          <a:xfrm>
+            <a:off x="755373" y="1358790"/>
+            <a:ext cx="10934633" cy="5308709"/>
+          </a:xfrm>
+        </p:spPr>
+        <p:txBody>
+          <a:bodyPr>
+            <a:normAutofit/>
+          </a:bodyPr>
+          <a:lstStyle/>
+          <a:p>
+            <a:r>
+              <a:rPr lang="en-US" dirty="0"/>
+              <a:t>Three analyses:</a:t>
+            </a:r>
+          </a:p>
+          <a:p>
+            <a:pPr marL="914400" lvl="1" indent="-457200">
+              <a:buFont typeface="+mj-lt"/>
+              <a:buAutoNum type="arabicPeriod"/>
+            </a:pPr>
+            <a:r>
+              <a:rPr lang="en-US" dirty="0"/>
+              <a:t>4-level </a:t>
+            </a:r>
+            <a:r>
+              <a:rPr lang="en-US" dirty="0" err="1"/>
+              <a:t>BMI</a:t>
+            </a:r>
+            <a:r>
+              <a:rPr lang="en-US" baseline="30000" dirty="0" err="1"/>
+              <a:t>a</a:t>
+            </a:r>
+            <a:r>
+              <a:rPr lang="en-US" dirty="0"/>
+              <a:t>, small </a:t>
+            </a:r>
+            <a:r>
+              <a:rPr lang="en-US" i="1" dirty="0"/>
+              <a:t>k</a:t>
+            </a:r>
+            <a:endParaRPr lang="en-US" dirty="0"/>
+          </a:p>
+          <a:p>
+            <a:pPr marL="914400" lvl="1" indent="-457200">
+              <a:buFont typeface="+mj-lt"/>
+              <a:buAutoNum type="arabicPeriod"/>
+            </a:pPr>
+            <a:r>
+              <a:rPr lang="en-US" dirty="0"/>
+              <a:t>Dichotomous </a:t>
+            </a:r>
+            <a:r>
+              <a:rPr lang="en-US" dirty="0" err="1"/>
+              <a:t>BMI</a:t>
+            </a:r>
+            <a:r>
+              <a:rPr lang="en-US" baseline="30000" dirty="0" err="1"/>
+              <a:t>b</a:t>
+            </a:r>
+            <a:r>
+              <a:rPr lang="en-US" dirty="0"/>
+              <a:t>, small </a:t>
+            </a:r>
+            <a:r>
+              <a:rPr lang="en-US" i="1" dirty="0"/>
+              <a:t>k</a:t>
+            </a:r>
+            <a:endParaRPr lang="en-US" dirty="0"/>
+          </a:p>
+          <a:p>
+            <a:pPr marL="914400" lvl="1" indent="-457200">
+              <a:buFont typeface="+mj-lt"/>
+              <a:buAutoNum type="arabicPeriod"/>
+            </a:pPr>
+            <a:r>
+              <a:rPr lang="en-US" dirty="0"/>
+              <a:t>Dichotomous BMI, larger </a:t>
+            </a:r>
+            <a:r>
+              <a:rPr lang="en-US" i="1" dirty="0"/>
+              <a:t>k</a:t>
+            </a:r>
+            <a:endParaRPr lang="en-US" dirty="0"/>
+          </a:p>
+          <a:p>
+            <a:r>
+              <a:rPr lang="en-US" dirty="0"/>
+              <a:t>For each analysis:</a:t>
+            </a:r>
+          </a:p>
+          <a:p>
+            <a:pPr lvl="1"/>
+            <a:r>
+              <a:rPr lang="en-US" dirty="0"/>
+              <a:t>Plotted radial dendrograms</a:t>
+            </a:r>
+          </a:p>
+          <a:p>
+            <a:pPr lvl="2"/>
+            <a:r>
+              <a:rPr lang="en-US" dirty="0"/>
+              <a:t>Branch color indicates clusters</a:t>
+            </a:r>
+          </a:p>
+          <a:p>
+            <a:pPr lvl="2"/>
+            <a:r>
+              <a:rPr lang="en-US" dirty="0"/>
+              <a:t>Leaf color indicates BMI categories</a:t>
+            </a:r>
+          </a:p>
+          <a:p>
+            <a:pPr lvl="1"/>
+            <a:r>
+              <a:rPr lang="en-US" dirty="0"/>
+              <a:t>Assessed cluster homogeneity for BMI category</a:t>
+            </a:r>
+          </a:p>
+          <a:p>
+            <a:pPr lvl="1"/>
+            <a:r>
+              <a:rPr lang="en-US" dirty="0"/>
+              <a:t>Compared AGNES and DIANA</a:t>
+            </a:r>
+          </a:p>
+        </p:txBody>
+      </p:sp>
+      <p:sp>
+        <p:nvSpPr>
+          <p:cNvPr id="4" name="Content Placeholder 2">
+            <a:extLst>
+              <a:ext uri="{FF2B5EF4-FFF2-40B4-BE49-F238E27FC236}">
+                <a16:creationId xmlns:a16="http://schemas.microsoft.com/office/drawing/2014/main" id="{77CE47C7-7D46-4527-8122-A8AFA2BAA1BB}"/>
+              </a:ext>
+            </a:extLst>
+          </p:cNvPr>
+          <p:cNvSpPr txBox="1">
+            <a:spLocks/>
+          </p:cNvSpPr>
+          <p:nvPr/>
+        </p:nvSpPr>
+        <p:spPr>
+          <a:xfrm>
+            <a:off x="755373" y="5893724"/>
+            <a:ext cx="10934633" cy="773774"/>
+          </a:xfrm>
+          <a:prstGeom prst="rect">
+            <a:avLst/>
+          </a:prstGeom>
+        </p:spPr>
+        <p:txBody>
+          <a:bodyPr vert="horz" lIns="91440" tIns="45720" rIns="91440" bIns="45720" rtlCol="0">
+            <a:normAutofit lnSpcReduction="10000"/>
+          </a:bodyPr>
+          <a:lstStyle>
+            <a:lvl1pPr marL="228600" indent="-228600" algn="l" defTabSz="914400" rtl="0" eaLnBrk="1" latinLnBrk="0" hangingPunct="1">
+              <a:lnSpc>
+                <a:spcPct val="85000"/>
+              </a:lnSpc>
+              <a:spcBef>
+                <a:spcPts val="1300"/>
+              </a:spcBef>
+              <a:buFont typeface="Arial" panose="020B0604020202020204" pitchFamily="34" charset="0"/>
+              <a:buChar char="•"/>
+              <a:defRPr sz="2400" kern="1200">
+                <a:solidFill>
+                  <a:schemeClr val="tx1">
+                    <a:lumMod val="85000"/>
+                    <a:lumOff val="15000"/>
+                  </a:schemeClr>
+                </a:solidFill>
+                <a:latin typeface="+mn-lt"/>
+                <a:ea typeface="+mn-ea"/>
+                <a:cs typeface="+mn-cs"/>
+              </a:defRPr>
+            </a:lvl1pPr>
+            <a:lvl2pPr marL="685800" indent="-228600" algn="l" defTabSz="914400" rtl="0" eaLnBrk="1" latinLnBrk="0" hangingPunct="1">
+              <a:lnSpc>
+                <a:spcPct val="85000"/>
+              </a:lnSpc>
+              <a:spcBef>
+                <a:spcPts val="600"/>
+              </a:spcBef>
+              <a:buSzPct val="80000"/>
+              <a:buFont typeface="Courier New" panose="02070309020205020404" pitchFamily="49" charset="0"/>
+              <a:buChar char="o"/>
+              <a:defRPr sz="2400" kern="1200">
+                <a:solidFill>
+                  <a:schemeClr val="tx1">
+                    <a:lumMod val="85000"/>
+                    <a:lumOff val="15000"/>
+                  </a:schemeClr>
+                </a:solidFill>
+                <a:latin typeface="+mn-lt"/>
+                <a:ea typeface="+mn-ea"/>
+                <a:cs typeface="+mn-cs"/>
+              </a:defRPr>
+            </a:lvl2pPr>
+            <a:lvl3pPr marL="1143000" indent="-228600" algn="l" defTabSz="914400" rtl="0" eaLnBrk="1" latinLnBrk="0" hangingPunct="1">
+              <a:lnSpc>
+                <a:spcPct val="85000"/>
+              </a:lnSpc>
+              <a:spcBef>
+                <a:spcPts val="600"/>
+              </a:spcBef>
+              <a:buFont typeface="Arial" panose="020B0604020202020204" pitchFamily="34" charset="0"/>
+              <a:buChar char="•"/>
+              <a:defRPr sz="2000" i="0" kern="1200">
+                <a:solidFill>
+                  <a:schemeClr val="tx1">
+                    <a:lumMod val="85000"/>
+                    <a:lumOff val="15000"/>
+                  </a:schemeClr>
+                </a:solidFill>
+                <a:latin typeface="+mn-lt"/>
+                <a:ea typeface="+mn-ea"/>
+                <a:cs typeface="+mn-cs"/>
+              </a:defRPr>
+            </a:lvl3pPr>
+            <a:lvl4pPr marL="1600200" indent="-228600" algn="l" defTabSz="914400" rtl="0" eaLnBrk="1" latinLnBrk="0" hangingPunct="1">
+              <a:lnSpc>
+                <a:spcPct val="85000"/>
+              </a:lnSpc>
+              <a:spcBef>
+                <a:spcPts val="600"/>
+              </a:spcBef>
+              <a:buSzPct val="80000"/>
+              <a:buFont typeface="Courier New" panose="02070309020205020404" pitchFamily="49" charset="0"/>
+              <a:buChar char="o"/>
+              <a:defRPr sz="2000" kern="1200">
+                <a:solidFill>
+                  <a:schemeClr val="tx1">
+                    <a:lumMod val="85000"/>
+                    <a:lumOff val="15000"/>
+                  </a:schemeClr>
+                </a:solidFill>
+                <a:latin typeface="+mn-lt"/>
+                <a:ea typeface="+mn-ea"/>
+                <a:cs typeface="+mn-cs"/>
+              </a:defRPr>
+            </a:lvl4pPr>
+            <a:lvl5pPr marL="2057400" indent="-228600" algn="l" defTabSz="914400" rtl="0" eaLnBrk="1" latinLnBrk="0" hangingPunct="1">
+              <a:lnSpc>
+                <a:spcPct val="85000"/>
+              </a:lnSpc>
+              <a:spcBef>
+                <a:spcPts val="600"/>
+              </a:spcBef>
+              <a:buFont typeface="Arial" panose="020B0604020202020204" pitchFamily="34" charset="0"/>
+              <a:buChar char="•"/>
+              <a:defRPr sz="1800" kern="1200">
+                <a:solidFill>
+                  <a:schemeClr val="tx1">
+                    <a:lumMod val="85000"/>
+                    <a:lumOff val="15000"/>
+                  </a:schemeClr>
+                </a:solidFill>
+                <a:latin typeface="+mn-lt"/>
+                <a:ea typeface="+mn-ea"/>
+                <a:cs typeface="+mn-cs"/>
+              </a:defRPr>
+            </a:lvl5pPr>
+            <a:lvl6pPr marL="1200000" indent="-228600" algn="l" defTabSz="914400" rtl="0" eaLnBrk="1" latinLnBrk="0" hangingPunct="1">
+              <a:lnSpc>
+                <a:spcPct val="85000"/>
+              </a:lnSpc>
+              <a:spcBef>
+                <a:spcPts val="600"/>
+              </a:spcBef>
+              <a:buFont typeface="Arial" pitchFamily="34" charset="0"/>
+              <a:buChar char=" "/>
+              <a:defRPr sz="1800" kern="1200">
+                <a:solidFill>
+                  <a:schemeClr val="tx1">
+                    <a:lumMod val="85000"/>
+                    <a:lumOff val="15000"/>
+                  </a:schemeClr>
+                </a:solidFill>
+                <a:latin typeface="+mn-lt"/>
+                <a:ea typeface="+mn-ea"/>
+                <a:cs typeface="+mn-cs"/>
+              </a:defRPr>
+            </a:lvl6pPr>
+            <a:lvl7pPr marL="1400000" indent="-228600" algn="l" defTabSz="914400" rtl="0" eaLnBrk="1" latinLnBrk="0" hangingPunct="1">
+              <a:lnSpc>
+                <a:spcPct val="85000"/>
+              </a:lnSpc>
+              <a:spcBef>
+                <a:spcPts val="600"/>
+              </a:spcBef>
+              <a:buFont typeface="Arial" pitchFamily="34" charset="0"/>
+              <a:buChar char=" "/>
+              <a:defRPr sz="1800" kern="1200">
+                <a:solidFill>
+                  <a:schemeClr val="tx1">
+                    <a:lumMod val="85000"/>
+                    <a:lumOff val="15000"/>
+                  </a:schemeClr>
+                </a:solidFill>
+                <a:latin typeface="+mn-lt"/>
+                <a:ea typeface="+mn-ea"/>
+                <a:cs typeface="+mn-cs"/>
+              </a:defRPr>
+            </a:lvl7pPr>
+            <a:lvl8pPr marL="1600000" indent="-228600" algn="l" defTabSz="914400" rtl="0" eaLnBrk="1" latinLnBrk="0" hangingPunct="1">
+              <a:lnSpc>
+                <a:spcPct val="85000"/>
+              </a:lnSpc>
+              <a:spcBef>
+                <a:spcPts val="600"/>
+              </a:spcBef>
+              <a:buFont typeface="Arial" pitchFamily="34" charset="0"/>
+              <a:buChar char=" "/>
+              <a:defRPr sz="1800" kern="1200">
+                <a:solidFill>
+                  <a:schemeClr val="tx1">
+                    <a:lumMod val="85000"/>
+                    <a:lumOff val="15000"/>
+                  </a:schemeClr>
+                </a:solidFill>
+                <a:latin typeface="+mn-lt"/>
+                <a:ea typeface="+mn-ea"/>
+                <a:cs typeface="+mn-cs"/>
+              </a:defRPr>
+            </a:lvl8pPr>
+            <a:lvl9pPr marL="1800000" indent="-228600" algn="l" defTabSz="914400" rtl="0" eaLnBrk="1" latinLnBrk="0" hangingPunct="1">
+              <a:lnSpc>
+                <a:spcPct val="85000"/>
+              </a:lnSpc>
+              <a:spcBef>
+                <a:spcPts val="600"/>
+              </a:spcBef>
+              <a:buFont typeface="Arial" pitchFamily="34" charset="0"/>
+              <a:buChar char=" "/>
+              <a:defRPr sz="1800" kern="1200">
+                <a:solidFill>
+                  <a:schemeClr val="tx1">
+                    <a:lumMod val="85000"/>
+                    <a:lumOff val="15000"/>
+                  </a:schemeClr>
+                </a:solidFill>
+                <a:latin typeface="+mn-lt"/>
+                <a:ea typeface="+mn-ea"/>
+                <a:cs typeface="+mn-cs"/>
+              </a:defRPr>
+            </a:lvl9pPr>
+          </a:lstStyle>
+          <a:p>
+            <a:pPr marL="0" indent="0">
+              <a:buNone/>
+            </a:pPr>
+            <a:r>
+              <a:rPr lang="en-US" sz="2000" baseline="30000" dirty="0"/>
+              <a:t>a</a:t>
+            </a:r>
+            <a:r>
+              <a:rPr lang="en-US" sz="2000" dirty="0"/>
+              <a:t> 4-level BMI categories:  underweight, healthy weight, overweight, obese</a:t>
+            </a:r>
+          </a:p>
+          <a:p>
+            <a:pPr marL="0" indent="0">
+              <a:buNone/>
+            </a:pPr>
+            <a:r>
+              <a:rPr lang="en-US" sz="2000" baseline="30000" dirty="0"/>
+              <a:t>b</a:t>
+            </a:r>
+            <a:r>
+              <a:rPr lang="en-US" sz="2000" dirty="0"/>
+              <a:t> Dichotomous BMI:  overweight or obese vs. not overweight or obese</a:t>
+            </a:r>
+          </a:p>
+        </p:txBody>
+      </p:sp>
+    </p:spTree>
+    <p:extLst>
+      <p:ext uri="{BB962C8B-B14F-4D97-AF65-F5344CB8AC3E}">
+        <p14:creationId xmlns:p14="http://schemas.microsoft.com/office/powerpoint/2010/main" val="242010851"/>
       </p:ext>
     </p:extLst>
   </p:cSld>
@@ -13669,7 +13756,7 @@
             <a:pPr lvl="1"/>
             <a:r>
               <a:rPr lang="en-US" dirty="0"/>
-              <a:t>ASW is a measure of dissimilarity between vs. within clusters based on a given </a:t>
+              <a:t>Overall ASW is a measure of dissimilarity between vs. within clusters based on a given </a:t>
             </a:r>
             <a:r>
               <a:rPr lang="en-US" i="1" dirty="0"/>

</xml_diff>

<commit_message>
Minor change to slides
</commit_message>
<xml_diff>
--- a/presentation/Prioli_presentation.pptx
+++ b/presentation/Prioli_presentation.pptx
@@ -232,7 +232,7 @@
           <a:p>
             <a:fld id="{4EE169DE-67F4-4753-9B1C-F1A309C78068}" type="datetimeFigureOut">
               <a:rPr lang="en-US" smtClean="0"/>
-              <a:t>12/4/2019</a:t>
+              <a:t>12/5/2019</a:t>
             </a:fld>
             <a:endParaRPr lang="en-US"/>
           </a:p>
@@ -802,7 +802,7 @@
           <a:p>
             <a:fld id="{CF647BC4-379F-449B-8ACB-1D0356C51E22}" type="datetimeFigureOut">
               <a:rPr lang="en-US" smtClean="0"/>
-              <a:t>12/4/2019</a:t>
+              <a:t>12/5/2019</a:t>
             </a:fld>
             <a:endParaRPr lang="en-US"/>
           </a:p>
@@ -11498,7 +11498,7 @@
           <a:p>
             <a:r>
               <a:rPr lang="en-US" dirty="0"/>
-              <a:t>Findings indicate it may be possible to identify those likely to be overweight or obese using a relatively small set of demographic, behavioral, and medical variables</a:t>
+              <a:t>Findings indicate it may be possible to identify those likely to be overweight or obese using a relatively small set of demographic, behavioral, and clinical variables</a:t>
             </a:r>
           </a:p>
           <a:p>

</xml_diff>